<commit_message>
radius proxy. No operativo aún
</commit_message>
<xml_diff>
--- a/DiameterServerDesign.pptx
+++ b/DiameterServerDesign.pptx
@@ -5075,14 +5075,14 @@
       </p:grpSpPr>
       <p:sp>
         <p:nvSpPr>
-          <p:cNvPr id="42" name="Rectángulo 41"/>
+          <p:cNvPr id="34" name="Rectángulo 33"/>
           <p:cNvSpPr/>
           <p:nvPr/>
         </p:nvSpPr>
         <p:spPr>
           <a:xfrm>
-            <a:off x="649917" y="2717014"/>
-            <a:ext cx="2923080" cy="4148996"/>
+            <a:off x="314733" y="361673"/>
+            <a:ext cx="3224546" cy="2203676"/>
           </a:xfrm>
           <a:prstGeom prst="rect">
             <a:avLst/>
@@ -5115,14 +5115,14 @@
       </p:sp>
       <p:sp>
         <p:nvSpPr>
-          <p:cNvPr id="36" name="Rectángulo 35"/>
+          <p:cNvPr id="42" name="Rectángulo 41"/>
           <p:cNvSpPr/>
           <p:nvPr/>
         </p:nvSpPr>
         <p:spPr>
           <a:xfrm>
-            <a:off x="3770137" y="353894"/>
-            <a:ext cx="2915731" cy="2244051"/>
+            <a:off x="273480" y="461809"/>
+            <a:ext cx="3176810" cy="2203676"/>
           </a:xfrm>
           <a:prstGeom prst="rect">
             <a:avLst/>
@@ -5155,13 +5155,13 @@
       </p:sp>
       <p:sp>
         <p:nvSpPr>
-          <p:cNvPr id="28" name="Rectángulo 27"/>
+          <p:cNvPr id="36" name="Rectángulo 35"/>
           <p:cNvSpPr/>
           <p:nvPr/>
         </p:nvSpPr>
         <p:spPr>
           <a:xfrm>
-            <a:off x="3696480" y="472963"/>
+            <a:off x="3770137" y="353894"/>
             <a:ext cx="2915731" cy="2244051"/>
           </a:xfrm>
           <a:prstGeom prst="rect">
@@ -5195,14 +5195,14 @@
       </p:sp>
       <p:sp>
         <p:nvSpPr>
-          <p:cNvPr id="2" name="Rectángulo 1"/>
+          <p:cNvPr id="28" name="Rectángulo 27"/>
           <p:cNvSpPr/>
           <p:nvPr/>
         </p:nvSpPr>
         <p:spPr>
           <a:xfrm>
-            <a:off x="541510" y="2797703"/>
-            <a:ext cx="2923080" cy="4233716"/>
+            <a:off x="3696480" y="472963"/>
+            <a:ext cx="2915731" cy="2244051"/>
           </a:xfrm>
           <a:prstGeom prst="rect">
             <a:avLst/>
@@ -5235,14 +5235,14 @@
       </p:sp>
       <p:sp>
         <p:nvSpPr>
-          <p:cNvPr id="4" name="Rectángulo 3"/>
+          <p:cNvPr id="2" name="Rectángulo 1"/>
           <p:cNvSpPr/>
           <p:nvPr/>
         </p:nvSpPr>
         <p:spPr>
           <a:xfrm>
-            <a:off x="3689131" y="2797703"/>
-            <a:ext cx="2923080" cy="4233717"/>
+            <a:off x="262849" y="2797703"/>
+            <a:ext cx="3201741" cy="4233716"/>
           </a:xfrm>
           <a:prstGeom prst="rect">
             <a:avLst/>
@@ -5275,14 +5275,14 @@
       </p:sp>
       <p:sp>
         <p:nvSpPr>
-          <p:cNvPr id="5" name="Rectángulo 4"/>
+          <p:cNvPr id="4" name="Rectángulo 3"/>
           <p:cNvSpPr/>
           <p:nvPr/>
         </p:nvSpPr>
         <p:spPr>
           <a:xfrm>
-            <a:off x="6834977" y="472964"/>
-            <a:ext cx="2923080" cy="6558455"/>
+            <a:off x="3689131" y="2797703"/>
+            <a:ext cx="2923080" cy="4233717"/>
           </a:xfrm>
           <a:prstGeom prst="rect">
             <a:avLst/>
@@ -5309,6 +5309,46 @@
           <a:lstStyle/>
           <a:p>
             <a:pPr algn="ctr"/>
+            <a:endParaRPr lang="es-ES" dirty="0"/>
+          </a:p>
+        </p:txBody>
+      </p:sp>
+      <p:sp>
+        <p:nvSpPr>
+          <p:cNvPr id="5" name="Rectángulo 4"/>
+          <p:cNvSpPr/>
+          <p:nvPr/>
+        </p:nvSpPr>
+        <p:spPr>
+          <a:xfrm>
+            <a:off x="6834977" y="472964"/>
+            <a:ext cx="2923080" cy="6558455"/>
+          </a:xfrm>
+          <a:prstGeom prst="rect">
+            <a:avLst/>
+          </a:prstGeom>
+        </p:spPr>
+        <p:style>
+          <a:lnRef idx="2">
+            <a:schemeClr val="accent1">
+              <a:shade val="50000"/>
+            </a:schemeClr>
+          </a:lnRef>
+          <a:fillRef idx="1">
+            <a:schemeClr val="accent1"/>
+          </a:fillRef>
+          <a:effectRef idx="0">
+            <a:schemeClr val="accent1"/>
+          </a:effectRef>
+          <a:fontRef idx="minor">
+            <a:schemeClr val="lt1"/>
+          </a:fontRef>
+        </p:style>
+        <p:txBody>
+          <a:bodyPr rtlCol="0" anchor="ctr"/>
+          <a:lstStyle/>
+          <a:p>
+            <a:pPr algn="ctr"/>
             <a:endParaRPr lang="es-ES"/>
           </a:p>
         </p:txBody>
@@ -5321,7 +5361,7 @@
         </p:nvSpPr>
         <p:spPr>
           <a:xfrm>
-            <a:off x="981600" y="2862135"/>
+            <a:off x="1088630" y="6356936"/>
             <a:ext cx="2042419" cy="523220"/>
           </a:xfrm>
           <a:prstGeom prst="rect">
@@ -5739,7 +5779,7 @@
         <p:spPr>
           <a:xfrm>
             <a:off x="805218" y="5795444"/>
-            <a:ext cx="4541981" cy="338554"/>
+            <a:ext cx="4541981" cy="584775"/>
           </a:xfrm>
           <a:prstGeom prst="rect">
             <a:avLst/>
@@ -5776,11 +5816,27 @@
             </a:r>
             <a:r>
               <a:rPr lang="es-ES" sz="1600" dirty="0" err="1" smtClean="0"/>
+              <a:t>destination</a:t>
+            </a:r>
+            <a:r>
+              <a:rPr lang="es-ES" sz="1600" dirty="0" smtClean="0"/>
+              <a:t>, </a:t>
+            </a:r>
+            <a:r>
+              <a:rPr lang="es-ES" sz="1600" dirty="0" err="1" smtClean="0"/>
               <a:t>originActor</a:t>
             </a:r>
             <a:r>
               <a:rPr lang="es-ES" sz="1600" dirty="0" smtClean="0"/>
-              <a:t>, e2eId)</a:t>
+              <a:t>, </a:t>
+            </a:r>
+            <a:r>
+              <a:rPr lang="es-ES" sz="1600" dirty="0" err="1"/>
+              <a:t>acator</a:t>
+            </a:r>
+            <a:r>
+              <a:rPr lang="es-ES" sz="1600" dirty="0"/>
+              <a:t>)</a:t>
             </a:r>
             <a:endParaRPr lang="es-ES" sz="1600" dirty="0"/>
           </a:p>
@@ -5894,7 +5950,15 @@
             </a:r>
             <a:r>
               <a:rPr lang="es-ES" sz="1600" dirty="0" smtClean="0"/>
-              <a:t>, e2eId)</a:t>
+              <a:t>, </a:t>
+            </a:r>
+            <a:r>
+              <a:rPr lang="es-ES" sz="1600" dirty="0" err="1" smtClean="0"/>
+              <a:t>acator</a:t>
+            </a:r>
+            <a:r>
+              <a:rPr lang="es-ES" sz="1600" dirty="0" smtClean="0"/>
+              <a:t>)</a:t>
             </a:r>
             <a:endParaRPr lang="es-ES" sz="1600" dirty="0"/>
           </a:p>
@@ -6142,7 +6206,15 @@
             </a:r>
             <a:r>
               <a:rPr lang="es-ES" sz="1600" dirty="0" smtClean="0"/>
-              <a:t>, e2eId)</a:t>
+              <a:t>, </a:t>
+            </a:r>
+            <a:r>
+              <a:rPr lang="es-ES" sz="1600" dirty="0" err="1"/>
+              <a:t>acator</a:t>
+            </a:r>
+            <a:r>
+              <a:rPr lang="es-ES" sz="1600" dirty="0"/>
+              <a:t>)</a:t>
             </a:r>
             <a:endParaRPr lang="es-ES" sz="1600" dirty="0"/>
           </a:p>
@@ -6266,7 +6338,7 @@
         </p:nvSpPr>
         <p:spPr>
           <a:xfrm>
-            <a:off x="5262935" y="2269187"/>
+            <a:off x="5381479" y="2569376"/>
             <a:ext cx="4488865" cy="338554"/>
           </a:xfrm>
           <a:prstGeom prst="rect">
@@ -6305,6 +6377,248 @@
             <a:r>
               <a:rPr lang="es-ES" sz="1600" dirty="0" err="1" smtClean="0"/>
               <a:t>originActor</a:t>
+            </a:r>
+            <a:r>
+              <a:rPr lang="es-ES" sz="1600" dirty="0" smtClean="0"/>
+              <a:t>, </a:t>
+            </a:r>
+            <a:r>
+              <a:rPr lang="es-ES" sz="1600" dirty="0" err="1" smtClean="0"/>
+              <a:t>origin</a:t>
+            </a:r>
+            <a:r>
+              <a:rPr lang="es-ES" sz="1600" dirty="0" smtClean="0"/>
+              <a:t>)</a:t>
+            </a:r>
+            <a:endParaRPr lang="es-ES" sz="1600" dirty="0"/>
+          </a:p>
+        </p:txBody>
+      </p:sp>
+      <p:sp>
+        <p:nvSpPr>
+          <p:cNvPr id="38" name="CuadroTexto 37"/>
+          <p:cNvSpPr txBox="1"/>
+          <p:nvPr/>
+        </p:nvSpPr>
+        <p:spPr>
+          <a:xfrm>
+            <a:off x="5865911" y="5296779"/>
+            <a:ext cx="742960" cy="307777"/>
+          </a:xfrm>
+          <a:prstGeom prst="rect">
+            <a:avLst/>
+          </a:prstGeom>
+          <a:noFill/>
+        </p:spPr>
+        <p:txBody>
+          <a:bodyPr wrap="none" rtlCol="0">
+            <a:spAutoFit/>
+          </a:bodyPr>
+          <a:lstStyle/>
+          <a:p>
+            <a:r>
+              <a:rPr lang="es-ES" sz="1400" dirty="0" err="1" smtClean="0"/>
+              <a:t>request</a:t>
+            </a:r>
+            <a:endParaRPr lang="es-ES" sz="1400" dirty="0"/>
+          </a:p>
+        </p:txBody>
+      </p:sp>
+      <p:cxnSp>
+        <p:nvCxnSpPr>
+          <p:cNvPr id="39" name="Conector recto 38"/>
+          <p:cNvCxnSpPr/>
+          <p:nvPr/>
+        </p:nvCxnSpPr>
+        <p:spPr>
+          <a:xfrm>
+            <a:off x="805218" y="1751736"/>
+            <a:ext cx="0" cy="1571082"/>
+          </a:xfrm>
+          <a:prstGeom prst="line">
+            <a:avLst/>
+          </a:prstGeom>
+          <a:ln>
+            <a:solidFill>
+              <a:schemeClr val="tx1">
+                <a:lumMod val="75000"/>
+                <a:lumOff val="25000"/>
+              </a:schemeClr>
+            </a:solidFill>
+            <a:headEnd type="arrow" w="med" len="med"/>
+            <a:tailEnd type="none" w="med" len="med"/>
+          </a:ln>
+        </p:spPr>
+        <p:style>
+          <a:lnRef idx="1">
+            <a:schemeClr val="accent1"/>
+          </a:lnRef>
+          <a:fillRef idx="0">
+            <a:schemeClr val="accent1"/>
+          </a:fillRef>
+          <a:effectRef idx="0">
+            <a:schemeClr val="accent1"/>
+          </a:effectRef>
+          <a:fontRef idx="minor">
+            <a:schemeClr val="tx1"/>
+          </a:fontRef>
+        </p:style>
+      </p:cxnSp>
+      <p:cxnSp>
+        <p:nvCxnSpPr>
+          <p:cNvPr id="41" name="Conector recto 40"/>
+          <p:cNvCxnSpPr/>
+          <p:nvPr/>
+        </p:nvCxnSpPr>
+        <p:spPr>
+          <a:xfrm>
+            <a:off x="3076208" y="1714329"/>
+            <a:ext cx="0" cy="1571082"/>
+          </a:xfrm>
+          <a:prstGeom prst="line">
+            <a:avLst/>
+          </a:prstGeom>
+          <a:ln>
+            <a:solidFill>
+              <a:schemeClr val="tx1">
+                <a:lumMod val="75000"/>
+                <a:lumOff val="25000"/>
+              </a:schemeClr>
+            </a:solidFill>
+            <a:headEnd type="none" w="med" len="med"/>
+            <a:tailEnd type="arrow" w="med" len="med"/>
+          </a:ln>
+        </p:spPr>
+        <p:style>
+          <a:lnRef idx="1">
+            <a:schemeClr val="accent1"/>
+          </a:lnRef>
+          <a:fillRef idx="0">
+            <a:schemeClr val="accent1"/>
+          </a:fillRef>
+          <a:effectRef idx="0">
+            <a:schemeClr val="accent1"/>
+          </a:effectRef>
+          <a:fontRef idx="minor">
+            <a:schemeClr val="tx1"/>
+          </a:fontRef>
+        </p:style>
+      </p:cxnSp>
+      <p:sp>
+        <p:nvSpPr>
+          <p:cNvPr id="35" name="CuadroTexto 34"/>
+          <p:cNvSpPr txBox="1"/>
+          <p:nvPr/>
+        </p:nvSpPr>
+        <p:spPr>
+          <a:xfrm>
+            <a:off x="350670" y="598289"/>
+            <a:ext cx="3022430" cy="523220"/>
+          </a:xfrm>
+          <a:prstGeom prst="rect">
+            <a:avLst/>
+          </a:prstGeom>
+          <a:noFill/>
+        </p:spPr>
+        <p:txBody>
+          <a:bodyPr wrap="none" rtlCol="0">
+            <a:spAutoFit/>
+          </a:bodyPr>
+          <a:lstStyle/>
+          <a:p>
+            <a:r>
+              <a:rPr lang="es-ES" sz="2800" b="1" dirty="0" err="1" smtClean="0"/>
+              <a:t>RadiusClientSocket</a:t>
+            </a:r>
+            <a:endParaRPr lang="es-ES" sz="2800" b="1" dirty="0"/>
+          </a:p>
+        </p:txBody>
+      </p:sp>
+      <p:sp>
+        <p:nvSpPr>
+          <p:cNvPr id="48" name="CuadroTexto 47"/>
+          <p:cNvSpPr txBox="1"/>
+          <p:nvPr/>
+        </p:nvSpPr>
+        <p:spPr>
+          <a:xfrm>
+            <a:off x="57986" y="2868619"/>
+            <a:ext cx="3102984" cy="338554"/>
+          </a:xfrm>
+          <a:prstGeom prst="rect">
+            <a:avLst/>
+          </a:prstGeom>
+          <a:solidFill>
+            <a:schemeClr val="accent1">
+              <a:lumMod val="40000"/>
+              <a:lumOff val="60000"/>
+            </a:schemeClr>
+          </a:solidFill>
+        </p:spPr>
+        <p:txBody>
+          <a:bodyPr wrap="square" rtlCol="0">
+            <a:spAutoFit/>
+          </a:bodyPr>
+          <a:lstStyle/>
+          <a:p>
+            <a:r>
+              <a:rPr lang="es-ES" sz="1600" dirty="0" err="1" smtClean="0"/>
+              <a:t>RadiusClientSocketRequest</a:t>
+            </a:r>
+            <a:r>
+              <a:rPr lang="es-ES" sz="1600" dirty="0" smtClean="0"/>
+              <a:t>(</a:t>
+            </a:r>
+            <a:r>
+              <a:rPr lang="es-ES" sz="1600" dirty="0" err="1" smtClean="0"/>
+              <a:t>packet</a:t>
+            </a:r>
+            <a:r>
+              <a:rPr lang="es-ES" sz="1600" dirty="0" smtClean="0"/>
+              <a:t>)</a:t>
+            </a:r>
+            <a:endParaRPr lang="es-ES" sz="1600" dirty="0"/>
+          </a:p>
+        </p:txBody>
+      </p:sp>
+      <p:sp>
+        <p:nvSpPr>
+          <p:cNvPr id="50" name="CuadroTexto 49"/>
+          <p:cNvSpPr txBox="1"/>
+          <p:nvPr/>
+        </p:nvSpPr>
+        <p:spPr>
+          <a:xfrm>
+            <a:off x="1149441" y="1175895"/>
+            <a:ext cx="3963215" cy="338554"/>
+          </a:xfrm>
+          <a:prstGeom prst="rect">
+            <a:avLst/>
+          </a:prstGeom>
+          <a:solidFill>
+            <a:schemeClr val="accent1">
+              <a:lumMod val="40000"/>
+              <a:lumOff val="60000"/>
+            </a:schemeClr>
+          </a:solidFill>
+        </p:spPr>
+        <p:txBody>
+          <a:bodyPr wrap="square" rtlCol="0">
+            <a:spAutoFit/>
+          </a:bodyPr>
+          <a:lstStyle/>
+          <a:p>
+            <a:r>
+              <a:rPr lang="es-ES" sz="1600" dirty="0" err="1" smtClean="0"/>
+              <a:t>RadiusClientSocketResponse</a:t>
+            </a:r>
+            <a:r>
+              <a:rPr lang="es-ES" sz="1600" dirty="0" smtClean="0"/>
+              <a:t>(</a:t>
+            </a:r>
+            <a:r>
+              <a:rPr lang="es-ES" sz="1600" dirty="0" err="1" smtClean="0"/>
+              <a:t>packet</a:t>
             </a:r>
             <a:r>
               <a:rPr lang="es-ES" sz="1600" dirty="0" smtClean="0"/>

</xml_diff>

<commit_message>
New Diameter Dictionary implementation
</commit_message>
<xml_diff>
--- a/DiameterServerDesign.pptx
+++ b/DiameterServerDesign.pptx
@@ -5832,7 +5832,7 @@
             </a:r>
             <a:r>
               <a:rPr lang="es-ES" sz="1600" dirty="0" err="1"/>
-              <a:t>acator</a:t>
+              <a:t>authtor</a:t>
             </a:r>
             <a:r>
               <a:rPr lang="es-ES" sz="1600" dirty="0"/>
@@ -5954,7 +5954,7 @@
             </a:r>
             <a:r>
               <a:rPr lang="es-ES" sz="1600" dirty="0" err="1" smtClean="0"/>
-              <a:t>acator</a:t>
+              <a:t>authtor</a:t>
             </a:r>
             <a:r>
               <a:rPr lang="es-ES" sz="1600" dirty="0" smtClean="0"/>
@@ -6210,7 +6210,7 @@
             </a:r>
             <a:r>
               <a:rPr lang="es-ES" sz="1600" dirty="0" err="1"/>
-              <a:t>acator</a:t>
+              <a:t>authtor</a:t>
             </a:r>
             <a:r>
               <a:rPr lang="es-ES" sz="1600" dirty="0"/>

</xml_diff>

<commit_message>
Authenticator for Accounting messages. Radius server status
</commit_message>
<xml_diff>
--- a/DiameterServerDesign.pptx
+++ b/DiameterServerDesign.pptx
@@ -5451,109 +5451,6 @@
           </a:p>
         </p:txBody>
       </p:sp>
-      <p:sp>
-        <p:nvSpPr>
-          <p:cNvPr id="17" name="Rectángulo 16"/>
-          <p:cNvSpPr/>
-          <p:nvPr/>
-        </p:nvSpPr>
-        <p:spPr>
-          <a:xfrm>
-            <a:off x="1995493" y="4302706"/>
-            <a:ext cx="898635" cy="1229710"/>
-          </a:xfrm>
-          <a:prstGeom prst="rect">
-            <a:avLst/>
-          </a:prstGeom>
-          <a:solidFill>
-            <a:schemeClr val="bg1">
-              <a:lumMod val="65000"/>
-            </a:schemeClr>
-          </a:solidFill>
-          <a:ln>
-            <a:noFill/>
-          </a:ln>
-        </p:spPr>
-        <p:style>
-          <a:lnRef idx="2">
-            <a:schemeClr val="accent1">
-              <a:shade val="50000"/>
-            </a:schemeClr>
-          </a:lnRef>
-          <a:fillRef idx="1">
-            <a:schemeClr val="accent1"/>
-          </a:fillRef>
-          <a:effectRef idx="0">
-            <a:schemeClr val="accent1"/>
-          </a:effectRef>
-          <a:fontRef idx="minor">
-            <a:schemeClr val="lt1"/>
-          </a:fontRef>
-        </p:style>
-        <p:txBody>
-          <a:bodyPr rtlCol="0" anchor="ctr"/>
-          <a:lstStyle/>
-          <a:p>
-            <a:pPr algn="ctr"/>
-            <a:r>
-              <a:rPr lang="es-ES" dirty="0" smtClean="0"/>
-              <a:t>Cache</a:t>
-            </a:r>
-          </a:p>
-        </p:txBody>
-      </p:sp>
-      <p:sp>
-        <p:nvSpPr>
-          <p:cNvPr id="24" name="Rectángulo 23"/>
-          <p:cNvSpPr/>
-          <p:nvPr/>
-        </p:nvSpPr>
-        <p:spPr>
-          <a:xfrm>
-            <a:off x="7228008" y="4223877"/>
-            <a:ext cx="898635" cy="1229710"/>
-          </a:xfrm>
-          <a:prstGeom prst="rect">
-            <a:avLst/>
-          </a:prstGeom>
-          <a:solidFill>
-            <a:schemeClr val="bg1">
-              <a:lumMod val="65000"/>
-            </a:schemeClr>
-          </a:solidFill>
-          <a:ln>
-            <a:noFill/>
-          </a:ln>
-        </p:spPr>
-        <p:style>
-          <a:lnRef idx="2">
-            <a:schemeClr val="accent1">
-              <a:shade val="50000"/>
-            </a:schemeClr>
-          </a:lnRef>
-          <a:fillRef idx="1">
-            <a:schemeClr val="accent1"/>
-          </a:fillRef>
-          <a:effectRef idx="0">
-            <a:schemeClr val="accent1"/>
-          </a:effectRef>
-          <a:fontRef idx="minor">
-            <a:schemeClr val="lt1"/>
-          </a:fontRef>
-        </p:style>
-        <p:txBody>
-          <a:bodyPr rtlCol="0" anchor="ctr"/>
-          <a:lstStyle/>
-          <a:p>
-            <a:pPr algn="ctr"/>
-            <a:r>
-              <a:rPr lang="es-ES" dirty="0" smtClean="0"/>
-              <a:t>Cache</a:t>
-            </a:r>
-            <a:endParaRPr lang="es-ES" dirty="0"/>
-          </a:p>
-        </p:txBody>
-      </p:sp>
       <p:cxnSp>
         <p:nvCxnSpPr>
           <p:cNvPr id="26" name="Conector recto 25"/>
@@ -5698,8 +5595,8 @@
         </p:nvCxnSpPr>
         <p:spPr>
           <a:xfrm>
-            <a:off x="5740794" y="5264292"/>
-            <a:ext cx="2843048" cy="0"/>
+            <a:off x="5740794" y="5358888"/>
+            <a:ext cx="3553297" cy="0"/>
           </a:xfrm>
           <a:prstGeom prst="line">
             <a:avLst/>
@@ -5738,8 +5635,8 @@
         </p:nvCxnSpPr>
         <p:spPr>
           <a:xfrm>
-            <a:off x="1328428" y="5264292"/>
-            <a:ext cx="3058511" cy="0"/>
+            <a:off x="693683" y="5358888"/>
+            <a:ext cx="3693256" cy="0"/>
           </a:xfrm>
           <a:prstGeom prst="line">
             <a:avLst/>
@@ -5831,11 +5728,11 @@
               <a:t>, </a:t>
             </a:r>
             <a:r>
-              <a:rPr lang="es-ES" sz="1600" dirty="0" err="1"/>
-              <a:t>authtor</a:t>
-            </a:r>
-            <a:r>
-              <a:rPr lang="es-ES" sz="1600" dirty="0"/>
+              <a:rPr lang="es-ES" sz="1600" dirty="0" err="1" smtClean="0"/>
+              <a:t>radiusId</a:t>
+            </a:r>
+            <a:r>
+              <a:rPr lang="es-ES" sz="1600" dirty="0" smtClean="0"/>
               <a:t>)</a:t>
             </a:r>
             <a:endParaRPr lang="es-ES" sz="1600" dirty="0"/>
@@ -5954,7 +5851,7 @@
             </a:r>
             <a:r>
               <a:rPr lang="es-ES" sz="1600" dirty="0" err="1" smtClean="0"/>
-              <a:t>authtor</a:t>
+              <a:t>radiusId</a:t>
             </a:r>
             <a:r>
               <a:rPr lang="es-ES" sz="1600" dirty="0" smtClean="0"/>
@@ -6010,8 +5907,8 @@
         </p:nvSpPr>
         <p:spPr>
           <a:xfrm>
-            <a:off x="8405249" y="4353180"/>
-            <a:ext cx="287229" cy="1020137"/>
+            <a:off x="9175531" y="4328663"/>
+            <a:ext cx="262175" cy="1063144"/>
           </a:xfrm>
           <a:prstGeom prst="ellipse">
             <a:avLst/>
@@ -6084,7 +5981,7 @@
         </p:nvSpPr>
         <p:spPr>
           <a:xfrm>
-            <a:off x="1333115" y="4219278"/>
+            <a:off x="763704" y="4138990"/>
             <a:ext cx="552587" cy="307777"/>
           </a:xfrm>
           <a:prstGeom prst="rect">
@@ -6209,11 +6106,11 @@
               <a:t>, </a:t>
             </a:r>
             <a:r>
-              <a:rPr lang="es-ES" sz="1600" dirty="0" err="1"/>
-              <a:t>authtor</a:t>
-            </a:r>
-            <a:r>
-              <a:rPr lang="es-ES" sz="1600" dirty="0"/>
+              <a:rPr lang="es-ES" sz="1600" dirty="0" err="1" smtClean="0"/>
+              <a:t>radiusId</a:t>
+            </a:r>
+            <a:r>
+              <a:rPr lang="es-ES" sz="1600" dirty="0" smtClean="0"/>
               <a:t>)</a:t>
             </a:r>
             <a:endParaRPr lang="es-ES" sz="1600" dirty="0"/>
@@ -6298,8 +6195,8 @@
         </p:nvCxnSpPr>
         <p:spPr>
           <a:xfrm>
-            <a:off x="1328429" y="4590103"/>
-            <a:ext cx="7255413" cy="0"/>
+            <a:off x="693683" y="4495507"/>
+            <a:ext cx="8600408" cy="0"/>
           </a:xfrm>
           <a:prstGeom prst="line">
             <a:avLst/>
@@ -6402,7 +6299,7 @@
         </p:nvSpPr>
         <p:spPr>
           <a:xfrm>
-            <a:off x="5865911" y="5296779"/>
+            <a:off x="5865911" y="5391375"/>
             <a:ext cx="742960" cy="307777"/>
           </a:xfrm>
           <a:prstGeom prst="rect">
@@ -6633,6 +6530,154 @@
               <a:t>)</a:t>
             </a:r>
             <a:endParaRPr lang="es-ES" sz="1600" dirty="0"/>
+          </a:p>
+        </p:txBody>
+      </p:sp>
+      <p:sp>
+        <p:nvSpPr>
+          <p:cNvPr id="17" name="Rectángulo 16"/>
+          <p:cNvSpPr/>
+          <p:nvPr/>
+        </p:nvSpPr>
+        <p:spPr>
+          <a:xfrm>
+            <a:off x="1316291" y="4302706"/>
+            <a:ext cx="1577838" cy="1229710"/>
+          </a:xfrm>
+          <a:prstGeom prst="rect">
+            <a:avLst/>
+          </a:prstGeom>
+          <a:solidFill>
+            <a:srgbClr val="A6A6A6">
+              <a:alpha val="60000"/>
+            </a:srgbClr>
+          </a:solidFill>
+          <a:ln>
+            <a:noFill/>
+          </a:ln>
+        </p:spPr>
+        <p:style>
+          <a:lnRef idx="2">
+            <a:schemeClr val="accent1">
+              <a:shade val="50000"/>
+            </a:schemeClr>
+          </a:lnRef>
+          <a:fillRef idx="1">
+            <a:schemeClr val="accent1"/>
+          </a:fillRef>
+          <a:effectRef idx="0">
+            <a:schemeClr val="accent1"/>
+          </a:effectRef>
+          <a:fontRef idx="minor">
+            <a:schemeClr val="lt1"/>
+          </a:fontRef>
+        </p:style>
+        <p:txBody>
+          <a:bodyPr rtlCol="0" anchor="ctr"/>
+          <a:lstStyle/>
+          <a:p>
+            <a:pPr algn="ctr"/>
+            <a:r>
+              <a:rPr lang="es-ES" dirty="0" smtClean="0"/>
+              <a:t>Cache (</a:t>
+            </a:r>
+            <a:r>
+              <a:rPr lang="es-ES" dirty="0" err="1" smtClean="0"/>
+              <a:t>port,id</a:t>
+            </a:r>
+            <a:r>
+              <a:rPr lang="es-ES" dirty="0" smtClean="0"/>
+              <a:t> -&gt; </a:t>
+            </a:r>
+            <a:r>
+              <a:rPr lang="es-ES" dirty="0" err="1" smtClean="0"/>
+              <a:t>radiusId</a:t>
+            </a:r>
+            <a:r>
+              <a:rPr lang="es-ES" dirty="0" smtClean="0"/>
+              <a:t>, </a:t>
+            </a:r>
+            <a:r>
+              <a:rPr lang="es-ES" dirty="0" err="1" smtClean="0"/>
+              <a:t>authenticator</a:t>
+            </a:r>
+            <a:r>
+              <a:rPr lang="es-ES" dirty="0" smtClean="0"/>
+              <a:t>)</a:t>
+            </a:r>
+            <a:endParaRPr lang="es-ES" dirty="0" smtClean="0"/>
+          </a:p>
+        </p:txBody>
+      </p:sp>
+      <p:sp>
+        <p:nvSpPr>
+          <p:cNvPr id="24" name="Rectángulo 23"/>
+          <p:cNvSpPr/>
+          <p:nvPr/>
+        </p:nvSpPr>
+        <p:spPr>
+          <a:xfrm>
+            <a:off x="7140524" y="4223877"/>
+            <a:ext cx="1922720" cy="1229710"/>
+          </a:xfrm>
+          <a:prstGeom prst="rect">
+            <a:avLst/>
+          </a:prstGeom>
+          <a:solidFill>
+            <a:srgbClr val="A6A6A6">
+              <a:alpha val="60000"/>
+            </a:srgbClr>
+          </a:solidFill>
+          <a:ln>
+            <a:noFill/>
+          </a:ln>
+        </p:spPr>
+        <p:style>
+          <a:lnRef idx="2">
+            <a:schemeClr val="accent1">
+              <a:shade val="50000"/>
+            </a:schemeClr>
+          </a:lnRef>
+          <a:fillRef idx="1">
+            <a:schemeClr val="accent1"/>
+          </a:fillRef>
+          <a:effectRef idx="0">
+            <a:schemeClr val="accent1"/>
+          </a:effectRef>
+          <a:fontRef idx="minor">
+            <a:schemeClr val="lt1"/>
+          </a:fontRef>
+        </p:style>
+        <p:txBody>
+          <a:bodyPr rtlCol="0" anchor="ctr"/>
+          <a:lstStyle/>
+          <a:p>
+            <a:pPr algn="ctr"/>
+            <a:r>
+              <a:rPr lang="es-ES" dirty="0" smtClean="0"/>
+              <a:t>Cache (</a:t>
+            </a:r>
+            <a:r>
+              <a:rPr lang="es-ES" dirty="0" err="1" smtClean="0"/>
+              <a:t>radiusId</a:t>
+            </a:r>
+            <a:endParaRPr lang="es-ES" dirty="0" smtClean="0"/>
+          </a:p>
+          <a:p>
+            <a:pPr algn="ctr"/>
+            <a:r>
+              <a:rPr lang="es-ES" dirty="0" smtClean="0"/>
+              <a:t>-&gt;</a:t>
+            </a:r>
+            <a:r>
+              <a:rPr lang="es-ES" dirty="0" err="1" smtClean="0"/>
+              <a:t>promise</a:t>
+            </a:r>
+            <a:r>
+              <a:rPr lang="es-ES" dirty="0" smtClean="0"/>
+              <a:t>)</a:t>
+            </a:r>
+            <a:endParaRPr lang="es-ES" dirty="0"/>
           </a:p>
         </p:txBody>
       </p:sp>

</xml_diff>

<commit_message>
Started implementation of stats
</commit_message>
<xml_diff>
--- a/DiameterServerDesign.pptx
+++ b/DiameterServerDesign.pptx
@@ -5,14 +5,18 @@
     <p:sldMasterId id="2147483648" r:id="rId1"/>
   </p:sldMasterIdLst>
   <p:notesMasterIdLst>
-    <p:notesMasterId r:id="rId4"/>
+    <p:notesMasterId r:id="rId8"/>
   </p:notesMasterIdLst>
   <p:handoutMasterIdLst>
-    <p:handoutMasterId r:id="rId5"/>
+    <p:handoutMasterId r:id="rId9"/>
   </p:handoutMasterIdLst>
   <p:sldIdLst>
     <p:sldId id="258" r:id="rId2"/>
     <p:sldId id="259" r:id="rId3"/>
+    <p:sldId id="261" r:id="rId4"/>
+    <p:sldId id="262" r:id="rId5"/>
+    <p:sldId id="260" r:id="rId6"/>
+    <p:sldId id="264" r:id="rId7"/>
   </p:sldIdLst>
   <p:sldSz cx="10080625" cy="7559675"/>
   <p:notesSz cx="7772400" cy="10058400"/>
@@ -6605,7 +6609,6 @@
               <a:rPr lang="es-ES" dirty="0" smtClean="0"/>
               <a:t>)</a:t>
             </a:r>
-            <a:endParaRPr lang="es-ES" dirty="0" smtClean="0"/>
           </a:p>
         </p:txBody>
       </p:sp>
@@ -6617,7 +6620,7 @@
         </p:nvSpPr>
         <p:spPr>
           <a:xfrm>
-            <a:off x="7140524" y="4223877"/>
+            <a:off x="7178257" y="4282160"/>
             <a:ext cx="1922720" cy="1229710"/>
           </a:xfrm>
           <a:prstGeom prst="rect">
@@ -6685,6 +6688,4271 @@
     <p:extLst>
       <p:ext uri="{BB962C8B-B14F-4D97-AF65-F5344CB8AC3E}">
         <p14:creationId xmlns:p14="http://schemas.microsoft.com/office/powerpoint/2010/main" val="2232572363"/>
+      </p:ext>
+    </p:extLst>
+  </p:cSld>
+  <p:clrMapOvr>
+    <a:masterClrMapping/>
+  </p:clrMapOvr>
+  <mc:AlternateContent xmlns:mc="http://schemas.openxmlformats.org/markup-compatibility/2006" xmlns:p14="http://schemas.microsoft.com/office/powerpoint/2010/main">
+    <mc:Choice Requires="p14">
+      <p:transition spd="slow" p14:dur="2000"/>
+    </mc:Choice>
+    <mc:Fallback xmlns="">
+      <p:transition spd="slow"/>
+    </mc:Fallback>
+  </mc:AlternateContent>
+</p:sld>
+</file>
+
+<file path=ppt/slides/slide3.xml><?xml version="1.0" encoding="utf-8"?>
+<p:sld xmlns:a="http://schemas.openxmlformats.org/drawingml/2006/main" xmlns:r="http://schemas.openxmlformats.org/officeDocument/2006/relationships" xmlns:p="http://schemas.openxmlformats.org/presentationml/2006/main">
+  <p:cSld>
+    <p:spTree>
+      <p:nvGrpSpPr>
+        <p:cNvPr id="1" name=""/>
+        <p:cNvGrpSpPr/>
+        <p:nvPr/>
+      </p:nvGrpSpPr>
+      <p:grpSpPr>
+        <a:xfrm>
+          <a:off x="0" y="0"/>
+          <a:ext cx="0" cy="0"/>
+          <a:chOff x="0" y="0"/>
+          <a:chExt cx="0" cy="0"/>
+        </a:xfrm>
+      </p:grpSpPr>
+      <p:sp>
+        <p:nvSpPr>
+          <p:cNvPr id="2" name="Rectángulo 1"/>
+          <p:cNvSpPr/>
+          <p:nvPr/>
+        </p:nvSpPr>
+        <p:spPr>
+          <a:xfrm>
+            <a:off x="567558" y="472966"/>
+            <a:ext cx="2923080" cy="6558455"/>
+          </a:xfrm>
+          <a:prstGeom prst="rect">
+            <a:avLst/>
+          </a:prstGeom>
+        </p:spPr>
+        <p:style>
+          <a:lnRef idx="2">
+            <a:schemeClr val="accent1">
+              <a:shade val="50000"/>
+            </a:schemeClr>
+          </a:lnRef>
+          <a:fillRef idx="1">
+            <a:schemeClr val="accent1"/>
+          </a:fillRef>
+          <a:effectRef idx="0">
+            <a:schemeClr val="accent1"/>
+          </a:effectRef>
+          <a:fontRef idx="minor">
+            <a:schemeClr val="lt1"/>
+          </a:fontRef>
+        </p:style>
+        <p:txBody>
+          <a:bodyPr rtlCol="0" anchor="ctr"/>
+          <a:lstStyle/>
+          <a:p>
+            <a:pPr algn="ctr"/>
+            <a:endParaRPr lang="es-ES" dirty="0"/>
+          </a:p>
+        </p:txBody>
+      </p:sp>
+      <p:sp>
+        <p:nvSpPr>
+          <p:cNvPr id="4" name="Rectángulo 3"/>
+          <p:cNvSpPr/>
+          <p:nvPr/>
+        </p:nvSpPr>
+        <p:spPr>
+          <a:xfrm>
+            <a:off x="3689131" y="472965"/>
+            <a:ext cx="2923080" cy="6558455"/>
+          </a:xfrm>
+          <a:prstGeom prst="rect">
+            <a:avLst/>
+          </a:prstGeom>
+        </p:spPr>
+        <p:style>
+          <a:lnRef idx="2">
+            <a:schemeClr val="accent1">
+              <a:shade val="50000"/>
+            </a:schemeClr>
+          </a:lnRef>
+          <a:fillRef idx="1">
+            <a:schemeClr val="accent1"/>
+          </a:fillRef>
+          <a:effectRef idx="0">
+            <a:schemeClr val="accent1"/>
+          </a:effectRef>
+          <a:fontRef idx="minor">
+            <a:schemeClr val="lt1"/>
+          </a:fontRef>
+        </p:style>
+        <p:txBody>
+          <a:bodyPr rtlCol="0" anchor="ctr"/>
+          <a:lstStyle/>
+          <a:p>
+            <a:pPr algn="ctr"/>
+            <a:endParaRPr lang="es-ES" dirty="0"/>
+          </a:p>
+        </p:txBody>
+      </p:sp>
+      <p:sp>
+        <p:nvSpPr>
+          <p:cNvPr id="5" name="Rectángulo 4"/>
+          <p:cNvSpPr/>
+          <p:nvPr/>
+        </p:nvSpPr>
+        <p:spPr>
+          <a:xfrm>
+            <a:off x="6834977" y="472964"/>
+            <a:ext cx="2923080" cy="6558455"/>
+          </a:xfrm>
+          <a:prstGeom prst="rect">
+            <a:avLst/>
+          </a:prstGeom>
+        </p:spPr>
+        <p:style>
+          <a:lnRef idx="2">
+            <a:schemeClr val="accent1">
+              <a:shade val="50000"/>
+            </a:schemeClr>
+          </a:lnRef>
+          <a:fillRef idx="1">
+            <a:schemeClr val="accent1"/>
+          </a:fillRef>
+          <a:effectRef idx="0">
+            <a:schemeClr val="accent1"/>
+          </a:effectRef>
+          <a:fontRef idx="minor">
+            <a:schemeClr val="lt1"/>
+          </a:fontRef>
+        </p:style>
+        <p:txBody>
+          <a:bodyPr rtlCol="0" anchor="ctr"/>
+          <a:lstStyle/>
+          <a:p>
+            <a:pPr algn="ctr"/>
+            <a:endParaRPr lang="es-ES"/>
+          </a:p>
+        </p:txBody>
+      </p:sp>
+      <p:sp>
+        <p:nvSpPr>
+          <p:cNvPr id="6" name="CuadroTexto 5"/>
+          <p:cNvSpPr txBox="1"/>
+          <p:nvPr/>
+        </p:nvSpPr>
+        <p:spPr>
+          <a:xfrm>
+            <a:off x="1152736" y="614856"/>
+            <a:ext cx="1752724" cy="523220"/>
+          </a:xfrm>
+          <a:prstGeom prst="rect">
+            <a:avLst/>
+          </a:prstGeom>
+          <a:noFill/>
+        </p:spPr>
+        <p:txBody>
+          <a:bodyPr wrap="none" rtlCol="0">
+            <a:spAutoFit/>
+          </a:bodyPr>
+          <a:lstStyle/>
+          <a:p>
+            <a:r>
+              <a:rPr lang="es-ES" sz="2800" b="1" dirty="0" smtClean="0"/>
+              <a:t>Peer Actor</a:t>
+            </a:r>
+            <a:endParaRPr lang="es-ES" sz="2800" b="1" dirty="0"/>
+          </a:p>
+        </p:txBody>
+      </p:sp>
+      <p:sp>
+        <p:nvSpPr>
+          <p:cNvPr id="7" name="CuadroTexto 6"/>
+          <p:cNvSpPr txBox="1"/>
+          <p:nvPr/>
+        </p:nvSpPr>
+        <p:spPr>
+          <a:xfrm>
+            <a:off x="4106827" y="614856"/>
+            <a:ext cx="2087687" cy="523220"/>
+          </a:xfrm>
+          <a:prstGeom prst="rect">
+            <a:avLst/>
+          </a:prstGeom>
+          <a:noFill/>
+        </p:spPr>
+        <p:txBody>
+          <a:bodyPr wrap="none" rtlCol="0">
+            <a:spAutoFit/>
+          </a:bodyPr>
+          <a:lstStyle/>
+          <a:p>
+            <a:r>
+              <a:rPr lang="es-ES" sz="2800" b="1" dirty="0" err="1" smtClean="0"/>
+              <a:t>Router</a:t>
+            </a:r>
+            <a:r>
+              <a:rPr lang="es-ES" sz="2800" b="1" dirty="0" smtClean="0"/>
+              <a:t> Actor</a:t>
+            </a:r>
+            <a:endParaRPr lang="es-ES" sz="2800" b="1" dirty="0"/>
+          </a:p>
+        </p:txBody>
+      </p:sp>
+      <p:sp>
+        <p:nvSpPr>
+          <p:cNvPr id="8" name="CuadroTexto 7"/>
+          <p:cNvSpPr txBox="1"/>
+          <p:nvPr/>
+        </p:nvSpPr>
+        <p:spPr>
+          <a:xfrm>
+            <a:off x="7140524" y="614856"/>
+            <a:ext cx="2263440" cy="523220"/>
+          </a:xfrm>
+          <a:prstGeom prst="rect">
+            <a:avLst/>
+          </a:prstGeom>
+          <a:noFill/>
+        </p:spPr>
+        <p:txBody>
+          <a:bodyPr wrap="none" rtlCol="0">
+            <a:spAutoFit/>
+          </a:bodyPr>
+          <a:lstStyle/>
+          <a:p>
+            <a:r>
+              <a:rPr lang="es-ES" sz="2800" b="1" dirty="0" err="1" smtClean="0"/>
+              <a:t>Handler</a:t>
+            </a:r>
+            <a:r>
+              <a:rPr lang="es-ES" sz="2800" b="1" dirty="0" smtClean="0"/>
+              <a:t> Actor</a:t>
+            </a:r>
+            <a:endParaRPr lang="es-ES" sz="2800" b="1" dirty="0"/>
+          </a:p>
+        </p:txBody>
+      </p:sp>
+      <p:sp>
+        <p:nvSpPr>
+          <p:cNvPr id="9" name="Rectángulo 8"/>
+          <p:cNvSpPr/>
+          <p:nvPr/>
+        </p:nvSpPr>
+        <p:spPr>
+          <a:xfrm>
+            <a:off x="369065" y="2112577"/>
+            <a:ext cx="1198180" cy="662152"/>
+          </a:xfrm>
+          <a:prstGeom prst="rect">
+            <a:avLst/>
+          </a:prstGeom>
+          <a:solidFill>
+            <a:schemeClr val="accent6">
+              <a:lumMod val="40000"/>
+              <a:lumOff val="60000"/>
+            </a:schemeClr>
+          </a:solidFill>
+        </p:spPr>
+        <p:style>
+          <a:lnRef idx="2">
+            <a:schemeClr val="accent1">
+              <a:shade val="50000"/>
+            </a:schemeClr>
+          </a:lnRef>
+          <a:fillRef idx="1">
+            <a:schemeClr val="accent1"/>
+          </a:fillRef>
+          <a:effectRef idx="0">
+            <a:schemeClr val="accent1"/>
+          </a:effectRef>
+          <a:fontRef idx="minor">
+            <a:schemeClr val="lt1"/>
+          </a:fontRef>
+        </p:style>
+        <p:txBody>
+          <a:bodyPr rtlCol="0" anchor="ctr"/>
+          <a:lstStyle/>
+          <a:p>
+            <a:pPr algn="ctr"/>
+            <a:r>
+              <a:rPr lang="en-US" dirty="0" smtClean="0">
+                <a:solidFill>
+                  <a:schemeClr val="tx1"/>
+                </a:solidFill>
+              </a:rPr>
+              <a:t>Incoming message</a:t>
+            </a:r>
+            <a:endParaRPr lang="en-US" dirty="0">
+              <a:solidFill>
+                <a:schemeClr val="tx1"/>
+              </a:solidFill>
+            </a:endParaRPr>
+          </a:p>
+        </p:txBody>
+      </p:sp>
+      <p:cxnSp>
+        <p:nvCxnSpPr>
+          <p:cNvPr id="11" name="Conector recto de flecha 10"/>
+          <p:cNvCxnSpPr/>
+          <p:nvPr/>
+        </p:nvCxnSpPr>
+        <p:spPr>
+          <a:xfrm flipV="1">
+            <a:off x="1355834" y="1655380"/>
+            <a:ext cx="1" cy="447755"/>
+          </a:xfrm>
+          <a:prstGeom prst="straightConnector1">
+            <a:avLst/>
+          </a:prstGeom>
+          <a:ln>
+            <a:solidFill>
+              <a:schemeClr val="tx1">
+                <a:lumMod val="65000"/>
+                <a:lumOff val="35000"/>
+              </a:schemeClr>
+            </a:solidFill>
+            <a:headEnd type="none" w="med" len="med"/>
+            <a:tailEnd type="none" w="med" len="med"/>
+          </a:ln>
+        </p:spPr>
+        <p:style>
+          <a:lnRef idx="1">
+            <a:schemeClr val="accent1"/>
+          </a:lnRef>
+          <a:fillRef idx="0">
+            <a:schemeClr val="accent1"/>
+          </a:fillRef>
+          <a:effectRef idx="0">
+            <a:schemeClr val="accent1"/>
+          </a:effectRef>
+          <a:fontRef idx="minor">
+            <a:schemeClr val="tx1"/>
+          </a:fontRef>
+        </p:style>
+      </p:cxnSp>
+      <p:cxnSp>
+        <p:nvCxnSpPr>
+          <p:cNvPr id="14" name="Conector recto 13"/>
+          <p:cNvCxnSpPr/>
+          <p:nvPr/>
+        </p:nvCxnSpPr>
+        <p:spPr>
+          <a:xfrm>
+            <a:off x="1355834" y="1655379"/>
+            <a:ext cx="3058511" cy="0"/>
+          </a:xfrm>
+          <a:prstGeom prst="line">
+            <a:avLst/>
+          </a:prstGeom>
+          <a:ln>
+            <a:solidFill>
+              <a:schemeClr val="tx1">
+                <a:lumMod val="75000"/>
+                <a:lumOff val="25000"/>
+              </a:schemeClr>
+            </a:solidFill>
+            <a:headEnd type="none" w="med" len="med"/>
+            <a:tailEnd type="arrow" w="med" len="med"/>
+          </a:ln>
+        </p:spPr>
+        <p:style>
+          <a:lnRef idx="1">
+            <a:schemeClr val="accent1"/>
+          </a:lnRef>
+          <a:fillRef idx="0">
+            <a:schemeClr val="accent1"/>
+          </a:fillRef>
+          <a:effectRef idx="0">
+            <a:schemeClr val="accent1"/>
+          </a:effectRef>
+          <a:fontRef idx="minor">
+            <a:schemeClr val="tx1"/>
+          </a:fontRef>
+        </p:style>
+      </p:cxnSp>
+      <p:sp>
+        <p:nvSpPr>
+          <p:cNvPr id="17" name="Rectángulo 16"/>
+          <p:cNvSpPr/>
+          <p:nvPr/>
+        </p:nvSpPr>
+        <p:spPr>
+          <a:xfrm>
+            <a:off x="2019623" y="2944529"/>
+            <a:ext cx="898635" cy="1229710"/>
+          </a:xfrm>
+          <a:prstGeom prst="rect">
+            <a:avLst/>
+          </a:prstGeom>
+          <a:solidFill>
+            <a:schemeClr val="bg1">
+              <a:lumMod val="65000"/>
+            </a:schemeClr>
+          </a:solidFill>
+          <a:ln>
+            <a:noFill/>
+          </a:ln>
+        </p:spPr>
+        <p:style>
+          <a:lnRef idx="2">
+            <a:schemeClr val="accent1">
+              <a:shade val="50000"/>
+            </a:schemeClr>
+          </a:lnRef>
+          <a:fillRef idx="1">
+            <a:schemeClr val="accent1"/>
+          </a:fillRef>
+          <a:effectRef idx="0">
+            <a:schemeClr val="accent1"/>
+          </a:effectRef>
+          <a:fontRef idx="minor">
+            <a:schemeClr val="lt1"/>
+          </a:fontRef>
+        </p:style>
+        <p:txBody>
+          <a:bodyPr rtlCol="0" anchor="ctr"/>
+          <a:lstStyle/>
+          <a:p>
+            <a:pPr algn="ctr"/>
+            <a:r>
+              <a:rPr lang="es-ES" dirty="0" smtClean="0"/>
+              <a:t>Cache</a:t>
+            </a:r>
+            <a:endParaRPr lang="es-ES" dirty="0"/>
+          </a:p>
+        </p:txBody>
+      </p:sp>
+      <p:sp>
+        <p:nvSpPr>
+          <p:cNvPr id="20" name="CuadroTexto 19"/>
+          <p:cNvSpPr txBox="1"/>
+          <p:nvPr/>
+        </p:nvSpPr>
+        <p:spPr>
+          <a:xfrm>
+            <a:off x="1355834" y="1701868"/>
+            <a:ext cx="742960" cy="307777"/>
+          </a:xfrm>
+          <a:prstGeom prst="rect">
+            <a:avLst/>
+          </a:prstGeom>
+          <a:noFill/>
+        </p:spPr>
+        <p:txBody>
+          <a:bodyPr wrap="none" rtlCol="0">
+            <a:spAutoFit/>
+          </a:bodyPr>
+          <a:lstStyle/>
+          <a:p>
+            <a:r>
+              <a:rPr lang="es-ES" sz="1400" dirty="0" err="1" smtClean="0"/>
+              <a:t>request</a:t>
+            </a:r>
+            <a:endParaRPr lang="es-ES" sz="1400" dirty="0"/>
+          </a:p>
+        </p:txBody>
+      </p:sp>
+      <p:cxnSp>
+        <p:nvCxnSpPr>
+          <p:cNvPr id="21" name="Conector recto de flecha 20"/>
+          <p:cNvCxnSpPr/>
+          <p:nvPr/>
+        </p:nvCxnSpPr>
+        <p:spPr>
+          <a:xfrm flipV="1">
+            <a:off x="1355833" y="2784171"/>
+            <a:ext cx="1" cy="447755"/>
+          </a:xfrm>
+          <a:prstGeom prst="straightConnector1">
+            <a:avLst/>
+          </a:prstGeom>
+          <a:ln>
+            <a:solidFill>
+              <a:schemeClr val="tx1">
+                <a:lumMod val="65000"/>
+                <a:lumOff val="35000"/>
+              </a:schemeClr>
+            </a:solidFill>
+            <a:headEnd type="none" w="med" len="med"/>
+            <a:tailEnd type="none" w="med" len="med"/>
+          </a:ln>
+        </p:spPr>
+        <p:style>
+          <a:lnRef idx="1">
+            <a:schemeClr val="accent1"/>
+          </a:lnRef>
+          <a:fillRef idx="0">
+            <a:schemeClr val="accent1"/>
+          </a:fillRef>
+          <a:effectRef idx="0">
+            <a:schemeClr val="accent1"/>
+          </a:effectRef>
+          <a:fontRef idx="minor">
+            <a:schemeClr val="tx1"/>
+          </a:fontRef>
+        </p:style>
+      </p:cxnSp>
+      <p:sp>
+        <p:nvSpPr>
+          <p:cNvPr id="22" name="CuadroTexto 21"/>
+          <p:cNvSpPr txBox="1"/>
+          <p:nvPr/>
+        </p:nvSpPr>
+        <p:spPr>
+          <a:xfrm>
+            <a:off x="1358073" y="2767496"/>
+            <a:ext cx="552587" cy="307777"/>
+          </a:xfrm>
+          <a:prstGeom prst="rect">
+            <a:avLst/>
+          </a:prstGeom>
+          <a:noFill/>
+        </p:spPr>
+        <p:txBody>
+          <a:bodyPr wrap="none" rtlCol="0">
+            <a:spAutoFit/>
+          </a:bodyPr>
+          <a:lstStyle/>
+          <a:p>
+            <a:r>
+              <a:rPr lang="es-ES" sz="1400" dirty="0" err="1" smtClean="0"/>
+              <a:t>reply</a:t>
+            </a:r>
+            <a:endParaRPr lang="es-ES" sz="1400" dirty="0"/>
+          </a:p>
+        </p:txBody>
+      </p:sp>
+      <p:sp>
+        <p:nvSpPr>
+          <p:cNvPr id="24" name="Rectángulo 23"/>
+          <p:cNvSpPr/>
+          <p:nvPr/>
+        </p:nvSpPr>
+        <p:spPr>
+          <a:xfrm>
+            <a:off x="7252138" y="2865700"/>
+            <a:ext cx="898635" cy="1229710"/>
+          </a:xfrm>
+          <a:prstGeom prst="rect">
+            <a:avLst/>
+          </a:prstGeom>
+          <a:solidFill>
+            <a:schemeClr val="bg1">
+              <a:lumMod val="65000"/>
+            </a:schemeClr>
+          </a:solidFill>
+          <a:ln>
+            <a:noFill/>
+          </a:ln>
+        </p:spPr>
+        <p:style>
+          <a:lnRef idx="2">
+            <a:schemeClr val="accent1">
+              <a:shade val="50000"/>
+            </a:schemeClr>
+          </a:lnRef>
+          <a:fillRef idx="1">
+            <a:schemeClr val="accent1"/>
+          </a:fillRef>
+          <a:effectRef idx="0">
+            <a:schemeClr val="accent1"/>
+          </a:effectRef>
+          <a:fontRef idx="minor">
+            <a:schemeClr val="lt1"/>
+          </a:fontRef>
+        </p:style>
+        <p:txBody>
+          <a:bodyPr rtlCol="0" anchor="ctr"/>
+          <a:lstStyle/>
+          <a:p>
+            <a:pPr algn="ctr"/>
+            <a:r>
+              <a:rPr lang="es-ES" dirty="0" smtClean="0"/>
+              <a:t>Cache</a:t>
+            </a:r>
+            <a:endParaRPr lang="es-ES" dirty="0"/>
+          </a:p>
+        </p:txBody>
+      </p:sp>
+      <p:cxnSp>
+        <p:nvCxnSpPr>
+          <p:cNvPr id="26" name="Conector recto 25"/>
+          <p:cNvCxnSpPr/>
+          <p:nvPr/>
+        </p:nvCxnSpPr>
+        <p:spPr>
+          <a:xfrm flipV="1">
+            <a:off x="5764924" y="1692481"/>
+            <a:ext cx="3520966" cy="4132"/>
+          </a:xfrm>
+          <a:prstGeom prst="line">
+            <a:avLst/>
+          </a:prstGeom>
+          <a:ln>
+            <a:solidFill>
+              <a:schemeClr val="tx1">
+                <a:lumMod val="75000"/>
+                <a:lumOff val="25000"/>
+              </a:schemeClr>
+            </a:solidFill>
+            <a:headEnd type="none" w="med" len="med"/>
+            <a:tailEnd type="arrow" w="med" len="med"/>
+          </a:ln>
+        </p:spPr>
+        <p:style>
+          <a:lnRef idx="1">
+            <a:schemeClr val="accent1"/>
+          </a:lnRef>
+          <a:fillRef idx="0">
+            <a:schemeClr val="accent1"/>
+          </a:fillRef>
+          <a:effectRef idx="0">
+            <a:schemeClr val="accent1"/>
+          </a:effectRef>
+          <a:fontRef idx="minor">
+            <a:schemeClr val="tx1"/>
+          </a:fontRef>
+        </p:style>
+      </p:cxnSp>
+      <p:cxnSp>
+        <p:nvCxnSpPr>
+          <p:cNvPr id="27" name="Conector recto 26"/>
+          <p:cNvCxnSpPr/>
+          <p:nvPr/>
+        </p:nvCxnSpPr>
+        <p:spPr>
+          <a:xfrm flipV="1">
+            <a:off x="1352559" y="5918952"/>
+            <a:ext cx="7933331" cy="24648"/>
+          </a:xfrm>
+          <a:prstGeom prst="line">
+            <a:avLst/>
+          </a:prstGeom>
+          <a:ln>
+            <a:solidFill>
+              <a:schemeClr val="tx1">
+                <a:lumMod val="75000"/>
+                <a:lumOff val="25000"/>
+              </a:schemeClr>
+            </a:solidFill>
+            <a:headEnd type="arrow" w="med" len="med"/>
+            <a:tailEnd type="none" w="med" len="med"/>
+          </a:ln>
+        </p:spPr>
+        <p:style>
+          <a:lnRef idx="1">
+            <a:schemeClr val="accent1"/>
+          </a:lnRef>
+          <a:fillRef idx="0">
+            <a:schemeClr val="accent1"/>
+          </a:fillRef>
+          <a:effectRef idx="0">
+            <a:schemeClr val="accent1"/>
+          </a:effectRef>
+          <a:fontRef idx="minor">
+            <a:schemeClr val="tx1"/>
+          </a:fontRef>
+        </p:style>
+      </p:cxnSp>
+      <p:sp>
+        <p:nvSpPr>
+          <p:cNvPr id="29" name="Rectángulo 28"/>
+          <p:cNvSpPr/>
+          <p:nvPr/>
+        </p:nvSpPr>
+        <p:spPr>
+          <a:xfrm>
+            <a:off x="369065" y="4819986"/>
+            <a:ext cx="1198180" cy="662152"/>
+          </a:xfrm>
+          <a:prstGeom prst="rect">
+            <a:avLst/>
+          </a:prstGeom>
+          <a:solidFill>
+            <a:schemeClr val="accent6">
+              <a:lumMod val="40000"/>
+              <a:lumOff val="60000"/>
+            </a:schemeClr>
+          </a:solidFill>
+        </p:spPr>
+        <p:style>
+          <a:lnRef idx="2">
+            <a:schemeClr val="accent1">
+              <a:shade val="50000"/>
+            </a:schemeClr>
+          </a:lnRef>
+          <a:fillRef idx="1">
+            <a:schemeClr val="accent1"/>
+          </a:fillRef>
+          <a:effectRef idx="0">
+            <a:schemeClr val="accent1"/>
+          </a:effectRef>
+          <a:fontRef idx="minor">
+            <a:schemeClr val="lt1"/>
+          </a:fontRef>
+        </p:style>
+        <p:txBody>
+          <a:bodyPr rtlCol="0" anchor="ctr"/>
+          <a:lstStyle/>
+          <a:p>
+            <a:pPr algn="ctr"/>
+            <a:r>
+              <a:rPr lang="en-US" dirty="0" smtClean="0">
+                <a:solidFill>
+                  <a:schemeClr val="tx1"/>
+                </a:solidFill>
+              </a:rPr>
+              <a:t>Outgoing message</a:t>
+            </a:r>
+            <a:endParaRPr lang="en-US" dirty="0">
+              <a:solidFill>
+                <a:schemeClr val="tx1"/>
+              </a:solidFill>
+            </a:endParaRPr>
+          </a:p>
+        </p:txBody>
+      </p:sp>
+      <p:cxnSp>
+        <p:nvCxnSpPr>
+          <p:cNvPr id="30" name="Conector recto de flecha 29"/>
+          <p:cNvCxnSpPr/>
+          <p:nvPr/>
+        </p:nvCxnSpPr>
+        <p:spPr>
+          <a:xfrm flipV="1">
+            <a:off x="1352558" y="5510046"/>
+            <a:ext cx="1" cy="447755"/>
+          </a:xfrm>
+          <a:prstGeom prst="straightConnector1">
+            <a:avLst/>
+          </a:prstGeom>
+          <a:ln>
+            <a:solidFill>
+              <a:schemeClr val="tx1">
+                <a:lumMod val="65000"/>
+                <a:lumOff val="35000"/>
+              </a:schemeClr>
+            </a:solidFill>
+            <a:headEnd type="none" w="med" len="med"/>
+            <a:tailEnd type="none" w="med" len="med"/>
+          </a:ln>
+        </p:spPr>
+        <p:style>
+          <a:lnRef idx="1">
+            <a:schemeClr val="accent1"/>
+          </a:lnRef>
+          <a:fillRef idx="0">
+            <a:schemeClr val="accent1"/>
+          </a:fillRef>
+          <a:effectRef idx="0">
+            <a:schemeClr val="accent1"/>
+          </a:effectRef>
+          <a:fontRef idx="minor">
+            <a:schemeClr val="tx1"/>
+          </a:fontRef>
+        </p:style>
+      </p:cxnSp>
+      <p:cxnSp>
+        <p:nvCxnSpPr>
+          <p:cNvPr id="33" name="Conector recto 32"/>
+          <p:cNvCxnSpPr/>
+          <p:nvPr/>
+        </p:nvCxnSpPr>
+        <p:spPr>
+          <a:xfrm>
+            <a:off x="5764924" y="3906115"/>
+            <a:ext cx="2843048" cy="0"/>
+          </a:xfrm>
+          <a:prstGeom prst="line">
+            <a:avLst/>
+          </a:prstGeom>
+          <a:ln>
+            <a:solidFill>
+              <a:schemeClr val="tx1">
+                <a:lumMod val="75000"/>
+                <a:lumOff val="25000"/>
+              </a:schemeClr>
+            </a:solidFill>
+            <a:headEnd type="arrow" w="med" len="med"/>
+            <a:tailEnd type="none" w="med" len="med"/>
+          </a:ln>
+        </p:spPr>
+        <p:style>
+          <a:lnRef idx="1">
+            <a:schemeClr val="accent1"/>
+          </a:lnRef>
+          <a:fillRef idx="0">
+            <a:schemeClr val="accent1"/>
+          </a:fillRef>
+          <a:effectRef idx="0">
+            <a:schemeClr val="accent1"/>
+          </a:effectRef>
+          <a:fontRef idx="minor">
+            <a:schemeClr val="tx1"/>
+          </a:fontRef>
+        </p:style>
+      </p:cxnSp>
+      <p:cxnSp>
+        <p:nvCxnSpPr>
+          <p:cNvPr id="37" name="Conector recto 36"/>
+          <p:cNvCxnSpPr/>
+          <p:nvPr/>
+        </p:nvCxnSpPr>
+        <p:spPr>
+          <a:xfrm>
+            <a:off x="1352558" y="3906115"/>
+            <a:ext cx="3058511" cy="0"/>
+          </a:xfrm>
+          <a:prstGeom prst="line">
+            <a:avLst/>
+          </a:prstGeom>
+          <a:ln>
+            <a:solidFill>
+              <a:schemeClr val="tx1">
+                <a:lumMod val="75000"/>
+                <a:lumOff val="25000"/>
+              </a:schemeClr>
+            </a:solidFill>
+            <a:headEnd type="arrow" w="med" len="med"/>
+            <a:tailEnd type="none" w="med" len="med"/>
+          </a:ln>
+        </p:spPr>
+        <p:style>
+          <a:lnRef idx="1">
+            <a:schemeClr val="accent1"/>
+          </a:lnRef>
+          <a:fillRef idx="0">
+            <a:schemeClr val="accent1"/>
+          </a:fillRef>
+          <a:effectRef idx="0">
+            <a:schemeClr val="accent1"/>
+          </a:effectRef>
+          <a:fontRef idx="minor">
+            <a:schemeClr val="tx1"/>
+          </a:fontRef>
+        </p:style>
+      </p:cxnSp>
+      <p:cxnSp>
+        <p:nvCxnSpPr>
+          <p:cNvPr id="39" name="Conector recto 38"/>
+          <p:cNvCxnSpPr/>
+          <p:nvPr/>
+        </p:nvCxnSpPr>
+        <p:spPr>
+          <a:xfrm>
+            <a:off x="1352558" y="3906115"/>
+            <a:ext cx="0" cy="913871"/>
+          </a:xfrm>
+          <a:prstGeom prst="line">
+            <a:avLst/>
+          </a:prstGeom>
+          <a:ln>
+            <a:solidFill>
+              <a:schemeClr val="tx1">
+                <a:lumMod val="75000"/>
+                <a:lumOff val="25000"/>
+              </a:schemeClr>
+            </a:solidFill>
+          </a:ln>
+        </p:spPr>
+        <p:style>
+          <a:lnRef idx="1">
+            <a:schemeClr val="accent1"/>
+          </a:lnRef>
+          <a:fillRef idx="0">
+            <a:schemeClr val="accent1"/>
+          </a:fillRef>
+          <a:effectRef idx="0">
+            <a:schemeClr val="accent1"/>
+          </a:effectRef>
+          <a:fontRef idx="minor">
+            <a:schemeClr val="tx1"/>
+          </a:fontRef>
+        </p:style>
+      </p:cxnSp>
+      <p:sp>
+        <p:nvSpPr>
+          <p:cNvPr id="44" name="Elipse 43"/>
+          <p:cNvSpPr/>
+          <p:nvPr/>
+        </p:nvSpPr>
+        <p:spPr>
+          <a:xfrm>
+            <a:off x="3943017" y="1401165"/>
+            <a:ext cx="2251498" cy="2694245"/>
+          </a:xfrm>
+          <a:prstGeom prst="ellipse">
+            <a:avLst/>
+          </a:prstGeom>
+          <a:solidFill>
+            <a:schemeClr val="accent4">
+              <a:lumMod val="60000"/>
+              <a:lumOff val="40000"/>
+            </a:schemeClr>
+          </a:solidFill>
+        </p:spPr>
+        <p:style>
+          <a:lnRef idx="2">
+            <a:schemeClr val="accent1">
+              <a:shade val="50000"/>
+            </a:schemeClr>
+          </a:lnRef>
+          <a:fillRef idx="1">
+            <a:schemeClr val="accent1"/>
+          </a:fillRef>
+          <a:effectRef idx="0">
+            <a:schemeClr val="accent1"/>
+          </a:effectRef>
+          <a:fontRef idx="minor">
+            <a:schemeClr val="lt1"/>
+          </a:fontRef>
+        </p:style>
+        <p:txBody>
+          <a:bodyPr rtlCol="0" anchor="ctr"/>
+          <a:lstStyle/>
+          <a:p>
+            <a:pPr algn="ctr"/>
+            <a:endParaRPr lang="es-ES"/>
+          </a:p>
+        </p:txBody>
+      </p:sp>
+      <p:cxnSp>
+        <p:nvCxnSpPr>
+          <p:cNvPr id="19" name="Conector recto 18"/>
+          <p:cNvCxnSpPr/>
+          <p:nvPr/>
+        </p:nvCxnSpPr>
+        <p:spPr>
+          <a:xfrm>
+            <a:off x="1352559" y="3231926"/>
+            <a:ext cx="7255413" cy="0"/>
+          </a:xfrm>
+          <a:prstGeom prst="line">
+            <a:avLst/>
+          </a:prstGeom>
+          <a:ln>
+            <a:solidFill>
+              <a:schemeClr val="tx1">
+                <a:lumMod val="75000"/>
+                <a:lumOff val="25000"/>
+              </a:schemeClr>
+            </a:solidFill>
+            <a:headEnd type="none" w="med" len="med"/>
+            <a:tailEnd type="arrow" w="med" len="med"/>
+          </a:ln>
+        </p:spPr>
+        <p:style>
+          <a:lnRef idx="1">
+            <a:schemeClr val="accent1"/>
+          </a:lnRef>
+          <a:fillRef idx="0">
+            <a:schemeClr val="accent1"/>
+          </a:fillRef>
+          <a:effectRef idx="0">
+            <a:schemeClr val="accent1"/>
+          </a:effectRef>
+          <a:fontRef idx="minor">
+            <a:schemeClr val="tx1"/>
+          </a:fontRef>
+        </p:style>
+      </p:cxnSp>
+      <p:sp>
+        <p:nvSpPr>
+          <p:cNvPr id="47" name="CuadroTexto 46"/>
+          <p:cNvSpPr txBox="1"/>
+          <p:nvPr/>
+        </p:nvSpPr>
+        <p:spPr>
+          <a:xfrm>
+            <a:off x="1364705" y="4265822"/>
+            <a:ext cx="742960" cy="307777"/>
+          </a:xfrm>
+          <a:prstGeom prst="rect">
+            <a:avLst/>
+          </a:prstGeom>
+          <a:noFill/>
+        </p:spPr>
+        <p:txBody>
+          <a:bodyPr wrap="none" rtlCol="0">
+            <a:spAutoFit/>
+          </a:bodyPr>
+          <a:lstStyle/>
+          <a:p>
+            <a:r>
+              <a:rPr lang="es-ES" sz="1400" dirty="0" err="1" smtClean="0"/>
+              <a:t>request</a:t>
+            </a:r>
+            <a:endParaRPr lang="es-ES" sz="1400" dirty="0"/>
+          </a:p>
+        </p:txBody>
+      </p:sp>
+      <p:sp>
+        <p:nvSpPr>
+          <p:cNvPr id="48" name="CuadroTexto 47"/>
+          <p:cNvSpPr txBox="1"/>
+          <p:nvPr/>
+        </p:nvSpPr>
+        <p:spPr>
+          <a:xfrm>
+            <a:off x="1437221" y="5489035"/>
+            <a:ext cx="552587" cy="307777"/>
+          </a:xfrm>
+          <a:prstGeom prst="rect">
+            <a:avLst/>
+          </a:prstGeom>
+          <a:noFill/>
+        </p:spPr>
+        <p:txBody>
+          <a:bodyPr wrap="none" rtlCol="0">
+            <a:spAutoFit/>
+          </a:bodyPr>
+          <a:lstStyle/>
+          <a:p>
+            <a:r>
+              <a:rPr lang="es-ES" sz="1400" dirty="0" err="1" smtClean="0"/>
+              <a:t>reply</a:t>
+            </a:r>
+            <a:endParaRPr lang="es-ES" sz="1400" dirty="0"/>
+          </a:p>
+        </p:txBody>
+      </p:sp>
+      <p:cxnSp>
+        <p:nvCxnSpPr>
+          <p:cNvPr id="53" name="Conector recto 52"/>
+          <p:cNvCxnSpPr/>
+          <p:nvPr/>
+        </p:nvCxnSpPr>
+        <p:spPr>
+          <a:xfrm>
+            <a:off x="9285890" y="1692481"/>
+            <a:ext cx="0" cy="4238795"/>
+          </a:xfrm>
+          <a:prstGeom prst="line">
+            <a:avLst/>
+          </a:prstGeom>
+          <a:ln>
+            <a:solidFill>
+              <a:schemeClr val="bg2">
+                <a:lumMod val="25000"/>
+              </a:schemeClr>
+            </a:solidFill>
+            <a:prstDash val="dash"/>
+          </a:ln>
+        </p:spPr>
+        <p:style>
+          <a:lnRef idx="1">
+            <a:schemeClr val="accent1"/>
+          </a:lnRef>
+          <a:fillRef idx="0">
+            <a:schemeClr val="accent1"/>
+          </a:fillRef>
+          <a:effectRef idx="0">
+            <a:schemeClr val="accent1"/>
+          </a:effectRef>
+          <a:fontRef idx="minor">
+            <a:schemeClr val="tx1"/>
+          </a:fontRef>
+        </p:style>
+      </p:cxnSp>
+      <p:sp>
+        <p:nvSpPr>
+          <p:cNvPr id="54" name="Elipse 53"/>
+          <p:cNvSpPr/>
+          <p:nvPr/>
+        </p:nvSpPr>
+        <p:spPr>
+          <a:xfrm>
+            <a:off x="8429379" y="2995003"/>
+            <a:ext cx="287229" cy="1020137"/>
+          </a:xfrm>
+          <a:prstGeom prst="ellipse">
+            <a:avLst/>
+          </a:prstGeom>
+          <a:noFill/>
+          <a:ln>
+            <a:prstDash val="dash"/>
+          </a:ln>
+        </p:spPr>
+        <p:style>
+          <a:lnRef idx="2">
+            <a:schemeClr val="accent1">
+              <a:shade val="50000"/>
+            </a:schemeClr>
+          </a:lnRef>
+          <a:fillRef idx="1">
+            <a:schemeClr val="accent1"/>
+          </a:fillRef>
+          <a:effectRef idx="0">
+            <a:schemeClr val="accent1"/>
+          </a:effectRef>
+          <a:fontRef idx="minor">
+            <a:schemeClr val="lt1"/>
+          </a:fontRef>
+        </p:style>
+        <p:txBody>
+          <a:bodyPr rtlCol="0" anchor="ctr"/>
+          <a:lstStyle/>
+          <a:p>
+            <a:pPr algn="ctr"/>
+            <a:endParaRPr lang="es-ES"/>
+          </a:p>
+        </p:txBody>
+      </p:sp>
+      <p:sp>
+        <p:nvSpPr>
+          <p:cNvPr id="56" name="CuadroTexto 55"/>
+          <p:cNvSpPr txBox="1"/>
+          <p:nvPr/>
+        </p:nvSpPr>
+        <p:spPr>
+          <a:xfrm>
+            <a:off x="8296517" y="1743939"/>
+            <a:ext cx="742960" cy="307777"/>
+          </a:xfrm>
+          <a:prstGeom prst="rect">
+            <a:avLst/>
+          </a:prstGeom>
+          <a:noFill/>
+        </p:spPr>
+        <p:txBody>
+          <a:bodyPr wrap="none" rtlCol="0">
+            <a:spAutoFit/>
+          </a:bodyPr>
+          <a:lstStyle/>
+          <a:p>
+            <a:r>
+              <a:rPr lang="es-ES" sz="1400" dirty="0" err="1" smtClean="0"/>
+              <a:t>request</a:t>
+            </a:r>
+            <a:endParaRPr lang="es-ES" sz="1400" dirty="0"/>
+          </a:p>
+        </p:txBody>
+      </p:sp>
+      <p:sp>
+        <p:nvSpPr>
+          <p:cNvPr id="57" name="CuadroTexto 56"/>
+          <p:cNvSpPr txBox="1"/>
+          <p:nvPr/>
+        </p:nvSpPr>
+        <p:spPr>
+          <a:xfrm>
+            <a:off x="8451225" y="5482138"/>
+            <a:ext cx="552587" cy="307777"/>
+          </a:xfrm>
+          <a:prstGeom prst="rect">
+            <a:avLst/>
+          </a:prstGeom>
+          <a:noFill/>
+        </p:spPr>
+        <p:txBody>
+          <a:bodyPr wrap="none" rtlCol="0">
+            <a:spAutoFit/>
+          </a:bodyPr>
+          <a:lstStyle/>
+          <a:p>
+            <a:r>
+              <a:rPr lang="es-ES" sz="1400" dirty="0" err="1" smtClean="0"/>
+              <a:t>reply</a:t>
+            </a:r>
+            <a:endParaRPr lang="es-ES" sz="1400" dirty="0"/>
+          </a:p>
+        </p:txBody>
+      </p:sp>
+      <p:sp>
+        <p:nvSpPr>
+          <p:cNvPr id="3" name="Elipse 2"/>
+          <p:cNvSpPr/>
+          <p:nvPr/>
+        </p:nvSpPr>
+        <p:spPr>
+          <a:xfrm>
+            <a:off x="2144111" y="1436972"/>
+            <a:ext cx="499338" cy="436814"/>
+          </a:xfrm>
+          <a:prstGeom prst="ellipse">
+            <a:avLst/>
+          </a:prstGeom>
+          <a:solidFill>
+            <a:schemeClr val="accent2">
+              <a:lumMod val="60000"/>
+              <a:lumOff val="40000"/>
+            </a:schemeClr>
+          </a:solidFill>
+          <a:ln>
+            <a:noFill/>
+          </a:ln>
+        </p:spPr>
+        <p:style>
+          <a:lnRef idx="2">
+            <a:schemeClr val="accent1">
+              <a:shade val="50000"/>
+            </a:schemeClr>
+          </a:lnRef>
+          <a:fillRef idx="1">
+            <a:schemeClr val="accent1"/>
+          </a:fillRef>
+          <a:effectRef idx="0">
+            <a:schemeClr val="accent1"/>
+          </a:effectRef>
+          <a:fontRef idx="minor">
+            <a:schemeClr val="lt1"/>
+          </a:fontRef>
+        </p:style>
+        <p:txBody>
+          <a:bodyPr rtlCol="0" anchor="ctr"/>
+          <a:lstStyle/>
+          <a:p>
+            <a:pPr algn="ctr"/>
+            <a:r>
+              <a:rPr lang="es-ES" dirty="0" smtClean="0"/>
+              <a:t>1</a:t>
+            </a:r>
+            <a:endParaRPr lang="es-ES" dirty="0"/>
+          </a:p>
+        </p:txBody>
+      </p:sp>
+      <p:sp>
+        <p:nvSpPr>
+          <p:cNvPr id="38" name="Elipse 37"/>
+          <p:cNvSpPr/>
+          <p:nvPr/>
+        </p:nvSpPr>
+        <p:spPr>
+          <a:xfrm>
+            <a:off x="2140835" y="2963279"/>
+            <a:ext cx="499338" cy="436814"/>
+          </a:xfrm>
+          <a:prstGeom prst="ellipse">
+            <a:avLst/>
+          </a:prstGeom>
+          <a:solidFill>
+            <a:schemeClr val="accent2">
+              <a:lumMod val="60000"/>
+              <a:lumOff val="40000"/>
+            </a:schemeClr>
+          </a:solidFill>
+          <a:ln>
+            <a:noFill/>
+          </a:ln>
+        </p:spPr>
+        <p:style>
+          <a:lnRef idx="2">
+            <a:schemeClr val="accent1">
+              <a:shade val="50000"/>
+            </a:schemeClr>
+          </a:lnRef>
+          <a:fillRef idx="1">
+            <a:schemeClr val="accent1"/>
+          </a:fillRef>
+          <a:effectRef idx="0">
+            <a:schemeClr val="accent1"/>
+          </a:effectRef>
+          <a:fontRef idx="minor">
+            <a:schemeClr val="lt1"/>
+          </a:fontRef>
+        </p:style>
+        <p:txBody>
+          <a:bodyPr rtlCol="0" anchor="ctr"/>
+          <a:lstStyle/>
+          <a:p>
+            <a:pPr algn="ctr"/>
+            <a:r>
+              <a:rPr lang="es-ES" dirty="0"/>
+              <a:t>2</a:t>
+            </a:r>
+            <a:endParaRPr lang="es-ES" dirty="0"/>
+          </a:p>
+        </p:txBody>
+      </p:sp>
+      <p:sp>
+        <p:nvSpPr>
+          <p:cNvPr id="41" name="Elipse 40"/>
+          <p:cNvSpPr/>
+          <p:nvPr/>
+        </p:nvSpPr>
+        <p:spPr>
+          <a:xfrm>
+            <a:off x="1620481" y="3355041"/>
+            <a:ext cx="499338" cy="436814"/>
+          </a:xfrm>
+          <a:prstGeom prst="ellipse">
+            <a:avLst/>
+          </a:prstGeom>
+          <a:solidFill>
+            <a:schemeClr val="accent2">
+              <a:lumMod val="60000"/>
+              <a:lumOff val="40000"/>
+            </a:schemeClr>
+          </a:solidFill>
+          <a:ln>
+            <a:noFill/>
+          </a:ln>
+        </p:spPr>
+        <p:style>
+          <a:lnRef idx="2">
+            <a:schemeClr val="accent1">
+              <a:shade val="50000"/>
+            </a:schemeClr>
+          </a:lnRef>
+          <a:fillRef idx="1">
+            <a:schemeClr val="accent1"/>
+          </a:fillRef>
+          <a:effectRef idx="0">
+            <a:schemeClr val="accent1"/>
+          </a:effectRef>
+          <a:fontRef idx="minor">
+            <a:schemeClr val="lt1"/>
+          </a:fontRef>
+        </p:style>
+        <p:txBody>
+          <a:bodyPr rtlCol="0" anchor="ctr"/>
+          <a:lstStyle/>
+          <a:p>
+            <a:pPr algn="ctr"/>
+            <a:r>
+              <a:rPr lang="es-ES" dirty="0" smtClean="0"/>
+              <a:t>3</a:t>
+            </a:r>
+            <a:endParaRPr lang="es-ES" dirty="0"/>
+          </a:p>
+        </p:txBody>
+      </p:sp>
+      <p:sp>
+        <p:nvSpPr>
+          <p:cNvPr id="42" name="Elipse 41"/>
+          <p:cNvSpPr/>
+          <p:nvPr/>
+        </p:nvSpPr>
+        <p:spPr>
+          <a:xfrm>
+            <a:off x="2188301" y="5733923"/>
+            <a:ext cx="499338" cy="436814"/>
+          </a:xfrm>
+          <a:prstGeom prst="ellipse">
+            <a:avLst/>
+          </a:prstGeom>
+          <a:solidFill>
+            <a:schemeClr val="accent2">
+              <a:lumMod val="60000"/>
+              <a:lumOff val="40000"/>
+            </a:schemeClr>
+          </a:solidFill>
+          <a:ln>
+            <a:noFill/>
+          </a:ln>
+        </p:spPr>
+        <p:style>
+          <a:lnRef idx="2">
+            <a:schemeClr val="accent1">
+              <a:shade val="50000"/>
+            </a:schemeClr>
+          </a:lnRef>
+          <a:fillRef idx="1">
+            <a:schemeClr val="accent1"/>
+          </a:fillRef>
+          <a:effectRef idx="0">
+            <a:schemeClr val="accent1"/>
+          </a:effectRef>
+          <a:fontRef idx="minor">
+            <a:schemeClr val="lt1"/>
+          </a:fontRef>
+        </p:style>
+        <p:txBody>
+          <a:bodyPr rtlCol="0" anchor="ctr"/>
+          <a:lstStyle/>
+          <a:p>
+            <a:pPr algn="ctr"/>
+            <a:r>
+              <a:rPr lang="es-ES" dirty="0" smtClean="0"/>
+              <a:t>4</a:t>
+            </a:r>
+            <a:endParaRPr lang="es-ES" dirty="0"/>
+          </a:p>
+        </p:txBody>
+      </p:sp>
+      <p:sp>
+        <p:nvSpPr>
+          <p:cNvPr id="43" name="Elipse 42"/>
+          <p:cNvSpPr/>
+          <p:nvPr/>
+        </p:nvSpPr>
+        <p:spPr>
+          <a:xfrm>
+            <a:off x="2942997" y="3696007"/>
+            <a:ext cx="499338" cy="436814"/>
+          </a:xfrm>
+          <a:prstGeom prst="ellipse">
+            <a:avLst/>
+          </a:prstGeom>
+          <a:solidFill>
+            <a:schemeClr val="accent2">
+              <a:lumMod val="60000"/>
+              <a:lumOff val="40000"/>
+            </a:schemeClr>
+          </a:solidFill>
+          <a:ln>
+            <a:noFill/>
+          </a:ln>
+        </p:spPr>
+        <p:style>
+          <a:lnRef idx="2">
+            <a:schemeClr val="accent1">
+              <a:shade val="50000"/>
+            </a:schemeClr>
+          </a:lnRef>
+          <a:fillRef idx="1">
+            <a:schemeClr val="accent1"/>
+          </a:fillRef>
+          <a:effectRef idx="0">
+            <a:schemeClr val="accent1"/>
+          </a:effectRef>
+          <a:fontRef idx="minor">
+            <a:schemeClr val="lt1"/>
+          </a:fontRef>
+        </p:style>
+        <p:txBody>
+          <a:bodyPr rtlCol="0" anchor="ctr"/>
+          <a:lstStyle/>
+          <a:p>
+            <a:pPr algn="ctr"/>
+            <a:r>
+              <a:rPr lang="es-ES" dirty="0"/>
+              <a:t>5</a:t>
+            </a:r>
+            <a:endParaRPr lang="es-ES" dirty="0"/>
+          </a:p>
+        </p:txBody>
+      </p:sp>
+      <p:sp>
+        <p:nvSpPr>
+          <p:cNvPr id="45" name="Elipse 44"/>
+          <p:cNvSpPr/>
+          <p:nvPr/>
+        </p:nvSpPr>
+        <p:spPr>
+          <a:xfrm>
+            <a:off x="4276059" y="1456465"/>
+            <a:ext cx="499338" cy="436814"/>
+          </a:xfrm>
+          <a:prstGeom prst="ellipse">
+            <a:avLst/>
+          </a:prstGeom>
+          <a:solidFill>
+            <a:schemeClr val="accent2">
+              <a:lumMod val="60000"/>
+              <a:lumOff val="40000"/>
+            </a:schemeClr>
+          </a:solidFill>
+          <a:ln>
+            <a:noFill/>
+          </a:ln>
+        </p:spPr>
+        <p:style>
+          <a:lnRef idx="2">
+            <a:schemeClr val="accent1">
+              <a:shade val="50000"/>
+            </a:schemeClr>
+          </a:lnRef>
+          <a:fillRef idx="1">
+            <a:schemeClr val="accent1"/>
+          </a:fillRef>
+          <a:effectRef idx="0">
+            <a:schemeClr val="accent1"/>
+          </a:effectRef>
+          <a:fontRef idx="minor">
+            <a:schemeClr val="lt1"/>
+          </a:fontRef>
+        </p:style>
+        <p:txBody>
+          <a:bodyPr rtlCol="0" anchor="ctr"/>
+          <a:lstStyle/>
+          <a:p>
+            <a:pPr algn="ctr"/>
+            <a:r>
+              <a:rPr lang="es-ES" dirty="0" smtClean="0"/>
+              <a:t>6</a:t>
+            </a:r>
+            <a:endParaRPr lang="es-ES" dirty="0"/>
+          </a:p>
+        </p:txBody>
+      </p:sp>
+      <p:sp>
+        <p:nvSpPr>
+          <p:cNvPr id="49" name="Elipse 48"/>
+          <p:cNvSpPr/>
+          <p:nvPr/>
+        </p:nvSpPr>
+        <p:spPr>
+          <a:xfrm>
+            <a:off x="5265586" y="3468843"/>
+            <a:ext cx="499338" cy="436814"/>
+          </a:xfrm>
+          <a:prstGeom prst="ellipse">
+            <a:avLst/>
+          </a:prstGeom>
+          <a:solidFill>
+            <a:schemeClr val="accent2">
+              <a:lumMod val="60000"/>
+              <a:lumOff val="40000"/>
+            </a:schemeClr>
+          </a:solidFill>
+          <a:ln>
+            <a:noFill/>
+          </a:ln>
+        </p:spPr>
+        <p:style>
+          <a:lnRef idx="2">
+            <a:schemeClr val="accent1">
+              <a:shade val="50000"/>
+            </a:schemeClr>
+          </a:lnRef>
+          <a:fillRef idx="1">
+            <a:schemeClr val="accent1"/>
+          </a:fillRef>
+          <a:effectRef idx="0">
+            <a:schemeClr val="accent1"/>
+          </a:effectRef>
+          <a:fontRef idx="minor">
+            <a:schemeClr val="lt1"/>
+          </a:fontRef>
+        </p:style>
+        <p:txBody>
+          <a:bodyPr rtlCol="0" anchor="ctr"/>
+          <a:lstStyle/>
+          <a:p>
+            <a:pPr algn="ctr"/>
+            <a:r>
+              <a:rPr lang="es-ES" dirty="0"/>
+              <a:t>7</a:t>
+            </a:r>
+            <a:endParaRPr lang="es-ES" dirty="0"/>
+          </a:p>
+        </p:txBody>
+      </p:sp>
+      <p:sp>
+        <p:nvSpPr>
+          <p:cNvPr id="50" name="Elipse 49"/>
+          <p:cNvSpPr/>
+          <p:nvPr/>
+        </p:nvSpPr>
+        <p:spPr>
+          <a:xfrm>
+            <a:off x="5265586" y="3920185"/>
+            <a:ext cx="499338" cy="436814"/>
+          </a:xfrm>
+          <a:prstGeom prst="ellipse">
+            <a:avLst/>
+          </a:prstGeom>
+          <a:solidFill>
+            <a:schemeClr val="accent2">
+              <a:lumMod val="60000"/>
+              <a:lumOff val="40000"/>
+            </a:schemeClr>
+          </a:solidFill>
+          <a:ln>
+            <a:noFill/>
+          </a:ln>
+        </p:spPr>
+        <p:style>
+          <a:lnRef idx="2">
+            <a:schemeClr val="accent1">
+              <a:shade val="50000"/>
+            </a:schemeClr>
+          </a:lnRef>
+          <a:fillRef idx="1">
+            <a:schemeClr val="accent1"/>
+          </a:fillRef>
+          <a:effectRef idx="0">
+            <a:schemeClr val="accent1"/>
+          </a:effectRef>
+          <a:fontRef idx="minor">
+            <a:schemeClr val="lt1"/>
+          </a:fontRef>
+        </p:style>
+        <p:txBody>
+          <a:bodyPr rtlCol="0" anchor="ctr"/>
+          <a:lstStyle/>
+          <a:p>
+            <a:pPr algn="ctr"/>
+            <a:r>
+              <a:rPr lang="es-ES" dirty="0" smtClean="0"/>
+              <a:t>8</a:t>
+            </a:r>
+            <a:endParaRPr lang="es-ES" dirty="0"/>
+          </a:p>
+        </p:txBody>
+      </p:sp>
+      <p:sp>
+        <p:nvSpPr>
+          <p:cNvPr id="52" name="Elipse 51"/>
+          <p:cNvSpPr/>
+          <p:nvPr/>
+        </p:nvSpPr>
+        <p:spPr>
+          <a:xfrm>
+            <a:off x="8593114" y="4844281"/>
+            <a:ext cx="499338" cy="436814"/>
+          </a:xfrm>
+          <a:prstGeom prst="ellipse">
+            <a:avLst/>
+          </a:prstGeom>
+          <a:solidFill>
+            <a:schemeClr val="accent2">
+              <a:lumMod val="60000"/>
+              <a:lumOff val="40000"/>
+            </a:schemeClr>
+          </a:solidFill>
+          <a:ln>
+            <a:noFill/>
+          </a:ln>
+        </p:spPr>
+        <p:style>
+          <a:lnRef idx="2">
+            <a:schemeClr val="accent1">
+              <a:shade val="50000"/>
+            </a:schemeClr>
+          </a:lnRef>
+          <a:fillRef idx="1">
+            <a:schemeClr val="accent1"/>
+          </a:fillRef>
+          <a:effectRef idx="0">
+            <a:schemeClr val="accent1"/>
+          </a:effectRef>
+          <a:fontRef idx="minor">
+            <a:schemeClr val="lt1"/>
+          </a:fontRef>
+        </p:style>
+        <p:txBody>
+          <a:bodyPr rtlCol="0" anchor="ctr"/>
+          <a:lstStyle/>
+          <a:p>
+            <a:pPr algn="ctr"/>
+            <a:r>
+              <a:rPr lang="es-ES" dirty="0"/>
+              <a:t>9</a:t>
+            </a:r>
+            <a:endParaRPr lang="es-ES" dirty="0"/>
+          </a:p>
+        </p:txBody>
+      </p:sp>
+      <p:sp>
+        <p:nvSpPr>
+          <p:cNvPr id="55" name="Elipse 54"/>
+          <p:cNvSpPr/>
+          <p:nvPr/>
+        </p:nvSpPr>
+        <p:spPr>
+          <a:xfrm>
+            <a:off x="7762967" y="2712767"/>
+            <a:ext cx="499338" cy="436814"/>
+          </a:xfrm>
+          <a:prstGeom prst="ellipse">
+            <a:avLst/>
+          </a:prstGeom>
+          <a:solidFill>
+            <a:schemeClr val="accent2">
+              <a:lumMod val="60000"/>
+              <a:lumOff val="40000"/>
+            </a:schemeClr>
+          </a:solidFill>
+          <a:ln>
+            <a:noFill/>
+          </a:ln>
+        </p:spPr>
+        <p:style>
+          <a:lnRef idx="2">
+            <a:schemeClr val="accent1">
+              <a:shade val="50000"/>
+            </a:schemeClr>
+          </a:lnRef>
+          <a:fillRef idx="1">
+            <a:schemeClr val="accent1"/>
+          </a:fillRef>
+          <a:effectRef idx="0">
+            <a:schemeClr val="accent1"/>
+          </a:effectRef>
+          <a:fontRef idx="minor">
+            <a:schemeClr val="lt1"/>
+          </a:fontRef>
+        </p:style>
+        <p:txBody>
+          <a:bodyPr rtlCol="0" anchor="ctr"/>
+          <a:lstStyle/>
+          <a:p>
+            <a:pPr algn="ctr"/>
+            <a:r>
+              <a:rPr lang="es-ES" sz="1200" dirty="0" smtClean="0"/>
+              <a:t>11</a:t>
+            </a:r>
+            <a:endParaRPr lang="es-ES" sz="1200" dirty="0"/>
+          </a:p>
+        </p:txBody>
+      </p:sp>
+      <p:sp>
+        <p:nvSpPr>
+          <p:cNvPr id="58" name="Elipse 57"/>
+          <p:cNvSpPr/>
+          <p:nvPr/>
+        </p:nvSpPr>
+        <p:spPr>
+          <a:xfrm>
+            <a:off x="7152246" y="2712767"/>
+            <a:ext cx="499338" cy="436814"/>
+          </a:xfrm>
+          <a:prstGeom prst="ellipse">
+            <a:avLst/>
+          </a:prstGeom>
+          <a:solidFill>
+            <a:schemeClr val="accent2">
+              <a:lumMod val="60000"/>
+              <a:lumOff val="40000"/>
+            </a:schemeClr>
+          </a:solidFill>
+          <a:ln>
+            <a:noFill/>
+          </a:ln>
+        </p:spPr>
+        <p:style>
+          <a:lnRef idx="2">
+            <a:schemeClr val="accent1">
+              <a:shade val="50000"/>
+            </a:schemeClr>
+          </a:lnRef>
+          <a:fillRef idx="1">
+            <a:schemeClr val="accent1"/>
+          </a:fillRef>
+          <a:effectRef idx="0">
+            <a:schemeClr val="accent1"/>
+          </a:effectRef>
+          <a:fontRef idx="minor">
+            <a:schemeClr val="lt1"/>
+          </a:fontRef>
+        </p:style>
+        <p:txBody>
+          <a:bodyPr rtlCol="0" anchor="ctr"/>
+          <a:lstStyle/>
+          <a:p>
+            <a:pPr algn="ctr"/>
+            <a:r>
+              <a:rPr lang="es-ES" sz="1200" dirty="0" smtClean="0"/>
+              <a:t>10</a:t>
+            </a:r>
+            <a:endParaRPr lang="es-ES" sz="1200" dirty="0"/>
+          </a:p>
+        </p:txBody>
+      </p:sp>
+    </p:spTree>
+    <p:extLst>
+      <p:ext uri="{BB962C8B-B14F-4D97-AF65-F5344CB8AC3E}">
+        <p14:creationId xmlns:p14="http://schemas.microsoft.com/office/powerpoint/2010/main" val="4231318977"/>
+      </p:ext>
+    </p:extLst>
+  </p:cSld>
+  <p:clrMapOvr>
+    <a:masterClrMapping/>
+  </p:clrMapOvr>
+  <mc:AlternateContent xmlns:mc="http://schemas.openxmlformats.org/markup-compatibility/2006" xmlns:p14="http://schemas.microsoft.com/office/powerpoint/2010/main">
+    <mc:Choice Requires="p14">
+      <p:transition spd="slow" p14:dur="2000"/>
+    </mc:Choice>
+    <mc:Fallback xmlns="">
+      <p:transition spd="slow"/>
+    </mc:Fallback>
+  </mc:AlternateContent>
+</p:sld>
+</file>
+
+<file path=ppt/slides/slide4.xml><?xml version="1.0" encoding="utf-8"?>
+<p:sld xmlns:a="http://schemas.openxmlformats.org/drawingml/2006/main" xmlns:r="http://schemas.openxmlformats.org/officeDocument/2006/relationships" xmlns:p="http://schemas.openxmlformats.org/presentationml/2006/main">
+  <p:cSld>
+    <p:spTree>
+      <p:nvGrpSpPr>
+        <p:cNvPr id="1" name=""/>
+        <p:cNvGrpSpPr/>
+        <p:nvPr/>
+      </p:nvGrpSpPr>
+      <p:grpSpPr>
+        <a:xfrm>
+          <a:off x="0" y="0"/>
+          <a:ext cx="0" cy="0"/>
+          <a:chOff x="0" y="0"/>
+          <a:chExt cx="0" cy="0"/>
+        </a:xfrm>
+      </p:grpSpPr>
+      <p:sp>
+        <p:nvSpPr>
+          <p:cNvPr id="34" name="Rectángulo 33"/>
+          <p:cNvSpPr/>
+          <p:nvPr/>
+        </p:nvSpPr>
+        <p:spPr>
+          <a:xfrm>
+            <a:off x="314733" y="361673"/>
+            <a:ext cx="3224546" cy="2203676"/>
+          </a:xfrm>
+          <a:prstGeom prst="rect">
+            <a:avLst/>
+          </a:prstGeom>
+        </p:spPr>
+        <p:style>
+          <a:lnRef idx="2">
+            <a:schemeClr val="accent1">
+              <a:shade val="50000"/>
+            </a:schemeClr>
+          </a:lnRef>
+          <a:fillRef idx="1">
+            <a:schemeClr val="accent1"/>
+          </a:fillRef>
+          <a:effectRef idx="0">
+            <a:schemeClr val="accent1"/>
+          </a:effectRef>
+          <a:fontRef idx="minor">
+            <a:schemeClr val="lt1"/>
+          </a:fontRef>
+        </p:style>
+        <p:txBody>
+          <a:bodyPr rtlCol="0" anchor="ctr"/>
+          <a:lstStyle/>
+          <a:p>
+            <a:pPr algn="ctr"/>
+            <a:endParaRPr lang="es-ES" dirty="0"/>
+          </a:p>
+        </p:txBody>
+      </p:sp>
+      <p:sp>
+        <p:nvSpPr>
+          <p:cNvPr id="42" name="Rectángulo 41"/>
+          <p:cNvSpPr/>
+          <p:nvPr/>
+        </p:nvSpPr>
+        <p:spPr>
+          <a:xfrm>
+            <a:off x="273480" y="461809"/>
+            <a:ext cx="3176810" cy="2203676"/>
+          </a:xfrm>
+          <a:prstGeom prst="rect">
+            <a:avLst/>
+          </a:prstGeom>
+        </p:spPr>
+        <p:style>
+          <a:lnRef idx="2">
+            <a:schemeClr val="accent1">
+              <a:shade val="50000"/>
+            </a:schemeClr>
+          </a:lnRef>
+          <a:fillRef idx="1">
+            <a:schemeClr val="accent1"/>
+          </a:fillRef>
+          <a:effectRef idx="0">
+            <a:schemeClr val="accent1"/>
+          </a:effectRef>
+          <a:fontRef idx="minor">
+            <a:schemeClr val="lt1"/>
+          </a:fontRef>
+        </p:style>
+        <p:txBody>
+          <a:bodyPr rtlCol="0" anchor="ctr"/>
+          <a:lstStyle/>
+          <a:p>
+            <a:pPr algn="ctr"/>
+            <a:endParaRPr lang="es-ES" dirty="0"/>
+          </a:p>
+        </p:txBody>
+      </p:sp>
+      <p:sp>
+        <p:nvSpPr>
+          <p:cNvPr id="36" name="Rectángulo 35"/>
+          <p:cNvSpPr/>
+          <p:nvPr/>
+        </p:nvSpPr>
+        <p:spPr>
+          <a:xfrm>
+            <a:off x="3770137" y="353894"/>
+            <a:ext cx="2915731" cy="2244051"/>
+          </a:xfrm>
+          <a:prstGeom prst="rect">
+            <a:avLst/>
+          </a:prstGeom>
+        </p:spPr>
+        <p:style>
+          <a:lnRef idx="2">
+            <a:schemeClr val="accent1">
+              <a:shade val="50000"/>
+            </a:schemeClr>
+          </a:lnRef>
+          <a:fillRef idx="1">
+            <a:schemeClr val="accent1"/>
+          </a:fillRef>
+          <a:effectRef idx="0">
+            <a:schemeClr val="accent1"/>
+          </a:effectRef>
+          <a:fontRef idx="minor">
+            <a:schemeClr val="lt1"/>
+          </a:fontRef>
+        </p:style>
+        <p:txBody>
+          <a:bodyPr rtlCol="0" anchor="ctr"/>
+          <a:lstStyle/>
+          <a:p>
+            <a:pPr algn="ctr"/>
+            <a:endParaRPr lang="es-ES" dirty="0"/>
+          </a:p>
+        </p:txBody>
+      </p:sp>
+      <p:sp>
+        <p:nvSpPr>
+          <p:cNvPr id="28" name="Rectángulo 27"/>
+          <p:cNvSpPr/>
+          <p:nvPr/>
+        </p:nvSpPr>
+        <p:spPr>
+          <a:xfrm>
+            <a:off x="3696480" y="472963"/>
+            <a:ext cx="2915731" cy="2244051"/>
+          </a:xfrm>
+          <a:prstGeom prst="rect">
+            <a:avLst/>
+          </a:prstGeom>
+        </p:spPr>
+        <p:style>
+          <a:lnRef idx="2">
+            <a:schemeClr val="accent1">
+              <a:shade val="50000"/>
+            </a:schemeClr>
+          </a:lnRef>
+          <a:fillRef idx="1">
+            <a:schemeClr val="accent1"/>
+          </a:fillRef>
+          <a:effectRef idx="0">
+            <a:schemeClr val="accent1"/>
+          </a:effectRef>
+          <a:fontRef idx="minor">
+            <a:schemeClr val="lt1"/>
+          </a:fontRef>
+        </p:style>
+        <p:txBody>
+          <a:bodyPr rtlCol="0" anchor="ctr"/>
+          <a:lstStyle/>
+          <a:p>
+            <a:pPr algn="ctr"/>
+            <a:endParaRPr lang="es-ES" dirty="0"/>
+          </a:p>
+        </p:txBody>
+      </p:sp>
+      <p:sp>
+        <p:nvSpPr>
+          <p:cNvPr id="2" name="Rectángulo 1"/>
+          <p:cNvSpPr/>
+          <p:nvPr/>
+        </p:nvSpPr>
+        <p:spPr>
+          <a:xfrm>
+            <a:off x="262849" y="2797703"/>
+            <a:ext cx="3201741" cy="4233716"/>
+          </a:xfrm>
+          <a:prstGeom prst="rect">
+            <a:avLst/>
+          </a:prstGeom>
+        </p:spPr>
+        <p:style>
+          <a:lnRef idx="2">
+            <a:schemeClr val="accent1">
+              <a:shade val="50000"/>
+            </a:schemeClr>
+          </a:lnRef>
+          <a:fillRef idx="1">
+            <a:schemeClr val="accent1"/>
+          </a:fillRef>
+          <a:effectRef idx="0">
+            <a:schemeClr val="accent1"/>
+          </a:effectRef>
+          <a:fontRef idx="minor">
+            <a:schemeClr val="lt1"/>
+          </a:fontRef>
+        </p:style>
+        <p:txBody>
+          <a:bodyPr rtlCol="0" anchor="ctr"/>
+          <a:lstStyle/>
+          <a:p>
+            <a:pPr algn="ctr"/>
+            <a:endParaRPr lang="es-ES" dirty="0"/>
+          </a:p>
+        </p:txBody>
+      </p:sp>
+      <p:sp>
+        <p:nvSpPr>
+          <p:cNvPr id="4" name="Rectángulo 3"/>
+          <p:cNvSpPr/>
+          <p:nvPr/>
+        </p:nvSpPr>
+        <p:spPr>
+          <a:xfrm>
+            <a:off x="3689131" y="2797703"/>
+            <a:ext cx="2923080" cy="4233717"/>
+          </a:xfrm>
+          <a:prstGeom prst="rect">
+            <a:avLst/>
+          </a:prstGeom>
+        </p:spPr>
+        <p:style>
+          <a:lnRef idx="2">
+            <a:schemeClr val="accent1">
+              <a:shade val="50000"/>
+            </a:schemeClr>
+          </a:lnRef>
+          <a:fillRef idx="1">
+            <a:schemeClr val="accent1"/>
+          </a:fillRef>
+          <a:effectRef idx="0">
+            <a:schemeClr val="accent1"/>
+          </a:effectRef>
+          <a:fontRef idx="minor">
+            <a:schemeClr val="lt1"/>
+          </a:fontRef>
+        </p:style>
+        <p:txBody>
+          <a:bodyPr rtlCol="0" anchor="ctr"/>
+          <a:lstStyle/>
+          <a:p>
+            <a:pPr algn="ctr"/>
+            <a:endParaRPr lang="es-ES" dirty="0"/>
+          </a:p>
+        </p:txBody>
+      </p:sp>
+      <p:sp>
+        <p:nvSpPr>
+          <p:cNvPr id="5" name="Rectángulo 4"/>
+          <p:cNvSpPr/>
+          <p:nvPr/>
+        </p:nvSpPr>
+        <p:spPr>
+          <a:xfrm>
+            <a:off x="6834977" y="472964"/>
+            <a:ext cx="2923080" cy="6558455"/>
+          </a:xfrm>
+          <a:prstGeom prst="rect">
+            <a:avLst/>
+          </a:prstGeom>
+        </p:spPr>
+        <p:style>
+          <a:lnRef idx="2">
+            <a:schemeClr val="accent1">
+              <a:shade val="50000"/>
+            </a:schemeClr>
+          </a:lnRef>
+          <a:fillRef idx="1">
+            <a:schemeClr val="accent1"/>
+          </a:fillRef>
+          <a:effectRef idx="0">
+            <a:schemeClr val="accent1"/>
+          </a:effectRef>
+          <a:fontRef idx="minor">
+            <a:schemeClr val="lt1"/>
+          </a:fontRef>
+        </p:style>
+        <p:txBody>
+          <a:bodyPr rtlCol="0" anchor="ctr"/>
+          <a:lstStyle/>
+          <a:p>
+            <a:pPr algn="ctr"/>
+            <a:endParaRPr lang="es-ES"/>
+          </a:p>
+        </p:txBody>
+      </p:sp>
+      <p:sp>
+        <p:nvSpPr>
+          <p:cNvPr id="6" name="CuadroTexto 5"/>
+          <p:cNvSpPr txBox="1"/>
+          <p:nvPr/>
+        </p:nvSpPr>
+        <p:spPr>
+          <a:xfrm>
+            <a:off x="1088630" y="6356936"/>
+            <a:ext cx="2042419" cy="523220"/>
+          </a:xfrm>
+          <a:prstGeom prst="rect">
+            <a:avLst/>
+          </a:prstGeom>
+          <a:noFill/>
+        </p:spPr>
+        <p:txBody>
+          <a:bodyPr wrap="none" rtlCol="0">
+            <a:spAutoFit/>
+          </a:bodyPr>
+          <a:lstStyle/>
+          <a:p>
+            <a:r>
+              <a:rPr lang="es-ES" sz="2800" b="1" dirty="0" err="1" smtClean="0"/>
+              <a:t>RadiusClient</a:t>
+            </a:r>
+            <a:endParaRPr lang="es-ES" sz="2800" b="1" dirty="0"/>
+          </a:p>
+        </p:txBody>
+      </p:sp>
+      <p:sp>
+        <p:nvSpPr>
+          <p:cNvPr id="7" name="CuadroTexto 6"/>
+          <p:cNvSpPr txBox="1"/>
+          <p:nvPr/>
+        </p:nvSpPr>
+        <p:spPr>
+          <a:xfrm>
+            <a:off x="4224863" y="6302795"/>
+            <a:ext cx="2087687" cy="523220"/>
+          </a:xfrm>
+          <a:prstGeom prst="rect">
+            <a:avLst/>
+          </a:prstGeom>
+          <a:noFill/>
+        </p:spPr>
+        <p:txBody>
+          <a:bodyPr wrap="none" rtlCol="0">
+            <a:spAutoFit/>
+          </a:bodyPr>
+          <a:lstStyle/>
+          <a:p>
+            <a:r>
+              <a:rPr lang="es-ES" sz="2800" b="1" dirty="0" err="1" smtClean="0"/>
+              <a:t>Router</a:t>
+            </a:r>
+            <a:r>
+              <a:rPr lang="es-ES" sz="2800" b="1" dirty="0" smtClean="0"/>
+              <a:t> Actor</a:t>
+            </a:r>
+            <a:endParaRPr lang="es-ES" sz="2800" b="1" dirty="0"/>
+          </a:p>
+        </p:txBody>
+      </p:sp>
+      <p:sp>
+        <p:nvSpPr>
+          <p:cNvPr id="8" name="CuadroTexto 7"/>
+          <p:cNvSpPr txBox="1"/>
+          <p:nvPr/>
+        </p:nvSpPr>
+        <p:spPr>
+          <a:xfrm>
+            <a:off x="7140524" y="614856"/>
+            <a:ext cx="2263440" cy="523220"/>
+          </a:xfrm>
+          <a:prstGeom prst="rect">
+            <a:avLst/>
+          </a:prstGeom>
+          <a:noFill/>
+        </p:spPr>
+        <p:txBody>
+          <a:bodyPr wrap="none" rtlCol="0">
+            <a:spAutoFit/>
+          </a:bodyPr>
+          <a:lstStyle/>
+          <a:p>
+            <a:r>
+              <a:rPr lang="es-ES" sz="2800" b="1" dirty="0" err="1" smtClean="0"/>
+              <a:t>Handler</a:t>
+            </a:r>
+            <a:r>
+              <a:rPr lang="es-ES" sz="2800" b="1" dirty="0" smtClean="0"/>
+              <a:t> Actor</a:t>
+            </a:r>
+            <a:endParaRPr lang="es-ES" sz="2800" b="1" dirty="0"/>
+          </a:p>
+        </p:txBody>
+      </p:sp>
+      <p:cxnSp>
+        <p:nvCxnSpPr>
+          <p:cNvPr id="26" name="Conector recto 25"/>
+          <p:cNvCxnSpPr/>
+          <p:nvPr/>
+        </p:nvCxnSpPr>
+        <p:spPr>
+          <a:xfrm flipV="1">
+            <a:off x="5386132" y="3315504"/>
+            <a:ext cx="3520966" cy="4132"/>
+          </a:xfrm>
+          <a:prstGeom prst="line">
+            <a:avLst/>
+          </a:prstGeom>
+          <a:ln>
+            <a:solidFill>
+              <a:schemeClr val="tx1">
+                <a:lumMod val="75000"/>
+                <a:lumOff val="25000"/>
+              </a:schemeClr>
+            </a:solidFill>
+            <a:headEnd type="none" w="med" len="med"/>
+            <a:tailEnd type="arrow" w="med" len="med"/>
+          </a:ln>
+        </p:spPr>
+        <p:style>
+          <a:lnRef idx="1">
+            <a:schemeClr val="accent1"/>
+          </a:lnRef>
+          <a:fillRef idx="0">
+            <a:schemeClr val="accent1"/>
+          </a:fillRef>
+          <a:effectRef idx="0">
+            <a:schemeClr val="accent1"/>
+          </a:effectRef>
+          <a:fontRef idx="minor">
+            <a:schemeClr val="tx1"/>
+          </a:fontRef>
+        </p:style>
+      </p:cxnSp>
+      <p:cxnSp>
+        <p:nvCxnSpPr>
+          <p:cNvPr id="27" name="Conector recto 26"/>
+          <p:cNvCxnSpPr/>
+          <p:nvPr/>
+        </p:nvCxnSpPr>
+        <p:spPr>
+          <a:xfrm>
+            <a:off x="6071688" y="1751736"/>
+            <a:ext cx="2835410" cy="0"/>
+          </a:xfrm>
+          <a:prstGeom prst="line">
+            <a:avLst/>
+          </a:prstGeom>
+          <a:ln>
+            <a:solidFill>
+              <a:schemeClr val="tx1">
+                <a:lumMod val="75000"/>
+                <a:lumOff val="25000"/>
+              </a:schemeClr>
+            </a:solidFill>
+            <a:headEnd type="arrow" w="med" len="med"/>
+            <a:tailEnd type="none" w="med" len="med"/>
+          </a:ln>
+        </p:spPr>
+        <p:style>
+          <a:lnRef idx="1">
+            <a:schemeClr val="accent1"/>
+          </a:lnRef>
+          <a:fillRef idx="0">
+            <a:schemeClr val="accent1"/>
+          </a:fillRef>
+          <a:effectRef idx="0">
+            <a:schemeClr val="accent1"/>
+          </a:effectRef>
+          <a:fontRef idx="minor">
+            <a:schemeClr val="tx1"/>
+          </a:fontRef>
+        </p:style>
+      </p:cxnSp>
+      <p:sp>
+        <p:nvSpPr>
+          <p:cNvPr id="31" name="CuadroTexto 30"/>
+          <p:cNvSpPr txBox="1"/>
+          <p:nvPr/>
+        </p:nvSpPr>
+        <p:spPr>
+          <a:xfrm>
+            <a:off x="6991415" y="1295855"/>
+            <a:ext cx="3508372" cy="338554"/>
+          </a:xfrm>
+          <a:prstGeom prst="rect">
+            <a:avLst/>
+          </a:prstGeom>
+          <a:solidFill>
+            <a:schemeClr val="accent1">
+              <a:lumMod val="40000"/>
+              <a:lumOff val="60000"/>
+            </a:schemeClr>
+          </a:solidFill>
+        </p:spPr>
+        <p:txBody>
+          <a:bodyPr wrap="square" rtlCol="0">
+            <a:spAutoFit/>
+          </a:bodyPr>
+          <a:lstStyle/>
+          <a:p>
+            <a:pPr algn="ctr"/>
+            <a:r>
+              <a:rPr lang="es-ES" sz="1600" dirty="0" err="1" smtClean="0"/>
+              <a:t>RadiusServerResponse</a:t>
+            </a:r>
+            <a:r>
+              <a:rPr lang="es-ES" sz="1600" dirty="0" smtClean="0"/>
+              <a:t>(</a:t>
+            </a:r>
+            <a:r>
+              <a:rPr lang="es-ES" sz="1600" dirty="0" err="1" smtClean="0"/>
+              <a:t>packet</a:t>
+            </a:r>
+            <a:r>
+              <a:rPr lang="es-ES" sz="1600" dirty="0" smtClean="0"/>
+              <a:t>, </a:t>
+            </a:r>
+            <a:r>
+              <a:rPr lang="es-ES" sz="1600" dirty="0" err="1" smtClean="0"/>
+              <a:t>origin</a:t>
+            </a:r>
+            <a:r>
+              <a:rPr lang="es-ES" sz="1600" dirty="0" smtClean="0"/>
+              <a:t>)</a:t>
+            </a:r>
+            <a:endParaRPr lang="es-ES" sz="1600" dirty="0"/>
+          </a:p>
+        </p:txBody>
+      </p:sp>
+      <p:cxnSp>
+        <p:nvCxnSpPr>
+          <p:cNvPr id="33" name="Conector recto 32"/>
+          <p:cNvCxnSpPr/>
+          <p:nvPr/>
+        </p:nvCxnSpPr>
+        <p:spPr>
+          <a:xfrm>
+            <a:off x="5740794" y="5358888"/>
+            <a:ext cx="3553297" cy="0"/>
+          </a:xfrm>
+          <a:prstGeom prst="line">
+            <a:avLst/>
+          </a:prstGeom>
+          <a:ln>
+            <a:solidFill>
+              <a:schemeClr val="tx1">
+                <a:lumMod val="75000"/>
+                <a:lumOff val="25000"/>
+              </a:schemeClr>
+            </a:solidFill>
+            <a:headEnd type="arrow" w="med" len="med"/>
+            <a:tailEnd type="none" w="med" len="med"/>
+          </a:ln>
+        </p:spPr>
+        <p:style>
+          <a:lnRef idx="1">
+            <a:schemeClr val="accent1"/>
+          </a:lnRef>
+          <a:fillRef idx="0">
+            <a:schemeClr val="accent1"/>
+          </a:fillRef>
+          <a:effectRef idx="0">
+            <a:schemeClr val="accent1"/>
+          </a:effectRef>
+          <a:fontRef idx="minor">
+            <a:schemeClr val="tx1"/>
+          </a:fontRef>
+        </p:style>
+      </p:cxnSp>
+      <p:cxnSp>
+        <p:nvCxnSpPr>
+          <p:cNvPr id="37" name="Conector recto 36"/>
+          <p:cNvCxnSpPr/>
+          <p:nvPr/>
+        </p:nvCxnSpPr>
+        <p:spPr>
+          <a:xfrm>
+            <a:off x="693683" y="5358888"/>
+            <a:ext cx="3693256" cy="0"/>
+          </a:xfrm>
+          <a:prstGeom prst="line">
+            <a:avLst/>
+          </a:prstGeom>
+          <a:ln>
+            <a:solidFill>
+              <a:schemeClr val="tx1">
+                <a:lumMod val="75000"/>
+                <a:lumOff val="25000"/>
+              </a:schemeClr>
+            </a:solidFill>
+            <a:headEnd type="arrow" w="med" len="med"/>
+            <a:tailEnd type="none" w="med" len="med"/>
+          </a:ln>
+        </p:spPr>
+        <p:style>
+          <a:lnRef idx="1">
+            <a:schemeClr val="accent1"/>
+          </a:lnRef>
+          <a:fillRef idx="0">
+            <a:schemeClr val="accent1"/>
+          </a:fillRef>
+          <a:effectRef idx="0">
+            <a:schemeClr val="accent1"/>
+          </a:effectRef>
+          <a:fontRef idx="minor">
+            <a:schemeClr val="tx1"/>
+          </a:fontRef>
+        </p:style>
+      </p:cxnSp>
+      <p:sp>
+        <p:nvSpPr>
+          <p:cNvPr id="44" name="Elipse 43"/>
+          <p:cNvSpPr/>
+          <p:nvPr/>
+        </p:nvSpPr>
+        <p:spPr>
+          <a:xfrm>
+            <a:off x="4059920" y="1320181"/>
+            <a:ext cx="1998534" cy="863111"/>
+          </a:xfrm>
+          <a:prstGeom prst="ellipse">
+            <a:avLst/>
+          </a:prstGeom>
+          <a:solidFill>
+            <a:schemeClr val="accent1">
+              <a:lumMod val="60000"/>
+              <a:lumOff val="40000"/>
+            </a:schemeClr>
+          </a:solidFill>
+        </p:spPr>
+        <p:style>
+          <a:lnRef idx="2">
+            <a:schemeClr val="accent1">
+              <a:shade val="50000"/>
+            </a:schemeClr>
+          </a:lnRef>
+          <a:fillRef idx="1">
+            <a:schemeClr val="accent1"/>
+          </a:fillRef>
+          <a:effectRef idx="0">
+            <a:schemeClr val="accent1"/>
+          </a:effectRef>
+          <a:fontRef idx="minor">
+            <a:schemeClr val="lt1"/>
+          </a:fontRef>
+        </p:style>
+        <p:txBody>
+          <a:bodyPr rtlCol="0" anchor="ctr"/>
+          <a:lstStyle/>
+          <a:p>
+            <a:pPr algn="ctr"/>
+            <a:r>
+              <a:rPr lang="es-ES" dirty="0" smtClean="0">
+                <a:solidFill>
+                  <a:schemeClr val="tx1"/>
+                </a:solidFill>
+              </a:rPr>
+              <a:t>Server Socket</a:t>
+            </a:r>
+            <a:endParaRPr lang="es-ES" dirty="0">
+              <a:solidFill>
+                <a:schemeClr val="tx1"/>
+              </a:solidFill>
+            </a:endParaRPr>
+          </a:p>
+        </p:txBody>
+      </p:sp>
+      <p:cxnSp>
+        <p:nvCxnSpPr>
+          <p:cNvPr id="53" name="Conector recto 52"/>
+          <p:cNvCxnSpPr/>
+          <p:nvPr/>
+        </p:nvCxnSpPr>
+        <p:spPr>
+          <a:xfrm>
+            <a:off x="8907098" y="1855635"/>
+            <a:ext cx="0" cy="1429776"/>
+          </a:xfrm>
+          <a:prstGeom prst="line">
+            <a:avLst/>
+          </a:prstGeom>
+          <a:ln>
+            <a:solidFill>
+              <a:schemeClr val="bg2">
+                <a:lumMod val="25000"/>
+              </a:schemeClr>
+            </a:solidFill>
+            <a:prstDash val="dash"/>
+          </a:ln>
+        </p:spPr>
+        <p:style>
+          <a:lnRef idx="1">
+            <a:schemeClr val="accent1"/>
+          </a:lnRef>
+          <a:fillRef idx="0">
+            <a:schemeClr val="accent1"/>
+          </a:fillRef>
+          <a:effectRef idx="0">
+            <a:schemeClr val="accent1"/>
+          </a:effectRef>
+          <a:fontRef idx="minor">
+            <a:schemeClr val="tx1"/>
+          </a:fontRef>
+        </p:style>
+      </p:cxnSp>
+      <p:sp>
+        <p:nvSpPr>
+          <p:cNvPr id="54" name="Elipse 53"/>
+          <p:cNvSpPr/>
+          <p:nvPr/>
+        </p:nvSpPr>
+        <p:spPr>
+          <a:xfrm>
+            <a:off x="9175531" y="4328663"/>
+            <a:ext cx="262175" cy="1063144"/>
+          </a:xfrm>
+          <a:prstGeom prst="ellipse">
+            <a:avLst/>
+          </a:prstGeom>
+          <a:noFill/>
+          <a:ln>
+            <a:prstDash val="dash"/>
+          </a:ln>
+        </p:spPr>
+        <p:style>
+          <a:lnRef idx="2">
+            <a:schemeClr val="accent1">
+              <a:shade val="50000"/>
+            </a:schemeClr>
+          </a:lnRef>
+          <a:fillRef idx="1">
+            <a:schemeClr val="accent1"/>
+          </a:fillRef>
+          <a:effectRef idx="0">
+            <a:schemeClr val="accent1"/>
+          </a:effectRef>
+          <a:fontRef idx="minor">
+            <a:schemeClr val="lt1"/>
+          </a:fontRef>
+        </p:style>
+        <p:txBody>
+          <a:bodyPr rtlCol="0" anchor="ctr"/>
+          <a:lstStyle/>
+          <a:p>
+            <a:pPr algn="ctr"/>
+            <a:endParaRPr lang="es-ES"/>
+          </a:p>
+        </p:txBody>
+      </p:sp>
+      <p:sp>
+        <p:nvSpPr>
+          <p:cNvPr id="56" name="CuadroTexto 55"/>
+          <p:cNvSpPr txBox="1"/>
+          <p:nvPr/>
+        </p:nvSpPr>
+        <p:spPr>
+          <a:xfrm>
+            <a:off x="4184041" y="2274964"/>
+            <a:ext cx="742960" cy="307777"/>
+          </a:xfrm>
+          <a:prstGeom prst="rect">
+            <a:avLst/>
+          </a:prstGeom>
+          <a:noFill/>
+        </p:spPr>
+        <p:txBody>
+          <a:bodyPr wrap="none" rtlCol="0">
+            <a:spAutoFit/>
+          </a:bodyPr>
+          <a:lstStyle/>
+          <a:p>
+            <a:r>
+              <a:rPr lang="es-ES" sz="1400" dirty="0" err="1" smtClean="0"/>
+              <a:t>request</a:t>
+            </a:r>
+            <a:endParaRPr lang="es-ES" sz="1400" dirty="0"/>
+          </a:p>
+        </p:txBody>
+      </p:sp>
+      <p:sp>
+        <p:nvSpPr>
+          <p:cNvPr id="57" name="CuadroTexto 56"/>
+          <p:cNvSpPr txBox="1"/>
+          <p:nvPr/>
+        </p:nvSpPr>
+        <p:spPr>
+          <a:xfrm>
+            <a:off x="763704" y="4138990"/>
+            <a:ext cx="552587" cy="307777"/>
+          </a:xfrm>
+          <a:prstGeom prst="rect">
+            <a:avLst/>
+          </a:prstGeom>
+          <a:noFill/>
+        </p:spPr>
+        <p:txBody>
+          <a:bodyPr wrap="none" rtlCol="0">
+            <a:spAutoFit/>
+          </a:bodyPr>
+          <a:lstStyle/>
+          <a:p>
+            <a:r>
+              <a:rPr lang="es-ES" sz="1400" dirty="0" err="1" smtClean="0"/>
+              <a:t>reply</a:t>
+            </a:r>
+            <a:endParaRPr lang="es-ES" sz="1400" dirty="0"/>
+          </a:p>
+        </p:txBody>
+      </p:sp>
+      <p:sp>
+        <p:nvSpPr>
+          <p:cNvPr id="45" name="Elipse 44"/>
+          <p:cNvSpPr/>
+          <p:nvPr/>
+        </p:nvSpPr>
+        <p:spPr>
+          <a:xfrm>
+            <a:off x="4011928" y="3089314"/>
+            <a:ext cx="2251498" cy="2596323"/>
+          </a:xfrm>
+          <a:prstGeom prst="ellipse">
+            <a:avLst/>
+          </a:prstGeom>
+          <a:solidFill>
+            <a:schemeClr val="accent4">
+              <a:lumMod val="60000"/>
+              <a:lumOff val="40000"/>
+            </a:schemeClr>
+          </a:solidFill>
+        </p:spPr>
+        <p:style>
+          <a:lnRef idx="2">
+            <a:schemeClr val="accent1">
+              <a:shade val="50000"/>
+            </a:schemeClr>
+          </a:lnRef>
+          <a:fillRef idx="1">
+            <a:schemeClr val="accent1"/>
+          </a:fillRef>
+          <a:effectRef idx="0">
+            <a:schemeClr val="accent1"/>
+          </a:effectRef>
+          <a:fontRef idx="minor">
+            <a:schemeClr val="lt1"/>
+          </a:fontRef>
+        </p:style>
+        <p:txBody>
+          <a:bodyPr rtlCol="0" anchor="ctr"/>
+          <a:lstStyle/>
+          <a:p>
+            <a:pPr algn="ctr"/>
+            <a:r>
+              <a:rPr lang="es-ES" dirty="0" err="1" smtClean="0">
+                <a:solidFill>
+                  <a:schemeClr val="tx1"/>
+                </a:solidFill>
+              </a:rPr>
+              <a:t>Router</a:t>
+            </a:r>
+            <a:endParaRPr lang="es-ES" dirty="0">
+              <a:solidFill>
+                <a:schemeClr val="tx1"/>
+              </a:solidFill>
+            </a:endParaRPr>
+          </a:p>
+        </p:txBody>
+      </p:sp>
+      <p:sp>
+        <p:nvSpPr>
+          <p:cNvPr id="29" name="CuadroTexto 28"/>
+          <p:cNvSpPr txBox="1"/>
+          <p:nvPr/>
+        </p:nvSpPr>
+        <p:spPr>
+          <a:xfrm>
+            <a:off x="4017103" y="595600"/>
+            <a:ext cx="2220288" cy="523220"/>
+          </a:xfrm>
+          <a:prstGeom prst="rect">
+            <a:avLst/>
+          </a:prstGeom>
+          <a:noFill/>
+        </p:spPr>
+        <p:txBody>
+          <a:bodyPr wrap="none" rtlCol="0">
+            <a:spAutoFit/>
+          </a:bodyPr>
+          <a:lstStyle/>
+          <a:p>
+            <a:r>
+              <a:rPr lang="es-ES" sz="2800" b="1" dirty="0" smtClean="0"/>
+              <a:t>Radius Server</a:t>
+            </a:r>
+            <a:endParaRPr lang="es-ES" sz="2800" b="1" dirty="0"/>
+          </a:p>
+        </p:txBody>
+      </p:sp>
+      <p:cxnSp>
+        <p:nvCxnSpPr>
+          <p:cNvPr id="32" name="Conector recto 31"/>
+          <p:cNvCxnSpPr/>
+          <p:nvPr/>
+        </p:nvCxnSpPr>
+        <p:spPr>
+          <a:xfrm flipH="1" flipV="1">
+            <a:off x="5125758" y="2180429"/>
+            <a:ext cx="1489" cy="877361"/>
+          </a:xfrm>
+          <a:prstGeom prst="line">
+            <a:avLst/>
+          </a:prstGeom>
+          <a:ln>
+            <a:solidFill>
+              <a:schemeClr val="tx1">
+                <a:lumMod val="75000"/>
+                <a:lumOff val="25000"/>
+              </a:schemeClr>
+            </a:solidFill>
+            <a:headEnd type="arrow" w="med" len="med"/>
+            <a:tailEnd type="none" w="med" len="med"/>
+          </a:ln>
+        </p:spPr>
+        <p:style>
+          <a:lnRef idx="1">
+            <a:schemeClr val="accent1"/>
+          </a:lnRef>
+          <a:fillRef idx="0">
+            <a:schemeClr val="accent1"/>
+          </a:fillRef>
+          <a:effectRef idx="0">
+            <a:schemeClr val="accent1"/>
+          </a:effectRef>
+          <a:fontRef idx="minor">
+            <a:schemeClr val="tx1"/>
+          </a:fontRef>
+        </p:style>
+      </p:cxnSp>
+      <p:cxnSp>
+        <p:nvCxnSpPr>
+          <p:cNvPr id="19" name="Conector recto 18"/>
+          <p:cNvCxnSpPr/>
+          <p:nvPr/>
+        </p:nvCxnSpPr>
+        <p:spPr>
+          <a:xfrm>
+            <a:off x="693683" y="4495507"/>
+            <a:ext cx="8600408" cy="0"/>
+          </a:xfrm>
+          <a:prstGeom prst="line">
+            <a:avLst/>
+          </a:prstGeom>
+          <a:ln>
+            <a:solidFill>
+              <a:schemeClr val="tx1">
+                <a:lumMod val="75000"/>
+                <a:lumOff val="25000"/>
+              </a:schemeClr>
+            </a:solidFill>
+            <a:headEnd type="none" w="med" len="med"/>
+            <a:tailEnd type="arrow" w="med" len="med"/>
+          </a:ln>
+        </p:spPr>
+        <p:style>
+          <a:lnRef idx="1">
+            <a:schemeClr val="accent1"/>
+          </a:lnRef>
+          <a:fillRef idx="0">
+            <a:schemeClr val="accent1"/>
+          </a:fillRef>
+          <a:effectRef idx="0">
+            <a:schemeClr val="accent1"/>
+          </a:effectRef>
+          <a:fontRef idx="minor">
+            <a:schemeClr val="tx1"/>
+          </a:fontRef>
+        </p:style>
+      </p:cxnSp>
+      <p:sp>
+        <p:nvSpPr>
+          <p:cNvPr id="38" name="CuadroTexto 37"/>
+          <p:cNvSpPr txBox="1"/>
+          <p:nvPr/>
+        </p:nvSpPr>
+        <p:spPr>
+          <a:xfrm>
+            <a:off x="5865911" y="5391375"/>
+            <a:ext cx="742960" cy="307777"/>
+          </a:xfrm>
+          <a:prstGeom prst="rect">
+            <a:avLst/>
+          </a:prstGeom>
+          <a:noFill/>
+        </p:spPr>
+        <p:txBody>
+          <a:bodyPr wrap="none" rtlCol="0">
+            <a:spAutoFit/>
+          </a:bodyPr>
+          <a:lstStyle/>
+          <a:p>
+            <a:r>
+              <a:rPr lang="es-ES" sz="1400" dirty="0" err="1" smtClean="0"/>
+              <a:t>request</a:t>
+            </a:r>
+            <a:endParaRPr lang="es-ES" sz="1400" dirty="0"/>
+          </a:p>
+        </p:txBody>
+      </p:sp>
+      <p:cxnSp>
+        <p:nvCxnSpPr>
+          <p:cNvPr id="39" name="Conector recto 38"/>
+          <p:cNvCxnSpPr/>
+          <p:nvPr/>
+        </p:nvCxnSpPr>
+        <p:spPr>
+          <a:xfrm>
+            <a:off x="805218" y="1751736"/>
+            <a:ext cx="0" cy="1571082"/>
+          </a:xfrm>
+          <a:prstGeom prst="line">
+            <a:avLst/>
+          </a:prstGeom>
+          <a:ln>
+            <a:solidFill>
+              <a:schemeClr val="tx1">
+                <a:lumMod val="75000"/>
+                <a:lumOff val="25000"/>
+              </a:schemeClr>
+            </a:solidFill>
+            <a:headEnd type="arrow" w="med" len="med"/>
+            <a:tailEnd type="none" w="med" len="med"/>
+          </a:ln>
+        </p:spPr>
+        <p:style>
+          <a:lnRef idx="1">
+            <a:schemeClr val="accent1"/>
+          </a:lnRef>
+          <a:fillRef idx="0">
+            <a:schemeClr val="accent1"/>
+          </a:fillRef>
+          <a:effectRef idx="0">
+            <a:schemeClr val="accent1"/>
+          </a:effectRef>
+          <a:fontRef idx="minor">
+            <a:schemeClr val="tx1"/>
+          </a:fontRef>
+        </p:style>
+      </p:cxnSp>
+      <p:cxnSp>
+        <p:nvCxnSpPr>
+          <p:cNvPr id="41" name="Conector recto 40"/>
+          <p:cNvCxnSpPr/>
+          <p:nvPr/>
+        </p:nvCxnSpPr>
+        <p:spPr>
+          <a:xfrm>
+            <a:off x="3076208" y="1714329"/>
+            <a:ext cx="0" cy="1571082"/>
+          </a:xfrm>
+          <a:prstGeom prst="line">
+            <a:avLst/>
+          </a:prstGeom>
+          <a:ln>
+            <a:solidFill>
+              <a:schemeClr val="tx1">
+                <a:lumMod val="75000"/>
+                <a:lumOff val="25000"/>
+              </a:schemeClr>
+            </a:solidFill>
+            <a:headEnd type="none" w="med" len="med"/>
+            <a:tailEnd type="arrow" w="med" len="med"/>
+          </a:ln>
+        </p:spPr>
+        <p:style>
+          <a:lnRef idx="1">
+            <a:schemeClr val="accent1"/>
+          </a:lnRef>
+          <a:fillRef idx="0">
+            <a:schemeClr val="accent1"/>
+          </a:fillRef>
+          <a:effectRef idx="0">
+            <a:schemeClr val="accent1"/>
+          </a:effectRef>
+          <a:fontRef idx="minor">
+            <a:schemeClr val="tx1"/>
+          </a:fontRef>
+        </p:style>
+      </p:cxnSp>
+      <p:sp>
+        <p:nvSpPr>
+          <p:cNvPr id="35" name="CuadroTexto 34"/>
+          <p:cNvSpPr txBox="1"/>
+          <p:nvPr/>
+        </p:nvSpPr>
+        <p:spPr>
+          <a:xfrm>
+            <a:off x="350670" y="598289"/>
+            <a:ext cx="3022430" cy="523220"/>
+          </a:xfrm>
+          <a:prstGeom prst="rect">
+            <a:avLst/>
+          </a:prstGeom>
+          <a:noFill/>
+        </p:spPr>
+        <p:txBody>
+          <a:bodyPr wrap="none" rtlCol="0">
+            <a:spAutoFit/>
+          </a:bodyPr>
+          <a:lstStyle/>
+          <a:p>
+            <a:r>
+              <a:rPr lang="es-ES" sz="2800" b="1" dirty="0" err="1" smtClean="0"/>
+              <a:t>RadiusClientSocket</a:t>
+            </a:r>
+            <a:endParaRPr lang="es-ES" sz="2800" b="1" dirty="0"/>
+          </a:p>
+        </p:txBody>
+      </p:sp>
+      <p:sp>
+        <p:nvSpPr>
+          <p:cNvPr id="17" name="Rectángulo 16"/>
+          <p:cNvSpPr/>
+          <p:nvPr/>
+        </p:nvSpPr>
+        <p:spPr>
+          <a:xfrm>
+            <a:off x="1316291" y="4302706"/>
+            <a:ext cx="1577838" cy="1229710"/>
+          </a:xfrm>
+          <a:prstGeom prst="rect">
+            <a:avLst/>
+          </a:prstGeom>
+          <a:solidFill>
+            <a:srgbClr val="A6A6A6">
+              <a:alpha val="60000"/>
+            </a:srgbClr>
+          </a:solidFill>
+          <a:ln>
+            <a:noFill/>
+          </a:ln>
+        </p:spPr>
+        <p:style>
+          <a:lnRef idx="2">
+            <a:schemeClr val="accent1">
+              <a:shade val="50000"/>
+            </a:schemeClr>
+          </a:lnRef>
+          <a:fillRef idx="1">
+            <a:schemeClr val="accent1"/>
+          </a:fillRef>
+          <a:effectRef idx="0">
+            <a:schemeClr val="accent1"/>
+          </a:effectRef>
+          <a:fontRef idx="minor">
+            <a:schemeClr val="lt1"/>
+          </a:fontRef>
+        </p:style>
+        <p:txBody>
+          <a:bodyPr rtlCol="0" anchor="ctr"/>
+          <a:lstStyle/>
+          <a:p>
+            <a:pPr algn="ctr"/>
+            <a:r>
+              <a:rPr lang="es-ES" dirty="0" smtClean="0"/>
+              <a:t>Cache (</a:t>
+            </a:r>
+            <a:r>
+              <a:rPr lang="es-ES" dirty="0" err="1" smtClean="0"/>
+              <a:t>port,id</a:t>
+            </a:r>
+            <a:r>
+              <a:rPr lang="es-ES" dirty="0" smtClean="0"/>
+              <a:t> -&gt; </a:t>
+            </a:r>
+            <a:r>
+              <a:rPr lang="es-ES" dirty="0" err="1" smtClean="0"/>
+              <a:t>radiusId</a:t>
+            </a:r>
+            <a:r>
+              <a:rPr lang="es-ES" dirty="0" smtClean="0"/>
+              <a:t>, </a:t>
+            </a:r>
+            <a:r>
+              <a:rPr lang="es-ES" dirty="0" err="1" smtClean="0"/>
+              <a:t>authenticator</a:t>
+            </a:r>
+            <a:r>
+              <a:rPr lang="es-ES" dirty="0" smtClean="0"/>
+              <a:t>)</a:t>
+            </a:r>
+          </a:p>
+        </p:txBody>
+      </p:sp>
+      <p:sp>
+        <p:nvSpPr>
+          <p:cNvPr id="24" name="Rectángulo 23"/>
+          <p:cNvSpPr/>
+          <p:nvPr/>
+        </p:nvSpPr>
+        <p:spPr>
+          <a:xfrm>
+            <a:off x="7109196" y="4302706"/>
+            <a:ext cx="1922720" cy="1229710"/>
+          </a:xfrm>
+          <a:prstGeom prst="rect">
+            <a:avLst/>
+          </a:prstGeom>
+          <a:solidFill>
+            <a:srgbClr val="A6A6A6">
+              <a:alpha val="60000"/>
+            </a:srgbClr>
+          </a:solidFill>
+          <a:ln>
+            <a:noFill/>
+          </a:ln>
+        </p:spPr>
+        <p:style>
+          <a:lnRef idx="2">
+            <a:schemeClr val="accent1">
+              <a:shade val="50000"/>
+            </a:schemeClr>
+          </a:lnRef>
+          <a:fillRef idx="1">
+            <a:schemeClr val="accent1"/>
+          </a:fillRef>
+          <a:effectRef idx="0">
+            <a:schemeClr val="accent1"/>
+          </a:effectRef>
+          <a:fontRef idx="minor">
+            <a:schemeClr val="lt1"/>
+          </a:fontRef>
+        </p:style>
+        <p:txBody>
+          <a:bodyPr rtlCol="0" anchor="ctr"/>
+          <a:lstStyle/>
+          <a:p>
+            <a:pPr algn="ctr"/>
+            <a:r>
+              <a:rPr lang="es-ES" dirty="0" smtClean="0"/>
+              <a:t>Cache (</a:t>
+            </a:r>
+            <a:r>
+              <a:rPr lang="es-ES" dirty="0" err="1" smtClean="0"/>
+              <a:t>radiusId</a:t>
+            </a:r>
+            <a:endParaRPr lang="es-ES" dirty="0" smtClean="0"/>
+          </a:p>
+          <a:p>
+            <a:pPr algn="ctr"/>
+            <a:r>
+              <a:rPr lang="es-ES" dirty="0" smtClean="0"/>
+              <a:t>-&gt;</a:t>
+            </a:r>
+            <a:r>
+              <a:rPr lang="es-ES" dirty="0" err="1" smtClean="0"/>
+              <a:t>promise</a:t>
+            </a:r>
+            <a:r>
+              <a:rPr lang="es-ES" dirty="0" smtClean="0"/>
+              <a:t>)</a:t>
+            </a:r>
+            <a:endParaRPr lang="es-ES" dirty="0"/>
+          </a:p>
+        </p:txBody>
+      </p:sp>
+    </p:spTree>
+    <p:extLst>
+      <p:ext uri="{BB962C8B-B14F-4D97-AF65-F5344CB8AC3E}">
+        <p14:creationId xmlns:p14="http://schemas.microsoft.com/office/powerpoint/2010/main" val="2238034996"/>
+      </p:ext>
+    </p:extLst>
+  </p:cSld>
+  <p:clrMapOvr>
+    <a:masterClrMapping/>
+  </p:clrMapOvr>
+  <mc:AlternateContent xmlns:mc="http://schemas.openxmlformats.org/markup-compatibility/2006" xmlns:p14="http://schemas.microsoft.com/office/powerpoint/2010/main">
+    <mc:Choice Requires="p14">
+      <p:transition spd="slow" p14:dur="2000"/>
+    </mc:Choice>
+    <mc:Fallback xmlns="">
+      <p:transition spd="slow"/>
+    </mc:Fallback>
+  </mc:AlternateContent>
+</p:sld>
+</file>
+
+<file path=ppt/slides/slide5.xml><?xml version="1.0" encoding="utf-8"?>
+<p:sld xmlns:a="http://schemas.openxmlformats.org/drawingml/2006/main" xmlns:r="http://schemas.openxmlformats.org/officeDocument/2006/relationships" xmlns:p="http://schemas.openxmlformats.org/presentationml/2006/main">
+  <p:cSld>
+    <p:spTree>
+      <p:nvGrpSpPr>
+        <p:cNvPr id="1" name=""/>
+        <p:cNvGrpSpPr/>
+        <p:nvPr/>
+      </p:nvGrpSpPr>
+      <p:grpSpPr>
+        <a:xfrm>
+          <a:off x="0" y="0"/>
+          <a:ext cx="0" cy="0"/>
+          <a:chOff x="0" y="0"/>
+          <a:chExt cx="0" cy="0"/>
+        </a:xfrm>
+      </p:grpSpPr>
+      <p:sp>
+        <p:nvSpPr>
+          <p:cNvPr id="19" name="CuadroTexto 18"/>
+          <p:cNvSpPr txBox="1"/>
+          <p:nvPr/>
+        </p:nvSpPr>
+        <p:spPr>
+          <a:xfrm>
+            <a:off x="1008993" y="504497"/>
+            <a:ext cx="3366050" cy="461665"/>
+          </a:xfrm>
+          <a:prstGeom prst="rect">
+            <a:avLst/>
+          </a:prstGeom>
+          <a:noFill/>
+        </p:spPr>
+        <p:txBody>
+          <a:bodyPr wrap="none" rtlCol="0">
+            <a:spAutoFit/>
+          </a:bodyPr>
+          <a:lstStyle/>
+          <a:p>
+            <a:r>
+              <a:rPr lang="es-ES" sz="2400" b="1" dirty="0" smtClean="0"/>
+              <a:t>CONTADORES DIAMETER</a:t>
+            </a:r>
+            <a:endParaRPr lang="es-ES" sz="2400" b="1" dirty="0"/>
+          </a:p>
+        </p:txBody>
+      </p:sp>
+      <p:sp>
+        <p:nvSpPr>
+          <p:cNvPr id="20" name="CuadroTexto 19"/>
+          <p:cNvSpPr txBox="1"/>
+          <p:nvPr/>
+        </p:nvSpPr>
+        <p:spPr>
+          <a:xfrm>
+            <a:off x="1008993" y="1198179"/>
+            <a:ext cx="8353954" cy="5663089"/>
+          </a:xfrm>
+          <a:prstGeom prst="rect">
+            <a:avLst/>
+          </a:prstGeom>
+          <a:noFill/>
+        </p:spPr>
+        <p:txBody>
+          <a:bodyPr wrap="none" rtlCol="0">
+            <a:spAutoFit/>
+          </a:bodyPr>
+          <a:lstStyle/>
+          <a:p>
+            <a:r>
+              <a:rPr lang="es-ES" sz="2000" b="1" dirty="0" smtClean="0"/>
+              <a:t>Peer </a:t>
+            </a:r>
+            <a:r>
+              <a:rPr lang="es-ES" sz="2000" b="1" dirty="0" err="1" smtClean="0"/>
+              <a:t>stats</a:t>
+            </a:r>
+            <a:endParaRPr lang="es-ES" sz="2000" b="1" dirty="0" smtClean="0"/>
+          </a:p>
+          <a:p>
+            <a:endParaRPr lang="es-ES" dirty="0"/>
+          </a:p>
+          <a:p>
+            <a:pPr marL="342900" indent="-342900">
+              <a:buAutoNum type="arabicPeriod"/>
+            </a:pPr>
+            <a:r>
+              <a:rPr lang="es-ES" dirty="0" err="1" smtClean="0"/>
+              <a:t>RequestReceived</a:t>
+            </a:r>
+            <a:r>
+              <a:rPr lang="es-ES" dirty="0" smtClean="0"/>
+              <a:t>(peer, oh, </a:t>
+            </a:r>
+            <a:r>
+              <a:rPr lang="es-ES" dirty="0" err="1" smtClean="0"/>
+              <a:t>or</a:t>
+            </a:r>
+            <a:r>
+              <a:rPr lang="es-ES" dirty="0" smtClean="0"/>
+              <a:t>, </a:t>
+            </a:r>
+            <a:r>
+              <a:rPr lang="es-ES" dirty="0" err="1" smtClean="0"/>
+              <a:t>dh</a:t>
+            </a:r>
+            <a:r>
+              <a:rPr lang="es-ES" dirty="0" smtClean="0"/>
+              <a:t>, </a:t>
+            </a:r>
+            <a:r>
+              <a:rPr lang="es-ES" dirty="0" err="1" smtClean="0"/>
+              <a:t>dr</a:t>
+            </a:r>
+            <a:r>
+              <a:rPr lang="es-ES" dirty="0" smtClean="0"/>
+              <a:t>, </a:t>
+            </a:r>
+            <a:r>
+              <a:rPr lang="es-ES" dirty="0" err="1" smtClean="0"/>
+              <a:t>ap</a:t>
+            </a:r>
+            <a:r>
+              <a:rPr lang="es-ES" dirty="0" smtClean="0"/>
+              <a:t>, cm) -&gt; Del mensaje recibido</a:t>
+            </a:r>
+          </a:p>
+          <a:p>
+            <a:pPr marL="342900" indent="-342900">
+              <a:buAutoNum type="arabicPeriod"/>
+            </a:pPr>
+            <a:r>
+              <a:rPr lang="es-ES" dirty="0" err="1" smtClean="0"/>
+              <a:t>AnswerReceived</a:t>
+            </a:r>
+            <a:r>
+              <a:rPr lang="es-ES" dirty="0" smtClean="0"/>
+              <a:t>(peer, oh, </a:t>
+            </a:r>
+            <a:r>
+              <a:rPr lang="es-ES" dirty="0" err="1" smtClean="0"/>
+              <a:t>or</a:t>
+            </a:r>
+            <a:r>
+              <a:rPr lang="es-ES" dirty="0" smtClean="0"/>
+              <a:t>, </a:t>
+            </a:r>
+            <a:r>
+              <a:rPr lang="es-ES" dirty="0" err="1" smtClean="0"/>
+              <a:t>dh</a:t>
+            </a:r>
+            <a:r>
+              <a:rPr lang="es-ES" dirty="0" smtClean="0"/>
+              <a:t>, </a:t>
+            </a:r>
+            <a:r>
+              <a:rPr lang="es-ES" dirty="0" err="1" smtClean="0"/>
+              <a:t>ap</a:t>
+            </a:r>
+            <a:r>
+              <a:rPr lang="es-ES" dirty="0" smtClean="0"/>
+              <a:t>, cm, </a:t>
+            </a:r>
+            <a:r>
+              <a:rPr lang="es-ES" dirty="0" err="1" smtClean="0"/>
+              <a:t>rc</a:t>
+            </a:r>
+            <a:r>
+              <a:rPr lang="es-ES" dirty="0" smtClean="0"/>
+              <a:t>, </a:t>
+            </a:r>
+            <a:r>
+              <a:rPr lang="es-ES" dirty="0" err="1" smtClean="0"/>
+              <a:t>tr</a:t>
+            </a:r>
+            <a:r>
+              <a:rPr lang="es-ES" dirty="0" smtClean="0"/>
+              <a:t>) -&gt; Del mensaje recibido. </a:t>
+            </a:r>
+            <a:r>
+              <a:rPr lang="es-ES" dirty="0" err="1" smtClean="0"/>
+              <a:t>Tr</a:t>
+            </a:r>
+            <a:r>
+              <a:rPr lang="es-ES" dirty="0" smtClean="0"/>
+              <a:t> de caché</a:t>
+            </a:r>
+          </a:p>
+          <a:p>
+            <a:pPr marL="342900" indent="-342900">
+              <a:buAutoNum type="arabicPeriod"/>
+            </a:pPr>
+            <a:r>
+              <a:rPr lang="es-ES" dirty="0" err="1" smtClean="0"/>
+              <a:t>RequestTimeout</a:t>
+            </a:r>
+            <a:r>
+              <a:rPr lang="es-ES" dirty="0" smtClean="0"/>
+              <a:t>(peer, oh, </a:t>
+            </a:r>
+            <a:r>
+              <a:rPr lang="es-ES" dirty="0" err="1" smtClean="0"/>
+              <a:t>or</a:t>
+            </a:r>
+            <a:r>
+              <a:rPr lang="es-ES" dirty="0" smtClean="0"/>
+              <a:t>, </a:t>
+            </a:r>
+            <a:r>
+              <a:rPr lang="es-ES" dirty="0" err="1" smtClean="0"/>
+              <a:t>dh</a:t>
+            </a:r>
+            <a:r>
+              <a:rPr lang="es-ES" dirty="0" smtClean="0"/>
+              <a:t>, </a:t>
+            </a:r>
+            <a:r>
+              <a:rPr lang="es-ES" dirty="0" err="1" smtClean="0"/>
+              <a:t>ap</a:t>
+            </a:r>
+            <a:r>
+              <a:rPr lang="es-ES" dirty="0" smtClean="0"/>
+              <a:t>, cm) -&gt; De </a:t>
+            </a:r>
+            <a:r>
+              <a:rPr lang="es-ES" dirty="0" err="1" smtClean="0"/>
+              <a:t>key</a:t>
+            </a:r>
+            <a:r>
+              <a:rPr lang="es-ES" dirty="0" smtClean="0"/>
+              <a:t> en caché</a:t>
+            </a:r>
+          </a:p>
+          <a:p>
+            <a:pPr marL="342900" indent="-342900">
+              <a:buAutoNum type="arabicPeriod"/>
+            </a:pPr>
+            <a:r>
+              <a:rPr lang="es-ES" dirty="0" err="1" smtClean="0"/>
+              <a:t>AnswerSent</a:t>
+            </a:r>
+            <a:r>
+              <a:rPr lang="es-ES" dirty="0" smtClean="0"/>
+              <a:t>(peer, oh, </a:t>
+            </a:r>
+            <a:r>
+              <a:rPr lang="es-ES" dirty="0" err="1" smtClean="0"/>
+              <a:t>or</a:t>
+            </a:r>
+            <a:r>
+              <a:rPr lang="es-ES" dirty="0" smtClean="0"/>
+              <a:t>, </a:t>
+            </a:r>
+            <a:r>
+              <a:rPr lang="es-ES" dirty="0" err="1" smtClean="0"/>
+              <a:t>dh</a:t>
+            </a:r>
+            <a:r>
+              <a:rPr lang="es-ES" dirty="0" smtClean="0"/>
+              <a:t>, </a:t>
+            </a:r>
+            <a:r>
+              <a:rPr lang="es-ES" dirty="0" err="1" smtClean="0"/>
+              <a:t>ap</a:t>
+            </a:r>
+            <a:r>
+              <a:rPr lang="es-ES" dirty="0" smtClean="0"/>
+              <a:t>, cm, </a:t>
+            </a:r>
+            <a:r>
+              <a:rPr lang="es-ES" dirty="0" err="1" smtClean="0"/>
+              <a:t>rc</a:t>
+            </a:r>
+            <a:r>
+              <a:rPr lang="es-ES" dirty="0" smtClean="0"/>
+              <a:t>) -&gt; Del mensaje enviado. (Sin </a:t>
+            </a:r>
+            <a:r>
+              <a:rPr lang="es-ES" dirty="0" err="1" smtClean="0"/>
+              <a:t>tr</a:t>
+            </a:r>
+            <a:r>
+              <a:rPr lang="es-ES" dirty="0" smtClean="0"/>
+              <a:t>)</a:t>
+            </a:r>
+          </a:p>
+          <a:p>
+            <a:pPr marL="342900" indent="-342900">
+              <a:buAutoNum type="arabicPeriod"/>
+            </a:pPr>
+            <a:r>
+              <a:rPr lang="es-ES" dirty="0" err="1" smtClean="0"/>
+              <a:t>RequestSent</a:t>
+            </a:r>
+            <a:r>
+              <a:rPr lang="es-ES" dirty="0" smtClean="0"/>
+              <a:t>(peer, oh, </a:t>
+            </a:r>
+            <a:r>
+              <a:rPr lang="es-ES" dirty="0" err="1" smtClean="0"/>
+              <a:t>or</a:t>
+            </a:r>
+            <a:r>
+              <a:rPr lang="es-ES" dirty="0" smtClean="0"/>
+              <a:t>, </a:t>
+            </a:r>
+            <a:r>
+              <a:rPr lang="es-ES" dirty="0" err="1" smtClean="0"/>
+              <a:t>dh</a:t>
+            </a:r>
+            <a:r>
+              <a:rPr lang="es-ES" dirty="0" smtClean="0"/>
+              <a:t>, </a:t>
+            </a:r>
+            <a:r>
+              <a:rPr lang="es-ES" dirty="0" err="1" smtClean="0"/>
+              <a:t>dr</a:t>
+            </a:r>
+            <a:r>
+              <a:rPr lang="es-ES" dirty="0" smtClean="0"/>
+              <a:t>, </a:t>
+            </a:r>
+            <a:r>
+              <a:rPr lang="es-ES" dirty="0" err="1" smtClean="0"/>
+              <a:t>ap</a:t>
+            </a:r>
+            <a:r>
+              <a:rPr lang="es-ES" dirty="0" smtClean="0"/>
+              <a:t>, cm) -&gt; Del mensaje enviado</a:t>
+            </a:r>
+          </a:p>
+          <a:p>
+            <a:pPr marL="342900" indent="-342900">
+              <a:buAutoNum type="arabicPeriod"/>
+            </a:pPr>
+            <a:endParaRPr lang="es-ES" dirty="0"/>
+          </a:p>
+          <a:p>
+            <a:r>
+              <a:rPr lang="es-ES" b="1" dirty="0" err="1" smtClean="0"/>
+              <a:t>RouterStats</a:t>
+            </a:r>
+            <a:endParaRPr lang="es-ES" b="1" dirty="0" smtClean="0"/>
+          </a:p>
+          <a:p>
+            <a:endParaRPr lang="es-ES" dirty="0" smtClean="0"/>
+          </a:p>
+          <a:p>
+            <a:r>
+              <a:rPr lang="es-ES" dirty="0" smtClean="0"/>
+              <a:t>6. </a:t>
+            </a:r>
+            <a:r>
+              <a:rPr lang="es-ES" dirty="0" err="1" smtClean="0"/>
+              <a:t>RequestReceivedDropped</a:t>
+            </a:r>
+            <a:r>
+              <a:rPr lang="es-ES" dirty="0" smtClean="0"/>
+              <a:t>(oh, </a:t>
+            </a:r>
+            <a:r>
+              <a:rPr lang="es-ES" dirty="0" err="1" smtClean="0"/>
+              <a:t>or</a:t>
+            </a:r>
+            <a:r>
+              <a:rPr lang="es-ES" dirty="0" smtClean="0"/>
+              <a:t>, </a:t>
+            </a:r>
+            <a:r>
+              <a:rPr lang="es-ES" dirty="0" err="1" smtClean="0"/>
+              <a:t>dh</a:t>
+            </a:r>
+            <a:r>
+              <a:rPr lang="es-ES" dirty="0" smtClean="0"/>
+              <a:t>, </a:t>
+            </a:r>
+            <a:r>
+              <a:rPr lang="es-ES" dirty="0" err="1" smtClean="0"/>
+              <a:t>dr</a:t>
+            </a:r>
+            <a:r>
+              <a:rPr lang="es-ES" dirty="0" smtClean="0"/>
+              <a:t>, </a:t>
+            </a:r>
+            <a:r>
+              <a:rPr lang="es-ES" dirty="0" err="1" smtClean="0"/>
+              <a:t>ap</a:t>
+            </a:r>
+            <a:r>
+              <a:rPr lang="es-ES" dirty="0" smtClean="0"/>
+              <a:t>, cm) -&gt; Del mensaje recibido</a:t>
+            </a:r>
+          </a:p>
+          <a:p>
+            <a:r>
+              <a:rPr lang="es-ES" dirty="0" smtClean="0"/>
+              <a:t>7. </a:t>
+            </a:r>
+            <a:r>
+              <a:rPr lang="es-ES" dirty="0" err="1" smtClean="0"/>
+              <a:t>RequestSentDropped</a:t>
+            </a:r>
+            <a:r>
+              <a:rPr lang="es-ES" dirty="0" smtClean="0"/>
+              <a:t>(oh, </a:t>
+            </a:r>
+            <a:r>
+              <a:rPr lang="es-ES" dirty="0" err="1" smtClean="0"/>
+              <a:t>or</a:t>
+            </a:r>
+            <a:r>
+              <a:rPr lang="es-ES" dirty="0" smtClean="0"/>
+              <a:t>, </a:t>
+            </a:r>
+            <a:r>
+              <a:rPr lang="es-ES" dirty="0" err="1" smtClean="0"/>
+              <a:t>dh</a:t>
+            </a:r>
+            <a:r>
+              <a:rPr lang="es-ES" dirty="0" smtClean="0"/>
+              <a:t>, </a:t>
+            </a:r>
+            <a:r>
+              <a:rPr lang="es-ES" dirty="0" err="1" smtClean="0"/>
+              <a:t>dr</a:t>
+            </a:r>
+            <a:r>
+              <a:rPr lang="es-ES" dirty="0" smtClean="0"/>
+              <a:t>, </a:t>
+            </a:r>
+            <a:r>
+              <a:rPr lang="es-ES" dirty="0" err="1" smtClean="0"/>
+              <a:t>ap</a:t>
+            </a:r>
+            <a:r>
+              <a:rPr lang="es-ES" dirty="0" smtClean="0"/>
+              <a:t>, cm) -&gt; Del mensaje enviado</a:t>
+            </a:r>
+          </a:p>
+          <a:p>
+            <a:r>
+              <a:rPr lang="es-ES" dirty="0" smtClean="0"/>
+              <a:t>8. </a:t>
+            </a:r>
+            <a:r>
+              <a:rPr lang="es-ES" dirty="0" err="1" smtClean="0"/>
+              <a:t>RequesRetransmitted</a:t>
+            </a:r>
+            <a:r>
+              <a:rPr lang="es-ES" dirty="0" smtClean="0"/>
+              <a:t>(oh, </a:t>
+            </a:r>
+            <a:r>
+              <a:rPr lang="es-ES" dirty="0" err="1" smtClean="0"/>
+              <a:t>or</a:t>
+            </a:r>
+            <a:r>
+              <a:rPr lang="es-ES" dirty="0" smtClean="0"/>
+              <a:t>, </a:t>
+            </a:r>
+            <a:r>
+              <a:rPr lang="es-ES" dirty="0" err="1" smtClean="0"/>
+              <a:t>dh</a:t>
+            </a:r>
+            <a:r>
+              <a:rPr lang="es-ES" dirty="0" smtClean="0"/>
+              <a:t>, </a:t>
+            </a:r>
+            <a:r>
+              <a:rPr lang="es-ES" dirty="0" err="1" smtClean="0"/>
+              <a:t>dr</a:t>
+            </a:r>
+            <a:r>
+              <a:rPr lang="es-ES" dirty="0" smtClean="0"/>
+              <a:t>, </a:t>
+            </a:r>
+            <a:r>
+              <a:rPr lang="es-ES" dirty="0" err="1" smtClean="0"/>
+              <a:t>ap</a:t>
+            </a:r>
+            <a:r>
+              <a:rPr lang="es-ES" dirty="0" smtClean="0"/>
+              <a:t>, cm) -&gt; Del mensaje enviado</a:t>
+            </a:r>
+          </a:p>
+          <a:p>
+            <a:endParaRPr lang="es-ES" dirty="0"/>
+          </a:p>
+          <a:p>
+            <a:r>
+              <a:rPr lang="es-ES" b="1" dirty="0" err="1" smtClean="0"/>
+              <a:t>HandlerStats</a:t>
+            </a:r>
+            <a:endParaRPr lang="es-ES" b="1" dirty="0" smtClean="0"/>
+          </a:p>
+          <a:p>
+            <a:endParaRPr lang="es-ES" dirty="0"/>
+          </a:p>
+          <a:p>
+            <a:r>
+              <a:rPr lang="es-ES" dirty="0" smtClean="0"/>
+              <a:t>9. </a:t>
+            </a:r>
+            <a:r>
+              <a:rPr lang="es-ES" dirty="0" err="1" smtClean="0"/>
+              <a:t>HandlerAnswer</a:t>
+            </a:r>
+            <a:r>
+              <a:rPr lang="es-ES" dirty="0" smtClean="0"/>
+              <a:t>(oh, </a:t>
+            </a:r>
+            <a:r>
+              <a:rPr lang="es-ES" dirty="0" err="1" smtClean="0"/>
+              <a:t>or</a:t>
+            </a:r>
+            <a:r>
+              <a:rPr lang="es-ES" dirty="0" smtClean="0"/>
+              <a:t>, </a:t>
+            </a:r>
+            <a:r>
+              <a:rPr lang="es-ES" dirty="0" err="1" smtClean="0"/>
+              <a:t>dh</a:t>
+            </a:r>
+            <a:r>
+              <a:rPr lang="es-ES" dirty="0" smtClean="0"/>
+              <a:t>, </a:t>
+            </a:r>
+            <a:r>
+              <a:rPr lang="es-ES" dirty="0" err="1" smtClean="0"/>
+              <a:t>dr</a:t>
+            </a:r>
+            <a:r>
+              <a:rPr lang="es-ES" dirty="0" smtClean="0"/>
+              <a:t>, </a:t>
+            </a:r>
+            <a:r>
+              <a:rPr lang="es-ES" dirty="0" err="1" smtClean="0"/>
+              <a:t>ap</a:t>
+            </a:r>
+            <a:r>
+              <a:rPr lang="es-ES" dirty="0" smtClean="0"/>
+              <a:t>, </a:t>
+            </a:r>
+            <a:r>
+              <a:rPr lang="es-ES" dirty="0" err="1" smtClean="0"/>
+              <a:t>co</a:t>
+            </a:r>
+            <a:r>
+              <a:rPr lang="es-ES" dirty="0" smtClean="0"/>
+              <a:t>, </a:t>
+            </a:r>
+            <a:r>
+              <a:rPr lang="es-ES" dirty="0" err="1" smtClean="0"/>
+              <a:t>rc</a:t>
+            </a:r>
+            <a:r>
+              <a:rPr lang="es-ES" dirty="0" smtClean="0"/>
+              <a:t>, </a:t>
+            </a:r>
+            <a:r>
+              <a:rPr lang="es-ES" dirty="0" err="1" smtClean="0"/>
+              <a:t>tr</a:t>
+            </a:r>
+            <a:r>
+              <a:rPr lang="es-ES" dirty="0" smtClean="0"/>
+              <a:t>) -&gt; Del mensaje recibido</a:t>
+            </a:r>
+          </a:p>
+          <a:p>
+            <a:r>
+              <a:rPr lang="es-ES" dirty="0" smtClean="0"/>
+              <a:t>10. </a:t>
+            </a:r>
+            <a:r>
+              <a:rPr lang="es-ES" dirty="0" err="1" smtClean="0"/>
+              <a:t>HandlerRequest</a:t>
+            </a:r>
+            <a:r>
+              <a:rPr lang="es-ES" dirty="0" smtClean="0"/>
+              <a:t>(oh, </a:t>
+            </a:r>
+            <a:r>
+              <a:rPr lang="es-ES" dirty="0" err="1" smtClean="0"/>
+              <a:t>or</a:t>
+            </a:r>
+            <a:r>
+              <a:rPr lang="es-ES" dirty="0" smtClean="0"/>
+              <a:t>, </a:t>
+            </a:r>
+            <a:r>
+              <a:rPr lang="es-ES" dirty="0" err="1" smtClean="0"/>
+              <a:t>dh</a:t>
+            </a:r>
+            <a:r>
+              <a:rPr lang="es-ES" dirty="0" smtClean="0"/>
+              <a:t>, </a:t>
+            </a:r>
+            <a:r>
+              <a:rPr lang="es-ES" dirty="0" err="1" smtClean="0"/>
+              <a:t>dr</a:t>
+            </a:r>
+            <a:r>
+              <a:rPr lang="es-ES" dirty="0" smtClean="0"/>
+              <a:t>, </a:t>
+            </a:r>
+            <a:r>
+              <a:rPr lang="es-ES" dirty="0" err="1" smtClean="0"/>
+              <a:t>ap</a:t>
+            </a:r>
+            <a:r>
+              <a:rPr lang="es-ES" dirty="0" smtClean="0"/>
+              <a:t>, </a:t>
+            </a:r>
+            <a:r>
+              <a:rPr lang="es-ES" dirty="0" err="1" smtClean="0"/>
+              <a:t>co</a:t>
+            </a:r>
+            <a:r>
+              <a:rPr lang="es-ES" dirty="0" smtClean="0"/>
+              <a:t>, </a:t>
+            </a:r>
+            <a:r>
+              <a:rPr lang="es-ES" dirty="0" err="1" smtClean="0"/>
+              <a:t>rc</a:t>
+            </a:r>
+            <a:r>
+              <a:rPr lang="es-ES" dirty="0" smtClean="0"/>
+              <a:t>, </a:t>
+            </a:r>
+            <a:r>
+              <a:rPr lang="es-ES" dirty="0" err="1" smtClean="0"/>
+              <a:t>tr</a:t>
+            </a:r>
+            <a:r>
+              <a:rPr lang="es-ES" dirty="0" smtClean="0"/>
+              <a:t>) -&gt; Del mensaje enviado</a:t>
+            </a:r>
+          </a:p>
+          <a:p>
+            <a:r>
+              <a:rPr lang="es-ES" dirty="0" smtClean="0"/>
+              <a:t>11. </a:t>
+            </a:r>
+            <a:r>
+              <a:rPr lang="es-ES" dirty="0" err="1" smtClean="0"/>
+              <a:t>HandlerTimeout</a:t>
+            </a:r>
+            <a:r>
+              <a:rPr lang="es-ES" dirty="0" smtClean="0"/>
+              <a:t>(oh, </a:t>
+            </a:r>
+            <a:r>
+              <a:rPr lang="es-ES" dirty="0" err="1" smtClean="0"/>
+              <a:t>or</a:t>
+            </a:r>
+            <a:r>
+              <a:rPr lang="es-ES" dirty="0" smtClean="0"/>
+              <a:t>, </a:t>
+            </a:r>
+            <a:r>
+              <a:rPr lang="es-ES" dirty="0" err="1" smtClean="0"/>
+              <a:t>dh</a:t>
+            </a:r>
+            <a:r>
+              <a:rPr lang="es-ES" dirty="0" smtClean="0"/>
+              <a:t>, </a:t>
+            </a:r>
+            <a:r>
+              <a:rPr lang="es-ES" dirty="0" err="1" smtClean="0"/>
+              <a:t>dr</a:t>
+            </a:r>
+            <a:r>
+              <a:rPr lang="es-ES" dirty="0" smtClean="0"/>
+              <a:t>, </a:t>
+            </a:r>
+            <a:r>
+              <a:rPr lang="es-ES" dirty="0" err="1" smtClean="0"/>
+              <a:t>ap</a:t>
+            </a:r>
+            <a:r>
+              <a:rPr lang="es-ES" dirty="0" smtClean="0"/>
+              <a:t>, </a:t>
+            </a:r>
+            <a:r>
+              <a:rPr lang="es-ES" dirty="0" err="1" smtClean="0"/>
+              <a:t>co</a:t>
+            </a:r>
+            <a:r>
+              <a:rPr lang="es-ES" dirty="0" smtClean="0"/>
+              <a:t>) -&gt; Del mensaje enviado</a:t>
+            </a:r>
+            <a:endParaRPr lang="es-ES" dirty="0"/>
+          </a:p>
+          <a:p>
+            <a:endParaRPr lang="es-ES" dirty="0" smtClean="0"/>
+          </a:p>
+        </p:txBody>
+      </p:sp>
+    </p:spTree>
+    <p:extLst>
+      <p:ext uri="{BB962C8B-B14F-4D97-AF65-F5344CB8AC3E}">
+        <p14:creationId xmlns:p14="http://schemas.microsoft.com/office/powerpoint/2010/main" val="4057260979"/>
+      </p:ext>
+    </p:extLst>
+  </p:cSld>
+  <p:clrMapOvr>
+    <a:masterClrMapping/>
+  </p:clrMapOvr>
+  <mc:AlternateContent xmlns:mc="http://schemas.openxmlformats.org/markup-compatibility/2006" xmlns:p14="http://schemas.microsoft.com/office/powerpoint/2010/main">
+    <mc:Choice Requires="p14">
+      <p:transition spd="slow" p14:dur="2000"/>
+    </mc:Choice>
+    <mc:Fallback xmlns="">
+      <p:transition spd="slow"/>
+    </mc:Fallback>
+  </mc:AlternateContent>
+</p:sld>
+</file>
+
+<file path=ppt/slides/slide6.xml><?xml version="1.0" encoding="utf-8"?>
+<p:sld xmlns:a="http://schemas.openxmlformats.org/drawingml/2006/main" xmlns:r="http://schemas.openxmlformats.org/officeDocument/2006/relationships" xmlns:p="http://schemas.openxmlformats.org/presentationml/2006/main">
+  <p:cSld>
+    <p:spTree>
+      <p:nvGrpSpPr>
+        <p:cNvPr id="1" name=""/>
+        <p:cNvGrpSpPr/>
+        <p:nvPr/>
+      </p:nvGrpSpPr>
+      <p:grpSpPr>
+        <a:xfrm>
+          <a:off x="0" y="0"/>
+          <a:ext cx="0" cy="0"/>
+          <a:chOff x="0" y="0"/>
+          <a:chExt cx="0" cy="0"/>
+        </a:xfrm>
+      </p:grpSpPr>
+      <p:sp>
+        <p:nvSpPr>
+          <p:cNvPr id="19" name="CuadroTexto 18"/>
+          <p:cNvSpPr txBox="1"/>
+          <p:nvPr/>
+        </p:nvSpPr>
+        <p:spPr>
+          <a:xfrm>
+            <a:off x="1008993" y="504497"/>
+            <a:ext cx="2989344" cy="461665"/>
+          </a:xfrm>
+          <a:prstGeom prst="rect">
+            <a:avLst/>
+          </a:prstGeom>
+          <a:noFill/>
+        </p:spPr>
+        <p:txBody>
+          <a:bodyPr wrap="none" rtlCol="0">
+            <a:spAutoFit/>
+          </a:bodyPr>
+          <a:lstStyle/>
+          <a:p>
+            <a:r>
+              <a:rPr lang="es-ES" sz="2400" b="1" dirty="0" smtClean="0"/>
+              <a:t>CONTADORES RADIUS</a:t>
+            </a:r>
+            <a:endParaRPr lang="es-ES" sz="2400" b="1" dirty="0"/>
+          </a:p>
+        </p:txBody>
+      </p:sp>
+      <p:sp>
+        <p:nvSpPr>
+          <p:cNvPr id="20" name="CuadroTexto 19"/>
+          <p:cNvSpPr txBox="1"/>
+          <p:nvPr/>
+        </p:nvSpPr>
+        <p:spPr>
+          <a:xfrm>
+            <a:off x="1008993" y="1119351"/>
+            <a:ext cx="7898524" cy="5386090"/>
+          </a:xfrm>
+          <a:prstGeom prst="rect">
+            <a:avLst/>
+          </a:prstGeom>
+          <a:noFill/>
+        </p:spPr>
+        <p:txBody>
+          <a:bodyPr wrap="square" rtlCol="0">
+            <a:spAutoFit/>
+          </a:bodyPr>
+          <a:lstStyle/>
+          <a:p>
+            <a:r>
+              <a:rPr lang="es-ES" sz="2000" b="1" dirty="0" smtClean="0"/>
+              <a:t>Server</a:t>
+            </a:r>
+          </a:p>
+          <a:p>
+            <a:endParaRPr lang="es-ES" dirty="0"/>
+          </a:p>
+          <a:p>
+            <a:pPr marL="342900" indent="-342900">
+              <a:buAutoNum type="arabicPeriod"/>
+            </a:pPr>
+            <a:r>
+              <a:rPr lang="es-ES" dirty="0" err="1" smtClean="0"/>
+              <a:t>ServerRequest</a:t>
+            </a:r>
+            <a:r>
+              <a:rPr lang="es-ES" dirty="0" smtClean="0"/>
+              <a:t>(</a:t>
+            </a:r>
+            <a:r>
+              <a:rPr lang="es-ES" dirty="0" err="1" smtClean="0"/>
+              <a:t>rh</a:t>
+            </a:r>
+            <a:r>
+              <a:rPr lang="es-ES" dirty="0" smtClean="0"/>
+              <a:t>, </a:t>
+            </a:r>
+            <a:r>
+              <a:rPr lang="es-ES" dirty="0" err="1" smtClean="0"/>
+              <a:t>rq</a:t>
+            </a:r>
+            <a:r>
+              <a:rPr lang="es-ES" dirty="0" smtClean="0"/>
+              <a:t>)</a:t>
+            </a:r>
+          </a:p>
+          <a:p>
+            <a:pPr marL="342900" indent="-342900">
+              <a:buAutoNum type="arabicPeriod"/>
+            </a:pPr>
+            <a:r>
+              <a:rPr lang="es-ES" dirty="0" err="1" smtClean="0"/>
+              <a:t>ServerResponse</a:t>
+            </a:r>
+            <a:r>
+              <a:rPr lang="es-ES" dirty="0" smtClean="0"/>
+              <a:t>(</a:t>
+            </a:r>
+            <a:r>
+              <a:rPr lang="es-ES" dirty="0" err="1" smtClean="0"/>
+              <a:t>rh</a:t>
+            </a:r>
+            <a:r>
+              <a:rPr lang="es-ES" dirty="0" smtClean="0"/>
+              <a:t>, </a:t>
+            </a:r>
+            <a:r>
+              <a:rPr lang="es-ES" dirty="0" err="1" smtClean="0"/>
+              <a:t>rs</a:t>
+            </a:r>
+            <a:r>
+              <a:rPr lang="es-ES" dirty="0" smtClean="0"/>
+              <a:t>)</a:t>
+            </a:r>
+          </a:p>
+          <a:p>
+            <a:pPr marL="342900" indent="-342900">
+              <a:buAutoNum type="arabicPeriod"/>
+            </a:pPr>
+            <a:endParaRPr lang="es-ES" dirty="0"/>
+          </a:p>
+          <a:p>
+            <a:r>
+              <a:rPr lang="es-ES" b="1" dirty="0" err="1" smtClean="0"/>
+              <a:t>Client</a:t>
+            </a:r>
+            <a:endParaRPr lang="es-ES" b="1" dirty="0" smtClean="0"/>
+          </a:p>
+          <a:p>
+            <a:endParaRPr lang="es-ES" dirty="0"/>
+          </a:p>
+          <a:p>
+            <a:r>
+              <a:rPr lang="es-ES" dirty="0" smtClean="0"/>
+              <a:t>3. </a:t>
+            </a:r>
+            <a:r>
+              <a:rPr lang="es-ES" dirty="0" err="1" smtClean="0"/>
+              <a:t>ClientRequest</a:t>
+            </a:r>
+            <a:r>
+              <a:rPr lang="es-ES" dirty="0" smtClean="0"/>
+              <a:t>(</a:t>
+            </a:r>
+            <a:r>
+              <a:rPr lang="es-ES" dirty="0" err="1" smtClean="0"/>
+              <a:t>rh</a:t>
+            </a:r>
+            <a:r>
+              <a:rPr lang="es-ES" dirty="0" smtClean="0"/>
+              <a:t>, </a:t>
+            </a:r>
+            <a:r>
+              <a:rPr lang="es-ES" dirty="0" err="1" smtClean="0"/>
+              <a:t>rq</a:t>
+            </a:r>
+            <a:r>
+              <a:rPr lang="es-ES" dirty="0" smtClean="0"/>
+              <a:t>)</a:t>
+            </a:r>
+          </a:p>
+          <a:p>
+            <a:r>
+              <a:rPr lang="es-ES" dirty="0" smtClean="0"/>
+              <a:t>4. </a:t>
+            </a:r>
+            <a:r>
+              <a:rPr lang="es-ES" dirty="0" err="1" smtClean="0"/>
+              <a:t>ClientResponse</a:t>
+            </a:r>
+            <a:r>
+              <a:rPr lang="es-ES" dirty="0" smtClean="0"/>
+              <a:t>(</a:t>
+            </a:r>
+            <a:r>
+              <a:rPr lang="es-ES" dirty="0" err="1" smtClean="0"/>
+              <a:t>rh</a:t>
+            </a:r>
+            <a:r>
+              <a:rPr lang="es-ES" dirty="0" smtClean="0"/>
+              <a:t>, </a:t>
+            </a:r>
+            <a:r>
+              <a:rPr lang="es-ES" dirty="0" err="1" smtClean="0"/>
+              <a:t>rq</a:t>
+            </a:r>
+            <a:r>
+              <a:rPr lang="es-ES" dirty="0" smtClean="0"/>
+              <a:t>, </a:t>
+            </a:r>
+            <a:r>
+              <a:rPr lang="es-ES" dirty="0" err="1" smtClean="0"/>
+              <a:t>rs</a:t>
+            </a:r>
+            <a:r>
+              <a:rPr lang="es-ES" dirty="0" smtClean="0"/>
+              <a:t>, </a:t>
+            </a:r>
+            <a:r>
+              <a:rPr lang="es-ES" dirty="0" err="1" smtClean="0"/>
+              <a:t>rt</a:t>
+            </a:r>
+            <a:r>
+              <a:rPr lang="es-ES" dirty="0" smtClean="0"/>
+              <a:t>)</a:t>
+            </a:r>
+          </a:p>
+          <a:p>
+            <a:r>
+              <a:rPr lang="es-ES" dirty="0" smtClean="0"/>
+              <a:t>5. </a:t>
+            </a:r>
+            <a:r>
+              <a:rPr lang="es-ES" dirty="0" err="1" smtClean="0"/>
+              <a:t>ClientTimeout</a:t>
+            </a:r>
+            <a:r>
+              <a:rPr lang="es-ES" dirty="0" smtClean="0"/>
+              <a:t>(</a:t>
+            </a:r>
+            <a:r>
+              <a:rPr lang="es-ES" dirty="0" err="1" smtClean="0"/>
+              <a:t>rh</a:t>
+            </a:r>
+            <a:r>
+              <a:rPr lang="es-ES" dirty="0" smtClean="0"/>
+              <a:t>, </a:t>
+            </a:r>
+            <a:r>
+              <a:rPr lang="es-ES" dirty="0" err="1" smtClean="0"/>
+              <a:t>rq</a:t>
+            </a:r>
+            <a:r>
+              <a:rPr lang="es-ES" dirty="0" smtClean="0"/>
+              <a:t>)</a:t>
+            </a:r>
+          </a:p>
+          <a:p>
+            <a:endParaRPr lang="es-ES" dirty="0"/>
+          </a:p>
+          <a:p>
+            <a:r>
+              <a:rPr lang="es-ES" b="1" dirty="0" err="1" smtClean="0"/>
+              <a:t>Handler</a:t>
+            </a:r>
+            <a:endParaRPr lang="es-ES" b="1" dirty="0" smtClean="0"/>
+          </a:p>
+          <a:p>
+            <a:endParaRPr lang="es-ES" dirty="0"/>
+          </a:p>
+          <a:p>
+            <a:r>
+              <a:rPr lang="es-ES" dirty="0"/>
+              <a:t>6</a:t>
+            </a:r>
+            <a:r>
+              <a:rPr lang="es-ES" dirty="0" smtClean="0"/>
+              <a:t>. </a:t>
+            </a:r>
+            <a:r>
+              <a:rPr lang="es-ES" dirty="0" err="1" smtClean="0"/>
+              <a:t>HandlerResponse</a:t>
+            </a:r>
+            <a:r>
+              <a:rPr lang="es-ES" dirty="0" smtClean="0"/>
+              <a:t>(</a:t>
+            </a:r>
+            <a:r>
+              <a:rPr lang="es-ES" dirty="0" err="1" smtClean="0"/>
+              <a:t>rh</a:t>
+            </a:r>
+            <a:r>
+              <a:rPr lang="es-ES" dirty="0" smtClean="0"/>
+              <a:t>, </a:t>
+            </a:r>
+            <a:r>
+              <a:rPr lang="es-ES" dirty="0" err="1" smtClean="0"/>
+              <a:t>rq</a:t>
+            </a:r>
+            <a:r>
+              <a:rPr lang="es-ES" dirty="0" smtClean="0"/>
+              <a:t>, </a:t>
+            </a:r>
+            <a:r>
+              <a:rPr lang="es-ES" dirty="0" err="1" smtClean="0"/>
+              <a:t>rs</a:t>
+            </a:r>
+            <a:r>
+              <a:rPr lang="es-ES" dirty="0" smtClean="0"/>
+              <a:t>, </a:t>
+            </a:r>
+            <a:r>
+              <a:rPr lang="es-ES" dirty="0" err="1" smtClean="0"/>
+              <a:t>rt</a:t>
+            </a:r>
+            <a:r>
+              <a:rPr lang="es-ES" dirty="0" smtClean="0"/>
+              <a:t> )</a:t>
+            </a:r>
+          </a:p>
+          <a:p>
+            <a:r>
+              <a:rPr lang="es-ES" dirty="0"/>
+              <a:t>7</a:t>
+            </a:r>
+            <a:r>
+              <a:rPr lang="es-ES" dirty="0" smtClean="0"/>
+              <a:t>. </a:t>
+            </a:r>
+            <a:r>
+              <a:rPr lang="es-ES" dirty="0" err="1" smtClean="0"/>
+              <a:t>HandlerDrop</a:t>
+            </a:r>
+            <a:r>
+              <a:rPr lang="es-ES" dirty="0" smtClean="0"/>
+              <a:t>(</a:t>
+            </a:r>
+            <a:r>
+              <a:rPr lang="es-ES" dirty="0" err="1" smtClean="0"/>
+              <a:t>rh</a:t>
+            </a:r>
+            <a:r>
+              <a:rPr lang="es-ES" dirty="0" smtClean="0"/>
+              <a:t>, </a:t>
+            </a:r>
+            <a:r>
+              <a:rPr lang="es-ES" dirty="0" err="1" smtClean="0"/>
+              <a:t>rq</a:t>
+            </a:r>
+            <a:r>
+              <a:rPr lang="es-ES" dirty="0" smtClean="0"/>
+              <a:t>)</a:t>
+            </a:r>
+          </a:p>
+          <a:p>
+            <a:r>
+              <a:rPr lang="es-ES" dirty="0"/>
+              <a:t>8</a:t>
+            </a:r>
+            <a:r>
+              <a:rPr lang="es-ES" dirty="0" smtClean="0"/>
+              <a:t>. </a:t>
+            </a:r>
+            <a:r>
+              <a:rPr lang="es-ES" dirty="0" err="1" smtClean="0"/>
+              <a:t>HandlerRequest</a:t>
+            </a:r>
+            <a:r>
+              <a:rPr lang="es-ES" dirty="0" smtClean="0"/>
+              <a:t>(</a:t>
+            </a:r>
+            <a:r>
+              <a:rPr lang="es-ES" dirty="0" err="1" smtClean="0"/>
+              <a:t>group</a:t>
+            </a:r>
+            <a:r>
+              <a:rPr lang="es-ES" dirty="0" smtClean="0"/>
+              <a:t>, </a:t>
+            </a:r>
+            <a:r>
+              <a:rPr lang="es-ES" dirty="0" err="1" smtClean="0"/>
+              <a:t>rq</a:t>
+            </a:r>
+            <a:r>
+              <a:rPr lang="es-ES" dirty="0" smtClean="0"/>
+              <a:t>, </a:t>
+            </a:r>
+            <a:r>
+              <a:rPr lang="es-ES" dirty="0" err="1" smtClean="0"/>
+              <a:t>rs</a:t>
+            </a:r>
+            <a:r>
+              <a:rPr lang="es-ES" dirty="0" smtClean="0"/>
+              <a:t>, </a:t>
+            </a:r>
+            <a:r>
+              <a:rPr lang="es-ES" dirty="0" err="1" smtClean="0"/>
+              <a:t>rt</a:t>
+            </a:r>
+            <a:r>
+              <a:rPr lang="es-ES" dirty="0" smtClean="0"/>
+              <a:t>)</a:t>
+            </a:r>
+          </a:p>
+          <a:p>
+            <a:r>
+              <a:rPr lang="es-ES" dirty="0" smtClean="0"/>
+              <a:t>9. </a:t>
+            </a:r>
+            <a:r>
+              <a:rPr lang="es-ES" dirty="0" err="1" smtClean="0"/>
+              <a:t>HandlerRetransmission</a:t>
+            </a:r>
+            <a:r>
+              <a:rPr lang="es-ES" dirty="0" smtClean="0"/>
+              <a:t>(</a:t>
+            </a:r>
+            <a:r>
+              <a:rPr lang="es-ES" dirty="0" err="1" smtClean="0"/>
+              <a:t>group</a:t>
+            </a:r>
+            <a:r>
+              <a:rPr lang="es-ES" dirty="0" smtClean="0"/>
+              <a:t>, </a:t>
+            </a:r>
+            <a:r>
+              <a:rPr lang="es-ES" dirty="0" err="1" smtClean="0"/>
+              <a:t>rq</a:t>
+            </a:r>
+            <a:r>
+              <a:rPr lang="es-ES" dirty="0" smtClean="0"/>
+              <a:t>)</a:t>
+            </a:r>
+          </a:p>
+          <a:p>
+            <a:r>
+              <a:rPr lang="es-ES" dirty="0"/>
+              <a:t>9</a:t>
+            </a:r>
+            <a:r>
+              <a:rPr lang="es-ES" dirty="0" smtClean="0"/>
+              <a:t>. </a:t>
+            </a:r>
+            <a:r>
+              <a:rPr lang="es-ES" dirty="0" err="1" smtClean="0"/>
+              <a:t>HandlerTimeout</a:t>
+            </a:r>
+            <a:r>
+              <a:rPr lang="es-ES" dirty="0" smtClean="0"/>
+              <a:t>(</a:t>
+            </a:r>
+            <a:r>
+              <a:rPr lang="es-ES" dirty="0" err="1" smtClean="0"/>
+              <a:t>group</a:t>
+            </a:r>
+            <a:r>
+              <a:rPr lang="es-ES" dirty="0" smtClean="0"/>
+              <a:t>, </a:t>
+            </a:r>
+            <a:r>
+              <a:rPr lang="es-ES" dirty="0" err="1" smtClean="0"/>
+              <a:t>rq</a:t>
+            </a:r>
+            <a:r>
+              <a:rPr lang="es-ES" dirty="0" smtClean="0"/>
+              <a:t>)</a:t>
+            </a:r>
+          </a:p>
+          <a:p>
+            <a:endParaRPr lang="es-ES" dirty="0" smtClean="0"/>
+          </a:p>
+        </p:txBody>
+      </p:sp>
+    </p:spTree>
+    <p:extLst>
+      <p:ext uri="{BB962C8B-B14F-4D97-AF65-F5344CB8AC3E}">
+        <p14:creationId xmlns:p14="http://schemas.microsoft.com/office/powerpoint/2010/main" val="2495863582"/>
       </p:ext>
     </p:extLst>
   </p:cSld>

</xml_diff>

<commit_message>
Added performance to Kubernetes testing
</commit_message>
<xml_diff>
--- a/DiameterServerDesign.pptx
+++ b/DiameterServerDesign.pptx
@@ -11328,8 +11328,8 @@
         </p:nvSpPr>
         <p:spPr>
           <a:xfrm>
-            <a:off x="1584718" y="2007476"/>
-            <a:ext cx="1301318" cy="369332"/>
+            <a:off x="1498161" y="2007476"/>
+            <a:ext cx="1423147" cy="369332"/>
           </a:xfrm>
           <a:prstGeom prst="rect">
             <a:avLst/>
@@ -11343,8 +11343,8 @@
           <a:lstStyle/>
           <a:p>
             <a:r>
-              <a:rPr lang="es-ES" dirty="0" err="1" smtClean="0"/>
-              <a:t>Actualizació</a:t>
+              <a:rPr lang="es-ES" dirty="0" smtClean="0"/>
+              <a:t>Actualización</a:t>
             </a:r>
             <a:endParaRPr lang="es-ES" dirty="0"/>
           </a:p>
@@ -11511,7 +11511,7 @@
         <p:spPr>
           <a:xfrm>
             <a:off x="683063" y="221219"/>
-            <a:ext cx="4586384" cy="523220"/>
+            <a:ext cx="3393750" cy="523220"/>
           </a:xfrm>
           <a:prstGeom prst="rect">
             <a:avLst/>
@@ -11530,7 +11530,7 @@
             </a:r>
             <a:r>
               <a:rPr lang="es-ES" sz="2800" dirty="0" smtClean="0"/>
-              <a:t>KUBERNETES RADIUS</a:t>
+              <a:t>KUBERNETES</a:t>
             </a:r>
             <a:endParaRPr lang="es-ES" sz="2800" dirty="0"/>
           </a:p>
@@ -11903,8 +11903,46 @@
           <a:p>
             <a:pPr algn="ctr"/>
             <a:r>
+              <a:rPr lang="es-ES" dirty="0" smtClean="0"/>
+              <a:t>-</a:t>
+            </a:r>
+            <a:r>
+              <a:rPr lang="es-ES" dirty="0" err="1" smtClean="0"/>
+              <a:t>Diameter</a:t>
+            </a:r>
+            <a:r>
+              <a:rPr lang="es-ES" dirty="0" smtClean="0"/>
+              <a:t> </a:t>
+            </a:r>
+            <a:r>
+              <a:rPr lang="es-ES" dirty="0" smtClean="0">
+                <a:sym typeface="Wingdings" panose="05000000000000000000" pitchFamily="2" charset="2"/>
+              </a:rPr>
+              <a:t> </a:t>
+            </a:r>
+            <a:r>
+              <a:rPr lang="es-ES" dirty="0" err="1" smtClean="0">
+                <a:sym typeface="Wingdings" panose="05000000000000000000" pitchFamily="2" charset="2"/>
+              </a:rPr>
+              <a:t>Headless</a:t>
+            </a:r>
+            <a:r>
+              <a:rPr lang="es-ES" dirty="0" smtClean="0"/>
+              <a:t>, -radius </a:t>
+            </a:r>
+            <a:r>
+              <a:rPr lang="es-ES" dirty="0" smtClean="0">
+                <a:sym typeface="Wingdings" panose="05000000000000000000" pitchFamily="2" charset="2"/>
+              </a:rPr>
+              <a:t> </a:t>
+            </a:r>
+            <a:r>
               <a:rPr lang="es-ES" dirty="0" err="1" smtClean="0"/>
               <a:t>ClusterIP</a:t>
+            </a:r>
+            <a:r>
+              <a:rPr lang="es-ES" dirty="0" smtClean="0"/>
+              <a:t> </a:t>
             </a:r>
             <a:endParaRPr lang="es-ES" dirty="0"/>
           </a:p>
@@ -12215,7 +12253,7 @@
         </p:nvSpPr>
         <p:spPr>
           <a:xfrm>
-            <a:off x="750870" y="1555864"/>
+            <a:off x="1126976" y="1603161"/>
             <a:ext cx="1203086" cy="369332"/>
           </a:xfrm>
           <a:prstGeom prst="rect">
@@ -12245,8 +12283,8 @@
         </p:nvSpPr>
         <p:spPr>
           <a:xfrm>
-            <a:off x="683063" y="3051370"/>
-            <a:ext cx="1338700" cy="369332"/>
+            <a:off x="1126976" y="3098667"/>
+            <a:ext cx="1187056" cy="369332"/>
           </a:xfrm>
           <a:prstGeom prst="rect">
             <a:avLst/>
@@ -12261,7 +12299,7 @@
           <a:p>
             <a:r>
               <a:rPr lang="es-ES" dirty="0" err="1" smtClean="0"/>
-              <a:t>Deployment</a:t>
+              <a:t>Statefulset</a:t>
             </a:r>
             <a:endParaRPr lang="es-ES" dirty="0"/>
           </a:p>
@@ -12275,8 +12313,8 @@
         </p:nvSpPr>
         <p:spPr>
           <a:xfrm>
-            <a:off x="713264" y="4550981"/>
-            <a:ext cx="1278299" cy="369332"/>
+            <a:off x="1126976" y="4598278"/>
+            <a:ext cx="1187056" cy="369332"/>
           </a:xfrm>
           <a:prstGeom prst="rect">
             <a:avLst/>
@@ -12291,7 +12329,7 @@
           <a:p>
             <a:r>
               <a:rPr lang="es-ES" dirty="0" err="1" smtClean="0"/>
-              <a:t>DaemonSet</a:t>
+              <a:t>Statefulset</a:t>
             </a:r>
             <a:endParaRPr lang="es-ES" dirty="0"/>
           </a:p>
@@ -12305,7 +12343,7 @@
         </p:nvSpPr>
         <p:spPr>
           <a:xfrm>
-            <a:off x="253138" y="6292304"/>
+            <a:off x="697051" y="6339601"/>
             <a:ext cx="2198551" cy="369332"/>
           </a:xfrm>
           <a:prstGeom prst="rect">
@@ -12606,14 +12644,13 @@
           <p:cNvPr id="30" name="Conector recto de flecha 29"/>
           <p:cNvCxnSpPr>
             <a:stCxn id="11" idx="0"/>
-            <a:endCxn id="10" idx="2"/>
           </p:cNvCxnSpPr>
           <p:nvPr/>
         </p:nvCxnSpPr>
         <p:spPr>
           <a:xfrm flipV="1">
             <a:off x="4393324" y="4086785"/>
-            <a:ext cx="1240221" cy="310874"/>
+            <a:ext cx="1313289" cy="310874"/>
           </a:xfrm>
           <a:prstGeom prst="straightConnector1">
             <a:avLst/>
@@ -12752,6 +12789,72 @@
           <a:xfrm flipV="1">
             <a:off x="6193605" y="5285783"/>
             <a:ext cx="0" cy="884688"/>
+          </a:xfrm>
+          <a:prstGeom prst="straightConnector1">
+            <a:avLst/>
+          </a:prstGeom>
+          <a:ln>
+            <a:tailEnd type="triangle"/>
+          </a:ln>
+        </p:spPr>
+        <p:style>
+          <a:lnRef idx="1">
+            <a:schemeClr val="accent1"/>
+          </a:lnRef>
+          <a:fillRef idx="0">
+            <a:schemeClr val="accent1"/>
+          </a:fillRef>
+          <a:effectRef idx="0">
+            <a:schemeClr val="accent1"/>
+          </a:effectRef>
+          <a:fontRef idx="minor">
+            <a:schemeClr val="tx1"/>
+          </a:fontRef>
+        </p:style>
+      </p:cxnSp>
+      <p:cxnSp>
+        <p:nvCxnSpPr>
+          <p:cNvPr id="35" name="Conector recto de flecha 34"/>
+          <p:cNvCxnSpPr/>
+          <p:nvPr/>
+        </p:nvCxnSpPr>
+        <p:spPr>
+          <a:xfrm flipV="1">
+            <a:off x="4367049" y="3644242"/>
+            <a:ext cx="0" cy="722996"/>
+          </a:xfrm>
+          <a:prstGeom prst="straightConnector1">
+            <a:avLst/>
+          </a:prstGeom>
+          <a:ln>
+            <a:tailEnd type="triangle"/>
+          </a:ln>
+        </p:spPr>
+        <p:style>
+          <a:lnRef idx="1">
+            <a:schemeClr val="accent1"/>
+          </a:lnRef>
+          <a:fillRef idx="0">
+            <a:schemeClr val="accent1"/>
+          </a:fillRef>
+          <a:effectRef idx="0">
+            <a:schemeClr val="accent1"/>
+          </a:effectRef>
+          <a:fontRef idx="minor">
+            <a:schemeClr val="tx1"/>
+          </a:fontRef>
+        </p:style>
+      </p:cxnSp>
+      <p:cxnSp>
+        <p:nvCxnSpPr>
+          <p:cNvPr id="38" name="Conector recto de flecha 37"/>
+          <p:cNvCxnSpPr/>
+          <p:nvPr/>
+        </p:nvCxnSpPr>
+        <p:spPr>
+          <a:xfrm flipV="1">
+            <a:off x="6847490" y="3644242"/>
+            <a:ext cx="0" cy="722996"/>
           </a:xfrm>
           <a:prstGeom prst="straightConnector1">
             <a:avLst/>
@@ -12815,14 +12918,213 @@
       </p:grpSpPr>
       <p:sp>
         <p:nvSpPr>
-          <p:cNvPr id="2" name="CuadroTexto 1"/>
+          <p:cNvPr id="20" name="CuadroTexto 19"/>
           <p:cNvSpPr txBox="1"/>
           <p:nvPr/>
         </p:nvSpPr>
         <p:spPr>
           <a:xfrm>
+            <a:off x="683063" y="1135117"/>
+            <a:ext cx="7898524" cy="4247317"/>
+          </a:xfrm>
+          <a:prstGeom prst="rect">
+            <a:avLst/>
+          </a:prstGeom>
+          <a:noFill/>
+        </p:spPr>
+        <p:txBody>
+          <a:bodyPr wrap="square" rtlCol="0">
+            <a:spAutoFit/>
+          </a:bodyPr>
+          <a:lstStyle/>
+          <a:p>
+            <a:r>
+              <a:rPr lang="es-ES" dirty="0" smtClean="0"/>
+              <a:t>No es posible configurar direcciones IP concretas dentro del </a:t>
+            </a:r>
+            <a:r>
+              <a:rPr lang="es-ES" dirty="0" err="1" smtClean="0"/>
+              <a:t>cluster</a:t>
+            </a:r>
+            <a:r>
+              <a:rPr lang="es-ES" dirty="0" smtClean="0"/>
+              <a:t>. Por lo tanto</a:t>
+            </a:r>
+          </a:p>
+          <a:p>
+            <a:endParaRPr lang="es-ES" dirty="0" smtClean="0"/>
+          </a:p>
+          <a:p>
+            <a:pPr marL="285750" indent="-285750">
+              <a:buFont typeface="Arial" panose="020B0604020202020204" pitchFamily="34" charset="0"/>
+              <a:buChar char="•"/>
+            </a:pPr>
+            <a:r>
+              <a:rPr lang="es-ES" dirty="0" smtClean="0"/>
+              <a:t>Los servidores </a:t>
+            </a:r>
+            <a:r>
+              <a:rPr lang="es-ES" dirty="0" err="1" smtClean="0"/>
+              <a:t>Diameter</a:t>
+            </a:r>
+            <a:r>
+              <a:rPr lang="es-ES" dirty="0" smtClean="0"/>
+              <a:t> pueden declarar </a:t>
+            </a:r>
+            <a:r>
+              <a:rPr lang="es-ES" dirty="0" err="1" smtClean="0"/>
+              <a:t>peers</a:t>
+            </a:r>
+            <a:r>
+              <a:rPr lang="es-ES" dirty="0" smtClean="0"/>
+              <a:t> con subredes permitidas, y obtienen la identidad del peer remoto tras el CER.</a:t>
+            </a:r>
+          </a:p>
+          <a:p>
+            <a:pPr marL="285750" indent="-285750">
+              <a:buFont typeface="Arial" panose="020B0604020202020204" pitchFamily="34" charset="0"/>
+              <a:buChar char="•"/>
+            </a:pPr>
+            <a:endParaRPr lang="es-ES" dirty="0"/>
+          </a:p>
+          <a:p>
+            <a:pPr marL="285750" indent="-285750">
+              <a:buFont typeface="Arial" panose="020B0604020202020204" pitchFamily="34" charset="0"/>
+              <a:buChar char="•"/>
+            </a:pPr>
+            <a:r>
+              <a:rPr lang="es-ES" dirty="0" smtClean="0"/>
+              <a:t>Los servidores radius pueden declarar como clientes subredes completas</a:t>
+            </a:r>
+            <a:endParaRPr lang="es-ES" dirty="0" smtClean="0"/>
+          </a:p>
+          <a:p>
+            <a:endParaRPr lang="es-ES" dirty="0" smtClean="0"/>
+          </a:p>
+          <a:p>
+            <a:r>
+              <a:rPr lang="es-ES" dirty="0" smtClean="0"/>
+              <a:t>Las conexiones entrantes, tanto a Radius como a </a:t>
+            </a:r>
+            <a:r>
+              <a:rPr lang="es-ES" dirty="0" err="1" smtClean="0"/>
+              <a:t>Diameter</a:t>
+            </a:r>
+            <a:r>
+              <a:rPr lang="es-ES" dirty="0" smtClean="0"/>
+              <a:t>, reciben direcciones IP modificadas por NAT origen, por lo que no se pueden emplear para identificar clientes radius ni </a:t>
+            </a:r>
+            <a:r>
+              <a:rPr lang="es-ES" dirty="0" err="1" smtClean="0"/>
+              <a:t>peers</a:t>
+            </a:r>
+            <a:r>
+              <a:rPr lang="es-ES" dirty="0" smtClean="0"/>
+              <a:t> </a:t>
+            </a:r>
+            <a:r>
+              <a:rPr lang="es-ES" dirty="0" err="1" smtClean="0"/>
+              <a:t>diameter</a:t>
+            </a:r>
+            <a:r>
+              <a:rPr lang="es-ES" dirty="0" smtClean="0"/>
+              <a:t>.</a:t>
+            </a:r>
+          </a:p>
+          <a:p>
+            <a:endParaRPr lang="es-ES" dirty="0"/>
+          </a:p>
+          <a:p>
+            <a:r>
+              <a:rPr lang="es-ES" dirty="0" err="1"/>
+              <a:t>Superserver</a:t>
+            </a:r>
+            <a:r>
+              <a:rPr lang="es-ES" dirty="0"/>
+              <a:t> </a:t>
+            </a:r>
+            <a:r>
+              <a:rPr lang="es-ES" dirty="0" err="1"/>
+              <a:t>Diameter</a:t>
+            </a:r>
+            <a:r>
+              <a:rPr lang="es-ES" dirty="0"/>
+              <a:t> expone dos </a:t>
+            </a:r>
+            <a:r>
+              <a:rPr lang="es-ES" dirty="0" err="1"/>
+              <a:t>peers</a:t>
+            </a:r>
+            <a:r>
+              <a:rPr lang="es-ES" dirty="0"/>
+              <a:t> </a:t>
+            </a:r>
+            <a:r>
+              <a:rPr lang="es-ES" dirty="0" err="1"/>
+              <a:t>disntintos</a:t>
+            </a:r>
+            <a:r>
+              <a:rPr lang="es-ES" dirty="0"/>
+              <a:t> yaas-superserver-0.yaassuperserver y </a:t>
+            </a:r>
+            <a:r>
+              <a:rPr lang="es-ES" dirty="0" smtClean="0"/>
+              <a:t>yaas-superserver-1.yaassuperserver</a:t>
+            </a:r>
+          </a:p>
+          <a:p>
+            <a:endParaRPr lang="es-ES" dirty="0"/>
+          </a:p>
+          <a:p>
+            <a:r>
+              <a:rPr lang="es-ES" dirty="0" err="1" smtClean="0"/>
+              <a:t>Superserver</a:t>
+            </a:r>
+            <a:r>
+              <a:rPr lang="es-ES" dirty="0" smtClean="0"/>
+              <a:t> Radius expone </a:t>
+            </a:r>
+            <a:r>
+              <a:rPr lang="es-ES" dirty="0"/>
+              <a:t>un único </a:t>
+            </a:r>
+            <a:r>
+              <a:rPr lang="es-ES" dirty="0" err="1"/>
+              <a:t>ClusterIP</a:t>
+            </a:r>
+            <a:r>
+              <a:rPr lang="es-ES" dirty="0"/>
+              <a:t> en </a:t>
+            </a:r>
+            <a:r>
+              <a:rPr lang="es-ES" dirty="0" err="1"/>
+              <a:t>yaas</a:t>
+            </a:r>
+            <a:r>
+              <a:rPr lang="es-ES" dirty="0"/>
+              <a:t>-</a:t>
+            </a:r>
+            <a:r>
+              <a:rPr lang="es-ES" dirty="0" err="1"/>
+              <a:t>superserver</a:t>
+            </a:r>
+            <a:r>
+              <a:rPr lang="es-ES" dirty="0"/>
+              <a:t>-radius</a:t>
+            </a:r>
+          </a:p>
+        </p:txBody>
+      </p:sp>
+      <p:sp>
+        <p:nvSpPr>
+          <p:cNvPr id="4" name="CuadroTexto 3"/>
+          <p:cNvSpPr txBox="1"/>
+          <p:nvPr/>
+        </p:nvSpPr>
+        <p:spPr>
+          <a:xfrm>
             <a:off x="683063" y="221219"/>
-            <a:ext cx="5022401" cy="523220"/>
+            <a:ext cx="3393750" cy="523220"/>
           </a:xfrm>
           <a:prstGeom prst="rect">
             <a:avLst/>
@@ -12841,1255 +13143,16 @@
             </a:r>
             <a:r>
               <a:rPr lang="es-ES" sz="2800" dirty="0" smtClean="0"/>
-              <a:t>KUBERNETES DIAMETER</a:t>
+              <a:t>KUBERNETES</a:t>
             </a:r>
             <a:endParaRPr lang="es-ES" sz="2800" dirty="0"/>
           </a:p>
         </p:txBody>
       </p:sp>
-      <p:sp>
-        <p:nvSpPr>
-          <p:cNvPr id="3" name="Rectángulo 2"/>
-          <p:cNvSpPr/>
-          <p:nvPr/>
-        </p:nvSpPr>
-        <p:spPr>
-          <a:xfrm>
-            <a:off x="4624550" y="6170471"/>
-            <a:ext cx="2017986" cy="888124"/>
-          </a:xfrm>
-          <a:prstGeom prst="rect">
-            <a:avLst/>
-          </a:prstGeom>
-        </p:spPr>
-        <p:style>
-          <a:lnRef idx="2">
-            <a:schemeClr val="accent1">
-              <a:shade val="50000"/>
-            </a:schemeClr>
-          </a:lnRef>
-          <a:fillRef idx="1">
-            <a:schemeClr val="accent1"/>
-          </a:fillRef>
-          <a:effectRef idx="0">
-            <a:schemeClr val="accent1"/>
-          </a:effectRef>
-          <a:fontRef idx="minor">
-            <a:schemeClr val="lt1"/>
-          </a:fontRef>
-        </p:style>
-        <p:txBody>
-          <a:bodyPr rtlCol="0" anchor="ctr"/>
-          <a:lstStyle/>
-          <a:p>
-            <a:pPr algn="ctr"/>
-            <a:r>
-              <a:rPr lang="es-ES" sz="2800" dirty="0" err="1" smtClean="0"/>
-              <a:t>Client</a:t>
-            </a:r>
-            <a:endParaRPr lang="es-ES" sz="2800" dirty="0"/>
-          </a:p>
-        </p:txBody>
-      </p:sp>
-      <p:sp>
-        <p:nvSpPr>
-          <p:cNvPr id="4" name="Rectángulo 3"/>
-          <p:cNvSpPr/>
-          <p:nvPr/>
-        </p:nvSpPr>
-        <p:spPr>
-          <a:xfrm>
-            <a:off x="5864773" y="4397659"/>
-            <a:ext cx="2017986" cy="888124"/>
-          </a:xfrm>
-          <a:prstGeom prst="rect">
-            <a:avLst/>
-          </a:prstGeom>
-        </p:spPr>
-        <p:style>
-          <a:lnRef idx="2">
-            <a:schemeClr val="accent1">
-              <a:shade val="50000"/>
-            </a:schemeClr>
-          </a:lnRef>
-          <a:fillRef idx="1">
-            <a:schemeClr val="accent1"/>
-          </a:fillRef>
-          <a:effectRef idx="0">
-            <a:schemeClr val="accent1"/>
-          </a:effectRef>
-          <a:fontRef idx="minor">
-            <a:schemeClr val="lt1"/>
-          </a:fontRef>
-        </p:style>
-        <p:txBody>
-          <a:bodyPr rtlCol="0" anchor="ctr"/>
-          <a:lstStyle/>
-          <a:p>
-            <a:pPr algn="ctr"/>
-            <a:r>
-              <a:rPr lang="es-ES" sz="2800" dirty="0" err="1" smtClean="0"/>
-              <a:t>Yaas</a:t>
-            </a:r>
-            <a:r>
-              <a:rPr lang="es-ES" sz="2800" dirty="0" smtClean="0"/>
-              <a:t>-server</a:t>
-            </a:r>
-            <a:endParaRPr lang="es-ES" sz="2800" dirty="0"/>
-          </a:p>
-        </p:txBody>
-      </p:sp>
-      <p:sp>
-        <p:nvSpPr>
-          <p:cNvPr id="5" name="Rectángulo 4"/>
-          <p:cNvSpPr/>
-          <p:nvPr/>
-        </p:nvSpPr>
-        <p:spPr>
-          <a:xfrm>
-            <a:off x="5864773" y="2871732"/>
-            <a:ext cx="2017986" cy="772510"/>
-          </a:xfrm>
-          <a:prstGeom prst="rect">
-            <a:avLst/>
-          </a:prstGeom>
-        </p:spPr>
-        <p:style>
-          <a:lnRef idx="2">
-            <a:schemeClr val="accent1">
-              <a:shade val="50000"/>
-            </a:schemeClr>
-          </a:lnRef>
-          <a:fillRef idx="1">
-            <a:schemeClr val="accent1"/>
-          </a:fillRef>
-          <a:effectRef idx="0">
-            <a:schemeClr val="accent1"/>
-          </a:effectRef>
-          <a:fontRef idx="minor">
-            <a:schemeClr val="lt1"/>
-          </a:fontRef>
-        </p:style>
-        <p:txBody>
-          <a:bodyPr rtlCol="0" anchor="ctr"/>
-          <a:lstStyle/>
-          <a:p>
-            <a:pPr algn="ctr"/>
-            <a:r>
-              <a:rPr lang="es-ES" sz="2400" dirty="0" smtClean="0"/>
-              <a:t>Yaas-superserver-1</a:t>
-            </a:r>
-            <a:endParaRPr lang="es-ES" sz="2400" dirty="0"/>
-          </a:p>
-        </p:txBody>
-      </p:sp>
-      <p:sp>
-        <p:nvSpPr>
-          <p:cNvPr id="6" name="Rectángulo 5"/>
-          <p:cNvSpPr/>
-          <p:nvPr/>
-        </p:nvSpPr>
-        <p:spPr>
-          <a:xfrm>
-            <a:off x="5864773" y="1376226"/>
-            <a:ext cx="2017986" cy="772510"/>
-          </a:xfrm>
-          <a:prstGeom prst="rect">
-            <a:avLst/>
-          </a:prstGeom>
-        </p:spPr>
-        <p:style>
-          <a:lnRef idx="2">
-            <a:schemeClr val="accent1">
-              <a:shade val="50000"/>
-            </a:schemeClr>
-          </a:lnRef>
-          <a:fillRef idx="1">
-            <a:schemeClr val="accent1"/>
-          </a:fillRef>
-          <a:effectRef idx="0">
-            <a:schemeClr val="accent1"/>
-          </a:effectRef>
-          <a:fontRef idx="minor">
-            <a:schemeClr val="lt1"/>
-          </a:fontRef>
-        </p:style>
-        <p:txBody>
-          <a:bodyPr rtlCol="0" anchor="ctr"/>
-          <a:lstStyle/>
-          <a:p>
-            <a:pPr algn="ctr"/>
-            <a:r>
-              <a:rPr lang="es-ES" sz="2800" dirty="0" smtClean="0"/>
-              <a:t>Yaas-db-0</a:t>
-            </a:r>
-            <a:endParaRPr lang="es-ES" sz="2800" dirty="0"/>
-          </a:p>
-        </p:txBody>
-      </p:sp>
-      <p:sp>
-        <p:nvSpPr>
-          <p:cNvPr id="7" name="Rectángulo 6"/>
-          <p:cNvSpPr/>
-          <p:nvPr/>
-        </p:nvSpPr>
-        <p:spPr>
-          <a:xfrm>
-            <a:off x="3384332" y="1376226"/>
-            <a:ext cx="2017986" cy="772510"/>
-          </a:xfrm>
-          <a:prstGeom prst="rect">
-            <a:avLst/>
-          </a:prstGeom>
-        </p:spPr>
-        <p:style>
-          <a:lnRef idx="2">
-            <a:schemeClr val="accent1">
-              <a:shade val="50000"/>
-            </a:schemeClr>
-          </a:lnRef>
-          <a:fillRef idx="1">
-            <a:schemeClr val="accent1"/>
-          </a:fillRef>
-          <a:effectRef idx="0">
-            <a:schemeClr val="accent1"/>
-          </a:effectRef>
-          <a:fontRef idx="minor">
-            <a:schemeClr val="lt1"/>
-          </a:fontRef>
-        </p:style>
-        <p:txBody>
-          <a:bodyPr rtlCol="0" anchor="ctr"/>
-          <a:lstStyle/>
-          <a:p>
-            <a:pPr algn="ctr"/>
-            <a:r>
-              <a:rPr lang="es-ES" sz="2800" dirty="0" smtClean="0"/>
-              <a:t>Yaas-db-1</a:t>
-            </a:r>
-            <a:endParaRPr lang="es-ES" sz="2800" dirty="0"/>
-          </a:p>
-        </p:txBody>
-      </p:sp>
-      <p:sp>
-        <p:nvSpPr>
-          <p:cNvPr id="8" name="Rectángulo 7"/>
-          <p:cNvSpPr/>
-          <p:nvPr/>
-        </p:nvSpPr>
-        <p:spPr>
-          <a:xfrm>
-            <a:off x="3384332" y="2871732"/>
-            <a:ext cx="2017986" cy="772510"/>
-          </a:xfrm>
-          <a:prstGeom prst="rect">
-            <a:avLst/>
-          </a:prstGeom>
-        </p:spPr>
-        <p:style>
-          <a:lnRef idx="2">
-            <a:schemeClr val="accent1">
-              <a:shade val="50000"/>
-            </a:schemeClr>
-          </a:lnRef>
-          <a:fillRef idx="1">
-            <a:schemeClr val="accent1"/>
-          </a:fillRef>
-          <a:effectRef idx="0">
-            <a:schemeClr val="accent1"/>
-          </a:effectRef>
-          <a:fontRef idx="minor">
-            <a:schemeClr val="lt1"/>
-          </a:fontRef>
-        </p:style>
-        <p:txBody>
-          <a:bodyPr rtlCol="0" anchor="ctr"/>
-          <a:lstStyle/>
-          <a:p>
-            <a:pPr algn="ctr"/>
-            <a:r>
-              <a:rPr lang="es-ES" sz="2400" dirty="0" smtClean="0"/>
-              <a:t>Yaas-superserver-0</a:t>
-            </a:r>
-            <a:endParaRPr lang="es-ES" sz="2400" dirty="0"/>
-          </a:p>
-        </p:txBody>
-      </p:sp>
-      <p:sp>
-        <p:nvSpPr>
-          <p:cNvPr id="9" name="Rectángulo 8"/>
-          <p:cNvSpPr/>
-          <p:nvPr/>
-        </p:nvSpPr>
-        <p:spPr>
-          <a:xfrm>
-            <a:off x="3384332" y="2292185"/>
-            <a:ext cx="4498427" cy="296508"/>
-          </a:xfrm>
-          <a:prstGeom prst="rect">
-            <a:avLst/>
-          </a:prstGeom>
-          <a:solidFill>
-            <a:schemeClr val="accent2">
-              <a:lumMod val="60000"/>
-              <a:lumOff val="40000"/>
-            </a:schemeClr>
-          </a:solidFill>
-          <a:ln>
-            <a:noFill/>
-          </a:ln>
-        </p:spPr>
-        <p:style>
-          <a:lnRef idx="2">
-            <a:schemeClr val="accent1">
-              <a:shade val="50000"/>
-            </a:schemeClr>
-          </a:lnRef>
-          <a:fillRef idx="1">
-            <a:schemeClr val="accent1"/>
-          </a:fillRef>
-          <a:effectRef idx="0">
-            <a:schemeClr val="accent1"/>
-          </a:effectRef>
-          <a:fontRef idx="minor">
-            <a:schemeClr val="lt1"/>
-          </a:fontRef>
-        </p:style>
-        <p:txBody>
-          <a:bodyPr rtlCol="0" anchor="ctr"/>
-          <a:lstStyle/>
-          <a:p>
-            <a:pPr algn="ctr"/>
-            <a:r>
-              <a:rPr lang="es-ES" dirty="0" err="1" smtClean="0"/>
-              <a:t>Headless</a:t>
-            </a:r>
-            <a:endParaRPr lang="es-ES" dirty="0"/>
-          </a:p>
-        </p:txBody>
-      </p:sp>
-      <p:sp>
-        <p:nvSpPr>
-          <p:cNvPr id="10" name="Rectángulo 9"/>
-          <p:cNvSpPr/>
-          <p:nvPr/>
-        </p:nvSpPr>
-        <p:spPr>
-          <a:xfrm>
-            <a:off x="3384331" y="3790277"/>
-            <a:ext cx="4498427" cy="296508"/>
-          </a:xfrm>
-          <a:prstGeom prst="rect">
-            <a:avLst/>
-          </a:prstGeom>
-          <a:solidFill>
-            <a:schemeClr val="accent2">
-              <a:lumMod val="60000"/>
-              <a:lumOff val="40000"/>
-            </a:schemeClr>
-          </a:solidFill>
-          <a:ln>
-            <a:noFill/>
-          </a:ln>
-        </p:spPr>
-        <p:style>
-          <a:lnRef idx="2">
-            <a:schemeClr val="accent1">
-              <a:shade val="50000"/>
-            </a:schemeClr>
-          </a:lnRef>
-          <a:fillRef idx="1">
-            <a:schemeClr val="accent1"/>
-          </a:fillRef>
-          <a:effectRef idx="0">
-            <a:schemeClr val="accent1"/>
-          </a:effectRef>
-          <a:fontRef idx="minor">
-            <a:schemeClr val="lt1"/>
-          </a:fontRef>
-        </p:style>
-        <p:txBody>
-          <a:bodyPr rtlCol="0" anchor="ctr"/>
-          <a:lstStyle/>
-          <a:p>
-            <a:pPr algn="ctr"/>
-            <a:r>
-              <a:rPr lang="es-ES" dirty="0" err="1" smtClean="0"/>
-              <a:t>Headless</a:t>
-            </a:r>
-            <a:endParaRPr lang="es-ES" dirty="0"/>
-          </a:p>
-        </p:txBody>
-      </p:sp>
-      <p:sp>
-        <p:nvSpPr>
-          <p:cNvPr id="11" name="Rectángulo 10"/>
-          <p:cNvSpPr/>
-          <p:nvPr/>
-        </p:nvSpPr>
-        <p:spPr>
-          <a:xfrm>
-            <a:off x="3384331" y="4397659"/>
-            <a:ext cx="2017986" cy="888124"/>
-          </a:xfrm>
-          <a:prstGeom prst="rect">
-            <a:avLst/>
-          </a:prstGeom>
-        </p:spPr>
-        <p:style>
-          <a:lnRef idx="2">
-            <a:schemeClr val="accent1">
-              <a:shade val="50000"/>
-            </a:schemeClr>
-          </a:lnRef>
-          <a:fillRef idx="1">
-            <a:schemeClr val="accent1"/>
-          </a:fillRef>
-          <a:effectRef idx="0">
-            <a:schemeClr val="accent1"/>
-          </a:effectRef>
-          <a:fontRef idx="minor">
-            <a:schemeClr val="lt1"/>
-          </a:fontRef>
-        </p:style>
-        <p:txBody>
-          <a:bodyPr rtlCol="0" anchor="ctr"/>
-          <a:lstStyle/>
-          <a:p>
-            <a:pPr algn="ctr"/>
-            <a:r>
-              <a:rPr lang="es-ES" sz="2800" dirty="0" err="1" smtClean="0"/>
-              <a:t>Yaas</a:t>
-            </a:r>
-            <a:r>
-              <a:rPr lang="es-ES" sz="2800" dirty="0" smtClean="0"/>
-              <a:t>-server</a:t>
-            </a:r>
-            <a:endParaRPr lang="es-ES" sz="2800" dirty="0"/>
-          </a:p>
-        </p:txBody>
-      </p:sp>
-      <p:sp>
-        <p:nvSpPr>
-          <p:cNvPr id="12" name="Rectángulo 11"/>
-          <p:cNvSpPr/>
-          <p:nvPr/>
-        </p:nvSpPr>
-        <p:spPr>
-          <a:xfrm>
-            <a:off x="3384330" y="5480040"/>
-            <a:ext cx="4498427" cy="296508"/>
-          </a:xfrm>
-          <a:prstGeom prst="rect">
-            <a:avLst/>
-          </a:prstGeom>
-          <a:solidFill>
-            <a:schemeClr val="accent2">
-              <a:lumMod val="60000"/>
-              <a:lumOff val="40000"/>
-            </a:schemeClr>
-          </a:solidFill>
-          <a:ln>
-            <a:noFill/>
-          </a:ln>
-        </p:spPr>
-        <p:style>
-          <a:lnRef idx="2">
-            <a:schemeClr val="accent1">
-              <a:shade val="50000"/>
-            </a:schemeClr>
-          </a:lnRef>
-          <a:fillRef idx="1">
-            <a:schemeClr val="accent1"/>
-          </a:fillRef>
-          <a:effectRef idx="0">
-            <a:schemeClr val="accent1"/>
-          </a:effectRef>
-          <a:fontRef idx="minor">
-            <a:schemeClr val="lt1"/>
-          </a:fontRef>
-        </p:style>
-        <p:txBody>
-          <a:bodyPr rtlCol="0" anchor="ctr"/>
-          <a:lstStyle/>
-          <a:p>
-            <a:pPr algn="ctr"/>
-            <a:r>
-              <a:rPr lang="es-ES" dirty="0" err="1" smtClean="0"/>
-              <a:t>NodePort</a:t>
-            </a:r>
-            <a:endParaRPr lang="es-ES" dirty="0"/>
-          </a:p>
-        </p:txBody>
-      </p:sp>
-      <p:sp>
-        <p:nvSpPr>
-          <p:cNvPr id="13" name="Cilindro 12"/>
-          <p:cNvSpPr/>
-          <p:nvPr/>
-        </p:nvSpPr>
-        <p:spPr>
-          <a:xfrm>
-            <a:off x="3273426" y="1114429"/>
-            <a:ext cx="882915" cy="441435"/>
-          </a:xfrm>
-          <a:prstGeom prst="can">
-            <a:avLst/>
-          </a:prstGeom>
-          <a:solidFill>
-            <a:schemeClr val="accent6">
-              <a:lumMod val="60000"/>
-              <a:lumOff val="40000"/>
-            </a:schemeClr>
-          </a:solidFill>
-          <a:ln>
-            <a:noFill/>
-          </a:ln>
-        </p:spPr>
-        <p:style>
-          <a:lnRef idx="2">
-            <a:schemeClr val="accent1">
-              <a:shade val="50000"/>
-            </a:schemeClr>
-          </a:lnRef>
-          <a:fillRef idx="1">
-            <a:schemeClr val="accent1"/>
-          </a:fillRef>
-          <a:effectRef idx="0">
-            <a:schemeClr val="accent1"/>
-          </a:effectRef>
-          <a:fontRef idx="minor">
-            <a:schemeClr val="lt1"/>
-          </a:fontRef>
-        </p:style>
-        <p:txBody>
-          <a:bodyPr rtlCol="0" anchor="ctr"/>
-          <a:lstStyle/>
-          <a:p>
-            <a:pPr algn="ctr"/>
-            <a:endParaRPr lang="es-ES"/>
-          </a:p>
-        </p:txBody>
-      </p:sp>
-      <p:sp>
-        <p:nvSpPr>
-          <p:cNvPr id="14" name="Cilindro 13"/>
-          <p:cNvSpPr/>
-          <p:nvPr/>
-        </p:nvSpPr>
-        <p:spPr>
-          <a:xfrm>
-            <a:off x="4624550" y="1114429"/>
-            <a:ext cx="882915" cy="441435"/>
-          </a:xfrm>
-          <a:prstGeom prst="can">
-            <a:avLst/>
-          </a:prstGeom>
-          <a:solidFill>
-            <a:schemeClr val="accent6">
-              <a:lumMod val="60000"/>
-              <a:lumOff val="40000"/>
-            </a:schemeClr>
-          </a:solidFill>
-          <a:ln>
-            <a:noFill/>
-          </a:ln>
-        </p:spPr>
-        <p:style>
-          <a:lnRef idx="2">
-            <a:schemeClr val="accent1">
-              <a:shade val="50000"/>
-            </a:schemeClr>
-          </a:lnRef>
-          <a:fillRef idx="1">
-            <a:schemeClr val="accent1"/>
-          </a:fillRef>
-          <a:effectRef idx="0">
-            <a:schemeClr val="accent1"/>
-          </a:effectRef>
-          <a:fontRef idx="minor">
-            <a:schemeClr val="lt1"/>
-          </a:fontRef>
-        </p:style>
-        <p:txBody>
-          <a:bodyPr rtlCol="0" anchor="ctr"/>
-          <a:lstStyle/>
-          <a:p>
-            <a:pPr algn="ctr"/>
-            <a:endParaRPr lang="es-ES"/>
-          </a:p>
-        </p:txBody>
-      </p:sp>
-      <p:sp>
-        <p:nvSpPr>
-          <p:cNvPr id="15" name="Cilindro 14"/>
-          <p:cNvSpPr/>
-          <p:nvPr/>
-        </p:nvSpPr>
-        <p:spPr>
-          <a:xfrm>
-            <a:off x="5738605" y="1114429"/>
-            <a:ext cx="882915" cy="441435"/>
-          </a:xfrm>
-          <a:prstGeom prst="can">
-            <a:avLst/>
-          </a:prstGeom>
-          <a:solidFill>
-            <a:schemeClr val="accent6">
-              <a:lumMod val="60000"/>
-              <a:lumOff val="40000"/>
-            </a:schemeClr>
-          </a:solidFill>
-          <a:ln>
-            <a:noFill/>
-          </a:ln>
-        </p:spPr>
-        <p:style>
-          <a:lnRef idx="2">
-            <a:schemeClr val="accent1">
-              <a:shade val="50000"/>
-            </a:schemeClr>
-          </a:lnRef>
-          <a:fillRef idx="1">
-            <a:schemeClr val="accent1"/>
-          </a:fillRef>
-          <a:effectRef idx="0">
-            <a:schemeClr val="accent1"/>
-          </a:effectRef>
-          <a:fontRef idx="minor">
-            <a:schemeClr val="lt1"/>
-          </a:fontRef>
-        </p:style>
-        <p:txBody>
-          <a:bodyPr rtlCol="0" anchor="ctr"/>
-          <a:lstStyle/>
-          <a:p>
-            <a:pPr algn="ctr"/>
-            <a:endParaRPr lang="es-ES"/>
-          </a:p>
-        </p:txBody>
-      </p:sp>
-      <p:sp>
-        <p:nvSpPr>
-          <p:cNvPr id="16" name="Cilindro 15"/>
-          <p:cNvSpPr/>
-          <p:nvPr/>
-        </p:nvSpPr>
-        <p:spPr>
-          <a:xfrm>
-            <a:off x="7089729" y="1114429"/>
-            <a:ext cx="882915" cy="441435"/>
-          </a:xfrm>
-          <a:prstGeom prst="can">
-            <a:avLst/>
-          </a:prstGeom>
-          <a:solidFill>
-            <a:schemeClr val="accent6">
-              <a:lumMod val="60000"/>
-              <a:lumOff val="40000"/>
-            </a:schemeClr>
-          </a:solidFill>
-          <a:ln>
-            <a:noFill/>
-          </a:ln>
-        </p:spPr>
-        <p:style>
-          <a:lnRef idx="2">
-            <a:schemeClr val="accent1">
-              <a:shade val="50000"/>
-            </a:schemeClr>
-          </a:lnRef>
-          <a:fillRef idx="1">
-            <a:schemeClr val="accent1"/>
-          </a:fillRef>
-          <a:effectRef idx="0">
-            <a:schemeClr val="accent1"/>
-          </a:effectRef>
-          <a:fontRef idx="minor">
-            <a:schemeClr val="lt1"/>
-          </a:fontRef>
-        </p:style>
-        <p:txBody>
-          <a:bodyPr rtlCol="0" anchor="ctr"/>
-          <a:lstStyle/>
-          <a:p>
-            <a:pPr algn="ctr"/>
-            <a:endParaRPr lang="es-ES"/>
-          </a:p>
-        </p:txBody>
-      </p:sp>
-      <p:sp>
-        <p:nvSpPr>
-          <p:cNvPr id="17" name="CuadroTexto 16"/>
-          <p:cNvSpPr txBox="1"/>
-          <p:nvPr/>
-        </p:nvSpPr>
-        <p:spPr>
-          <a:xfrm>
-            <a:off x="750870" y="1555864"/>
-            <a:ext cx="1203086" cy="369332"/>
-          </a:xfrm>
-          <a:prstGeom prst="rect">
-            <a:avLst/>
-          </a:prstGeom>
-          <a:noFill/>
-        </p:spPr>
-        <p:txBody>
-          <a:bodyPr wrap="none" rtlCol="0">
-            <a:spAutoFit/>
-          </a:bodyPr>
-          <a:lstStyle/>
-          <a:p>
-            <a:r>
-              <a:rPr lang="es-ES" dirty="0" err="1" smtClean="0"/>
-              <a:t>StatefulSet</a:t>
-            </a:r>
-            <a:endParaRPr lang="es-ES" dirty="0"/>
-          </a:p>
-        </p:txBody>
-      </p:sp>
-      <p:sp>
-        <p:nvSpPr>
-          <p:cNvPr id="18" name="CuadroTexto 17"/>
-          <p:cNvSpPr txBox="1"/>
-          <p:nvPr/>
-        </p:nvSpPr>
-        <p:spPr>
-          <a:xfrm>
-            <a:off x="750870" y="3053422"/>
-            <a:ext cx="1203086" cy="369332"/>
-          </a:xfrm>
-          <a:prstGeom prst="rect">
-            <a:avLst/>
-          </a:prstGeom>
-          <a:noFill/>
-        </p:spPr>
-        <p:txBody>
-          <a:bodyPr wrap="none" rtlCol="0">
-            <a:spAutoFit/>
-          </a:bodyPr>
-          <a:lstStyle/>
-          <a:p>
-            <a:r>
-              <a:rPr lang="es-ES" dirty="0" err="1" smtClean="0"/>
-              <a:t>StatefulSet</a:t>
-            </a:r>
-            <a:endParaRPr lang="es-ES" dirty="0"/>
-          </a:p>
-        </p:txBody>
-      </p:sp>
-      <p:sp>
-        <p:nvSpPr>
-          <p:cNvPr id="19" name="CuadroTexto 18"/>
-          <p:cNvSpPr txBox="1"/>
-          <p:nvPr/>
-        </p:nvSpPr>
-        <p:spPr>
-          <a:xfrm>
-            <a:off x="713264" y="4550981"/>
-            <a:ext cx="1278299" cy="369332"/>
-          </a:xfrm>
-          <a:prstGeom prst="rect">
-            <a:avLst/>
-          </a:prstGeom>
-          <a:noFill/>
-        </p:spPr>
-        <p:txBody>
-          <a:bodyPr wrap="none" rtlCol="0">
-            <a:spAutoFit/>
-          </a:bodyPr>
-          <a:lstStyle/>
-          <a:p>
-            <a:r>
-              <a:rPr lang="es-ES" dirty="0" err="1" smtClean="0"/>
-              <a:t>DaemonSet</a:t>
-            </a:r>
-            <a:endParaRPr lang="es-ES" dirty="0"/>
-          </a:p>
-        </p:txBody>
-      </p:sp>
-      <p:sp>
-        <p:nvSpPr>
-          <p:cNvPr id="20" name="CuadroTexto 19"/>
-          <p:cNvSpPr txBox="1"/>
-          <p:nvPr/>
-        </p:nvSpPr>
-        <p:spPr>
-          <a:xfrm>
-            <a:off x="253138" y="6292304"/>
-            <a:ext cx="2198551" cy="369332"/>
-          </a:xfrm>
-          <a:prstGeom prst="rect">
-            <a:avLst/>
-          </a:prstGeom>
-          <a:noFill/>
-        </p:spPr>
-        <p:txBody>
-          <a:bodyPr wrap="none" rtlCol="0">
-            <a:spAutoFit/>
-          </a:bodyPr>
-          <a:lstStyle/>
-          <a:p>
-            <a:r>
-              <a:rPr lang="es-ES" dirty="0" smtClean="0"/>
-              <a:t>Externo a </a:t>
-            </a:r>
-            <a:r>
-              <a:rPr lang="es-ES" dirty="0" err="1" smtClean="0"/>
-              <a:t>Kubernetes</a:t>
-            </a:r>
-            <a:endParaRPr lang="es-ES" dirty="0"/>
-          </a:p>
-        </p:txBody>
-      </p:sp>
-      <p:sp>
-        <p:nvSpPr>
-          <p:cNvPr id="21" name="CuadroTexto 20"/>
-          <p:cNvSpPr txBox="1"/>
-          <p:nvPr/>
-        </p:nvSpPr>
-        <p:spPr>
-          <a:xfrm>
-            <a:off x="3273426" y="714264"/>
-            <a:ext cx="971741" cy="369332"/>
-          </a:xfrm>
-          <a:prstGeom prst="rect">
-            <a:avLst/>
-          </a:prstGeom>
-          <a:noFill/>
-        </p:spPr>
-        <p:txBody>
-          <a:bodyPr wrap="none" rtlCol="0">
-            <a:spAutoFit/>
-          </a:bodyPr>
-          <a:lstStyle/>
-          <a:p>
-            <a:r>
-              <a:rPr lang="es-ES" dirty="0" err="1" smtClean="0"/>
-              <a:t>Sessions</a:t>
-            </a:r>
-            <a:endParaRPr lang="es-ES" dirty="0"/>
-          </a:p>
-        </p:txBody>
-      </p:sp>
-      <p:sp>
-        <p:nvSpPr>
-          <p:cNvPr id="22" name="CuadroTexto 21"/>
-          <p:cNvSpPr txBox="1"/>
-          <p:nvPr/>
-        </p:nvSpPr>
-        <p:spPr>
-          <a:xfrm>
-            <a:off x="4633834" y="714264"/>
-            <a:ext cx="815736" cy="369332"/>
-          </a:xfrm>
-          <a:prstGeom prst="rect">
-            <a:avLst/>
-          </a:prstGeom>
-          <a:noFill/>
-        </p:spPr>
-        <p:txBody>
-          <a:bodyPr wrap="none" rtlCol="0">
-            <a:spAutoFit/>
-          </a:bodyPr>
-          <a:lstStyle/>
-          <a:p>
-            <a:r>
-              <a:rPr lang="es-ES" dirty="0" err="1" smtClean="0"/>
-              <a:t>Clients</a:t>
-            </a:r>
-            <a:endParaRPr lang="es-ES" dirty="0"/>
-          </a:p>
-        </p:txBody>
-      </p:sp>
-      <p:sp>
-        <p:nvSpPr>
-          <p:cNvPr id="23" name="CuadroTexto 22"/>
-          <p:cNvSpPr txBox="1"/>
-          <p:nvPr/>
-        </p:nvSpPr>
-        <p:spPr>
-          <a:xfrm>
-            <a:off x="5706613" y="714264"/>
-            <a:ext cx="971741" cy="369332"/>
-          </a:xfrm>
-          <a:prstGeom prst="rect">
-            <a:avLst/>
-          </a:prstGeom>
-          <a:noFill/>
-        </p:spPr>
-        <p:txBody>
-          <a:bodyPr wrap="none" rtlCol="0">
-            <a:spAutoFit/>
-          </a:bodyPr>
-          <a:lstStyle/>
-          <a:p>
-            <a:r>
-              <a:rPr lang="es-ES" dirty="0" err="1" smtClean="0"/>
-              <a:t>Sessions</a:t>
-            </a:r>
-            <a:endParaRPr lang="es-ES" dirty="0"/>
-          </a:p>
-        </p:txBody>
-      </p:sp>
-      <p:sp>
-        <p:nvSpPr>
-          <p:cNvPr id="24" name="CuadroTexto 23"/>
-          <p:cNvSpPr txBox="1"/>
-          <p:nvPr/>
-        </p:nvSpPr>
-        <p:spPr>
-          <a:xfrm>
-            <a:off x="7067021" y="714264"/>
-            <a:ext cx="815736" cy="369332"/>
-          </a:xfrm>
-          <a:prstGeom prst="rect">
-            <a:avLst/>
-          </a:prstGeom>
-          <a:noFill/>
-        </p:spPr>
-        <p:txBody>
-          <a:bodyPr wrap="none" rtlCol="0">
-            <a:spAutoFit/>
-          </a:bodyPr>
-          <a:lstStyle/>
-          <a:p>
-            <a:r>
-              <a:rPr lang="es-ES" dirty="0" err="1" smtClean="0"/>
-              <a:t>Clients</a:t>
-            </a:r>
-            <a:endParaRPr lang="es-ES" dirty="0"/>
-          </a:p>
-        </p:txBody>
-      </p:sp>
-      <p:sp>
-        <p:nvSpPr>
-          <p:cNvPr id="27" name="Forma libre 26"/>
-          <p:cNvSpPr/>
-          <p:nvPr/>
-        </p:nvSpPr>
-        <p:spPr>
-          <a:xfrm>
-            <a:off x="7914290" y="1403131"/>
-            <a:ext cx="569274" cy="567559"/>
-          </a:xfrm>
-          <a:custGeom>
-            <a:avLst/>
-            <a:gdLst>
-              <a:gd name="connsiteX0" fmla="*/ 0 w 569274"/>
-              <a:gd name="connsiteY0" fmla="*/ 567559 h 567559"/>
-              <a:gd name="connsiteX1" fmla="*/ 567558 w 569274"/>
-              <a:gd name="connsiteY1" fmla="*/ 346841 h 567559"/>
-              <a:gd name="connsiteX2" fmla="*/ 141889 w 569274"/>
-              <a:gd name="connsiteY2" fmla="*/ 0 h 567559"/>
-            </a:gdLst>
-            <a:ahLst/>
-            <a:cxnLst>
-              <a:cxn ang="0">
-                <a:pos x="connsiteX0" y="connsiteY0"/>
-              </a:cxn>
-              <a:cxn ang="0">
-                <a:pos x="connsiteX1" y="connsiteY1"/>
-              </a:cxn>
-              <a:cxn ang="0">
-                <a:pos x="connsiteX2" y="connsiteY2"/>
-              </a:cxn>
-            </a:cxnLst>
-            <a:rect l="l" t="t" r="r" b="b"/>
-            <a:pathLst>
-              <a:path w="569274" h="567559">
-                <a:moveTo>
-                  <a:pt x="0" y="567559"/>
-                </a:moveTo>
-                <a:cubicBezTo>
-                  <a:pt x="271955" y="504496"/>
-                  <a:pt x="543910" y="441434"/>
-                  <a:pt x="567558" y="346841"/>
-                </a:cubicBezTo>
-                <a:cubicBezTo>
-                  <a:pt x="591206" y="252248"/>
-                  <a:pt x="366547" y="126124"/>
-                  <a:pt x="141889" y="0"/>
-                </a:cubicBezTo>
-              </a:path>
-            </a:pathLst>
-          </a:custGeom>
-          <a:noFill/>
-          <a:ln>
-            <a:prstDash val="dash"/>
-            <a:headEnd type="none" w="med" len="med"/>
-            <a:tailEnd type="arrow" w="med" len="med"/>
-          </a:ln>
-        </p:spPr>
-        <p:style>
-          <a:lnRef idx="2">
-            <a:schemeClr val="accent1">
-              <a:shade val="50000"/>
-            </a:schemeClr>
-          </a:lnRef>
-          <a:fillRef idx="1">
-            <a:schemeClr val="accent1"/>
-          </a:fillRef>
-          <a:effectRef idx="0">
-            <a:schemeClr val="accent1"/>
-          </a:effectRef>
-          <a:fontRef idx="minor">
-            <a:schemeClr val="lt1"/>
-          </a:fontRef>
-        </p:style>
-        <p:txBody>
-          <a:bodyPr rtlCol="0" anchor="ctr"/>
-          <a:lstStyle/>
-          <a:p>
-            <a:pPr algn="ctr"/>
-            <a:endParaRPr lang="es-ES"/>
-          </a:p>
-        </p:txBody>
-      </p:sp>
-      <p:sp>
-        <p:nvSpPr>
-          <p:cNvPr id="28" name="CuadroTexto 27"/>
-          <p:cNvSpPr txBox="1"/>
-          <p:nvPr/>
-        </p:nvSpPr>
-        <p:spPr>
-          <a:xfrm>
-            <a:off x="8515095" y="1555864"/>
-            <a:ext cx="1376659" cy="369332"/>
-          </a:xfrm>
-          <a:prstGeom prst="rect">
-            <a:avLst/>
-          </a:prstGeom>
-          <a:noFill/>
-        </p:spPr>
-        <p:txBody>
-          <a:bodyPr wrap="none" rtlCol="0">
-            <a:spAutoFit/>
-          </a:bodyPr>
-          <a:lstStyle/>
-          <a:p>
-            <a:r>
-              <a:rPr lang="es-ES" dirty="0" smtClean="0"/>
-              <a:t>Inicialización</a:t>
-            </a:r>
-            <a:endParaRPr lang="es-ES" dirty="0"/>
-          </a:p>
-        </p:txBody>
-      </p:sp>
-      <p:cxnSp>
-        <p:nvCxnSpPr>
-          <p:cNvPr id="26" name="Conector recto de flecha 25"/>
-          <p:cNvCxnSpPr>
-            <a:stCxn id="4" idx="0"/>
-            <a:endCxn id="5" idx="2"/>
-          </p:cNvCxnSpPr>
-          <p:nvPr/>
-        </p:nvCxnSpPr>
-        <p:spPr>
-          <a:xfrm flipV="1">
-            <a:off x="6873766" y="3644242"/>
-            <a:ext cx="0" cy="753417"/>
-          </a:xfrm>
-          <a:prstGeom prst="straightConnector1">
-            <a:avLst/>
-          </a:prstGeom>
-          <a:ln>
-            <a:tailEnd type="triangle"/>
-          </a:ln>
-        </p:spPr>
-        <p:style>
-          <a:lnRef idx="1">
-            <a:schemeClr val="accent1"/>
-          </a:lnRef>
-          <a:fillRef idx="0">
-            <a:schemeClr val="accent1"/>
-          </a:fillRef>
-          <a:effectRef idx="0">
-            <a:schemeClr val="accent1"/>
-          </a:effectRef>
-          <a:fontRef idx="minor">
-            <a:schemeClr val="tx1"/>
-          </a:fontRef>
-        </p:style>
-      </p:cxnSp>
-      <p:cxnSp>
-        <p:nvCxnSpPr>
-          <p:cNvPr id="30" name="Conector recto de flecha 29"/>
-          <p:cNvCxnSpPr>
-            <a:stCxn id="11" idx="0"/>
-            <a:endCxn id="8" idx="2"/>
-          </p:cNvCxnSpPr>
-          <p:nvPr/>
-        </p:nvCxnSpPr>
-        <p:spPr>
-          <a:xfrm flipV="1">
-            <a:off x="4393324" y="3644242"/>
-            <a:ext cx="1" cy="753417"/>
-          </a:xfrm>
-          <a:prstGeom prst="straightConnector1">
-            <a:avLst/>
-          </a:prstGeom>
-          <a:ln>
-            <a:tailEnd type="triangle"/>
-          </a:ln>
-        </p:spPr>
-        <p:style>
-          <a:lnRef idx="1">
-            <a:schemeClr val="accent1"/>
-          </a:lnRef>
-          <a:fillRef idx="0">
-            <a:schemeClr val="accent1"/>
-          </a:fillRef>
-          <a:effectRef idx="0">
-            <a:schemeClr val="accent1"/>
-          </a:effectRef>
-          <a:fontRef idx="minor">
-            <a:schemeClr val="tx1"/>
-          </a:fontRef>
-        </p:style>
-      </p:cxnSp>
-      <p:cxnSp>
-        <p:nvCxnSpPr>
-          <p:cNvPr id="32" name="Conector recto de flecha 31"/>
-          <p:cNvCxnSpPr>
-            <a:stCxn id="8" idx="0"/>
-            <a:endCxn id="7" idx="2"/>
-          </p:cNvCxnSpPr>
-          <p:nvPr/>
-        </p:nvCxnSpPr>
-        <p:spPr>
-          <a:xfrm flipV="1">
-            <a:off x="4393325" y="2148736"/>
-            <a:ext cx="0" cy="722996"/>
-          </a:xfrm>
-          <a:prstGeom prst="straightConnector1">
-            <a:avLst/>
-          </a:prstGeom>
-          <a:ln>
-            <a:tailEnd type="triangle"/>
-          </a:ln>
-        </p:spPr>
-        <p:style>
-          <a:lnRef idx="1">
-            <a:schemeClr val="accent1"/>
-          </a:lnRef>
-          <a:fillRef idx="0">
-            <a:schemeClr val="accent1"/>
-          </a:fillRef>
-          <a:effectRef idx="0">
-            <a:schemeClr val="accent1"/>
-          </a:effectRef>
-          <a:fontRef idx="minor">
-            <a:schemeClr val="tx1"/>
-          </a:fontRef>
-        </p:style>
-      </p:cxnSp>
-      <p:cxnSp>
-        <p:nvCxnSpPr>
-          <p:cNvPr id="34" name="Conector recto de flecha 33"/>
-          <p:cNvCxnSpPr>
-            <a:stCxn id="5" idx="0"/>
-            <a:endCxn id="6" idx="2"/>
-          </p:cNvCxnSpPr>
-          <p:nvPr/>
-        </p:nvCxnSpPr>
-        <p:spPr>
-          <a:xfrm flipV="1">
-            <a:off x="6873766" y="2148736"/>
-            <a:ext cx="0" cy="722996"/>
-          </a:xfrm>
-          <a:prstGeom prst="straightConnector1">
-            <a:avLst/>
-          </a:prstGeom>
-          <a:ln>
-            <a:tailEnd type="triangle"/>
-          </a:ln>
-        </p:spPr>
-        <p:style>
-          <a:lnRef idx="1">
-            <a:schemeClr val="accent1"/>
-          </a:lnRef>
-          <a:fillRef idx="0">
-            <a:schemeClr val="accent1"/>
-          </a:fillRef>
-          <a:effectRef idx="0">
-            <a:schemeClr val="accent1"/>
-          </a:effectRef>
-          <a:fontRef idx="minor">
-            <a:schemeClr val="tx1"/>
-          </a:fontRef>
-        </p:style>
-      </p:cxnSp>
-      <p:cxnSp>
-        <p:nvCxnSpPr>
-          <p:cNvPr id="36" name="Conector recto de flecha 35"/>
-          <p:cNvCxnSpPr/>
-          <p:nvPr/>
-        </p:nvCxnSpPr>
-        <p:spPr>
-          <a:xfrm flipV="1">
-            <a:off x="4952144" y="5285783"/>
-            <a:ext cx="0" cy="884688"/>
-          </a:xfrm>
-          <a:prstGeom prst="straightConnector1">
-            <a:avLst/>
-          </a:prstGeom>
-          <a:ln>
-            <a:tailEnd type="triangle"/>
-          </a:ln>
-        </p:spPr>
-        <p:style>
-          <a:lnRef idx="1">
-            <a:schemeClr val="accent1"/>
-          </a:lnRef>
-          <a:fillRef idx="0">
-            <a:schemeClr val="accent1"/>
-          </a:fillRef>
-          <a:effectRef idx="0">
-            <a:schemeClr val="accent1"/>
-          </a:effectRef>
-          <a:fontRef idx="minor">
-            <a:schemeClr val="tx1"/>
-          </a:fontRef>
-        </p:style>
-      </p:cxnSp>
-      <p:cxnSp>
-        <p:nvCxnSpPr>
-          <p:cNvPr id="37" name="Conector recto de flecha 36"/>
-          <p:cNvCxnSpPr/>
-          <p:nvPr/>
-        </p:nvCxnSpPr>
-        <p:spPr>
-          <a:xfrm flipV="1">
-            <a:off x="6193605" y="5285783"/>
-            <a:ext cx="0" cy="884688"/>
-          </a:xfrm>
-          <a:prstGeom prst="straightConnector1">
-            <a:avLst/>
-          </a:prstGeom>
-          <a:ln>
-            <a:tailEnd type="triangle"/>
-          </a:ln>
-        </p:spPr>
-        <p:style>
-          <a:lnRef idx="1">
-            <a:schemeClr val="accent1"/>
-          </a:lnRef>
-          <a:fillRef idx="0">
-            <a:schemeClr val="accent1"/>
-          </a:fillRef>
-          <a:effectRef idx="0">
-            <a:schemeClr val="accent1"/>
-          </a:effectRef>
-          <a:fontRef idx="minor">
-            <a:schemeClr val="tx1"/>
-          </a:fontRef>
-        </p:style>
-      </p:cxnSp>
     </p:spTree>
     <p:extLst>
       <p:ext uri="{BB962C8B-B14F-4D97-AF65-F5344CB8AC3E}">
-        <p14:creationId xmlns:p14="http://schemas.microsoft.com/office/powerpoint/2010/main" val="3418031809"/>
+        <p14:creationId xmlns:p14="http://schemas.microsoft.com/office/powerpoint/2010/main" val="1369299789"/>
       </p:ext>
     </p:extLst>
   </p:cSld>

</xml_diff>

<commit_message>
Correccion servicio Nodeport Diameter
</commit_message>
<xml_diff>
--- a/DiameterServerDesign.pptx
+++ b/DiameterServerDesign.pptx
@@ -11526,11 +11526,7 @@
           <a:p>
             <a:r>
               <a:rPr lang="es-ES" sz="2800" dirty="0" smtClean="0"/>
-              <a:t>TESTING </a:t>
-            </a:r>
-            <a:r>
-              <a:rPr lang="es-ES" sz="2800" dirty="0" smtClean="0"/>
-              <a:t>KUBERNETES</a:t>
+              <a:t>TESTING KUBERNETES</a:t>
             </a:r>
             <a:endParaRPr lang="es-ES" sz="2800" dirty="0"/>
           </a:p>
@@ -12498,7 +12494,7 @@
         <p:spPr>
           <a:xfrm>
             <a:off x="7914290" y="1403131"/>
-            <a:ext cx="569274" cy="567559"/>
+            <a:ext cx="569274" cy="1923393"/>
           </a:xfrm>
           <a:custGeom>
             <a:avLst/>
@@ -12924,8 +12920,8 @@
         </p:nvSpPr>
         <p:spPr>
           <a:xfrm>
-            <a:off x="683063" y="1135117"/>
-            <a:ext cx="7898524" cy="4247317"/>
+            <a:off x="683062" y="1135117"/>
+            <a:ext cx="9060027" cy="6186309"/>
           </a:xfrm>
           <a:prstGeom prst="rect">
             <a:avLst/>
@@ -12948,10 +12944,12 @@
             </a:r>
             <a:r>
               <a:rPr lang="es-ES" dirty="0" smtClean="0"/>
-              <a:t>. Por lo tanto</a:t>
-            </a:r>
-          </a:p>
-          <a:p>
+              <a:t>. Por lo </a:t>
+            </a:r>
+            <a:r>
+              <a:rPr lang="es-ES" dirty="0" smtClean="0"/>
+              <a:t>tanto</a:t>
+            </a:r>
             <a:endParaRPr lang="es-ES" dirty="0" smtClean="0"/>
           </a:p>
           <a:p>
@@ -12977,26 +12975,23 @@
             </a:r>
             <a:r>
               <a:rPr lang="es-ES" dirty="0" smtClean="0"/>
-              <a:t> con subredes permitidas, y obtienen la identidad del peer remoto tras el CER.</a:t>
-            </a:r>
+              <a:t> con subredes permitidas, y obtienen la identidad del peer remoto tras el CER</a:t>
+            </a:r>
+            <a:r>
+              <a:rPr lang="es-ES" dirty="0" smtClean="0"/>
+              <a:t>.</a:t>
+            </a:r>
+            <a:endParaRPr lang="es-ES" dirty="0"/>
           </a:p>
           <a:p>
             <a:pPr marL="285750" indent="-285750">
               <a:buFont typeface="Arial" panose="020B0604020202020204" pitchFamily="34" charset="0"/>
               <a:buChar char="•"/>
             </a:pPr>
-            <a:endParaRPr lang="es-ES" dirty="0"/>
-          </a:p>
-          <a:p>
-            <a:pPr marL="285750" indent="-285750">
-              <a:buFont typeface="Arial" panose="020B0604020202020204" pitchFamily="34" charset="0"/>
-              <a:buChar char="•"/>
-            </a:pPr>
             <a:r>
               <a:rPr lang="es-ES" dirty="0" smtClean="0"/>
               <a:t>Los servidores radius pueden declarar como clientes subredes completas</a:t>
             </a:r>
-            <a:endParaRPr lang="es-ES" dirty="0" smtClean="0"/>
           </a:p>
           <a:p>
             <a:endParaRPr lang="es-ES" dirty="0" smtClean="0"/>
@@ -13036,8 +13031,57 @@
           </a:p>
           <a:p>
             <a:r>
+              <a:rPr lang="es-ES" dirty="0" smtClean="0"/>
+              <a:t>Los archivos de configuración </a:t>
+            </a:r>
+            <a:r>
+              <a:rPr lang="es-ES" dirty="0" err="1" smtClean="0"/>
+              <a:t>yaas</a:t>
+            </a:r>
+            <a:r>
+              <a:rPr lang="es-ES" dirty="0" smtClean="0"/>
+              <a:t> utilizan ${POD_NAME} para definir los nombres de los hosts </a:t>
+            </a:r>
+            <a:r>
+              <a:rPr lang="es-ES" dirty="0" err="1" smtClean="0"/>
+              <a:t>Diameter</a:t>
+            </a:r>
+            <a:endParaRPr lang="es-ES" dirty="0" smtClean="0"/>
+          </a:p>
+          <a:p>
+            <a:endParaRPr lang="es-ES" dirty="0"/>
+          </a:p>
+          <a:p>
+            <a:r>
+              <a:rPr lang="es-ES" b="1" dirty="0" err="1" smtClean="0"/>
+              <a:t>Superserver</a:t>
+            </a:r>
+            <a:r>
+              <a:rPr lang="es-ES" b="1" dirty="0" smtClean="0"/>
+              <a:t> </a:t>
+            </a:r>
+            <a:r>
+              <a:rPr lang="es-ES" b="1" dirty="0" err="1" smtClean="0"/>
+              <a:t>services</a:t>
+            </a:r>
+            <a:endParaRPr lang="es-ES" dirty="0"/>
+          </a:p>
+          <a:p>
+            <a:r>
+              <a:rPr lang="es-ES" dirty="0" err="1" smtClean="0"/>
+              <a:t>Yaas-superserver-diameter</a:t>
+            </a:r>
+            <a:r>
+              <a:rPr lang="es-ES" dirty="0" smtClean="0"/>
+              <a:t> expone </a:t>
+            </a:r>
+            <a:r>
+              <a:rPr lang="es-ES" dirty="0"/>
+              <a:t>dos </a:t>
+            </a:r>
+            <a:r>
               <a:rPr lang="es-ES" dirty="0" err="1"/>
-              <a:t>Superserver</a:t>
+              <a:t>peers</a:t>
             </a:r>
             <a:r>
               <a:rPr lang="es-ES" dirty="0"/>
@@ -13045,22 +13089,6 @@
             </a:r>
             <a:r>
               <a:rPr lang="es-ES" dirty="0" err="1"/>
-              <a:t>Diameter</a:t>
-            </a:r>
-            <a:r>
-              <a:rPr lang="es-ES" dirty="0"/>
-              <a:t> expone dos </a:t>
-            </a:r>
-            <a:r>
-              <a:rPr lang="es-ES" dirty="0" err="1"/>
-              <a:t>peers</a:t>
-            </a:r>
-            <a:r>
-              <a:rPr lang="es-ES" dirty="0"/>
-              <a:t> </a:t>
-            </a:r>
-            <a:r>
-              <a:rPr lang="es-ES" dirty="0" err="1"/>
               <a:t>disntintos</a:t>
             </a:r>
             <a:r>
@@ -13078,11 +13106,19 @@
           <a:p>
             <a:r>
               <a:rPr lang="es-ES" dirty="0" err="1" smtClean="0"/>
-              <a:t>Superserver</a:t>
-            </a:r>
-            <a:r>
-              <a:rPr lang="es-ES" dirty="0" smtClean="0"/>
-              <a:t> Radius expone </a:t>
+              <a:t>Yaas</a:t>
+            </a:r>
+            <a:r>
+              <a:rPr lang="es-ES" dirty="0" smtClean="0"/>
+              <a:t>-</a:t>
+            </a:r>
+            <a:r>
+              <a:rPr lang="es-ES" dirty="0" err="1" smtClean="0"/>
+              <a:t>supserverver</a:t>
+            </a:r>
+            <a:r>
+              <a:rPr lang="es-ES" dirty="0" smtClean="0"/>
+              <a:t>-radius expone </a:t>
             </a:r>
             <a:r>
               <a:rPr lang="es-ES" dirty="0"/>
@@ -13097,21 +13133,75 @@
               <a:t> en </a:t>
             </a:r>
             <a:r>
-              <a:rPr lang="es-ES" dirty="0" err="1"/>
+              <a:rPr lang="es-ES" dirty="0" err="1" smtClean="0"/>
               <a:t>yaas</a:t>
             </a:r>
             <a:r>
-              <a:rPr lang="es-ES" dirty="0"/>
+              <a:rPr lang="es-ES" dirty="0" smtClean="0"/>
               <a:t>-</a:t>
             </a:r>
             <a:r>
-              <a:rPr lang="es-ES" dirty="0" err="1"/>
+              <a:rPr lang="es-ES" dirty="0" err="1" smtClean="0"/>
               <a:t>superserver</a:t>
             </a:r>
             <a:r>
-              <a:rPr lang="es-ES" dirty="0"/>
+              <a:rPr lang="es-ES" dirty="0" smtClean="0"/>
               <a:t>-radius</a:t>
             </a:r>
+          </a:p>
+          <a:p>
+            <a:endParaRPr lang="es-ES" dirty="0"/>
+          </a:p>
+          <a:p>
+            <a:r>
+              <a:rPr lang="es-ES" b="1" dirty="0" smtClean="0"/>
+              <a:t>Server </a:t>
+            </a:r>
+            <a:r>
+              <a:rPr lang="es-ES" b="1" dirty="0" err="1" smtClean="0"/>
+              <a:t>services</a:t>
+            </a:r>
+            <a:endParaRPr lang="es-ES" b="1" dirty="0" smtClean="0"/>
+          </a:p>
+          <a:p>
+            <a:r>
+              <a:rPr lang="es-ES" dirty="0" err="1" smtClean="0"/>
+              <a:t>Yaas</a:t>
+            </a:r>
+            <a:r>
+              <a:rPr lang="es-ES" dirty="0" smtClean="0"/>
+              <a:t>-server-radius expone un </a:t>
+            </a:r>
+            <a:r>
+              <a:rPr lang="es-ES" dirty="0" err="1" smtClean="0"/>
+              <a:t>Nodeport</a:t>
+            </a:r>
+            <a:r>
+              <a:rPr lang="es-ES" dirty="0" smtClean="0"/>
+              <a:t> para balancear entre ambas instancias radius</a:t>
+            </a:r>
+          </a:p>
+          <a:p>
+            <a:r>
+              <a:rPr lang="es-ES" dirty="0" smtClean="0"/>
+              <a:t>Yaas-server-diameter-0/1 expone un </a:t>
+            </a:r>
+            <a:r>
+              <a:rPr lang="es-ES" dirty="0" err="1" smtClean="0"/>
+              <a:t>Nodeport</a:t>
+            </a:r>
+            <a:r>
+              <a:rPr lang="es-ES" dirty="0" smtClean="0"/>
+              <a:t> para cada instancia </a:t>
+            </a:r>
+            <a:r>
+              <a:rPr lang="es-ES" dirty="0" err="1" smtClean="0"/>
+              <a:t>Diameter</a:t>
+            </a:r>
+            <a:endParaRPr lang="es-ES" dirty="0"/>
+          </a:p>
+          <a:p>
+            <a:endParaRPr lang="es-ES" dirty="0"/>
           </a:p>
         </p:txBody>
       </p:sp>
@@ -13139,11 +13229,7 @@
           <a:p>
             <a:r>
               <a:rPr lang="es-ES" sz="2800" dirty="0" smtClean="0"/>
-              <a:t>TESTING </a:t>
-            </a:r>
-            <a:r>
-              <a:rPr lang="es-ES" sz="2800" dirty="0" smtClean="0"/>
-              <a:t>KUBERNETES</a:t>
+              <a:t>TESTING KUBERNETES</a:t>
             </a:r>
             <a:endParaRPr lang="es-ES" sz="2800" dirty="0"/>
           </a:p>

</xml_diff>